<commit_message>
Correct RGBA bit layout and specify behavior for bus unused bits
</commit_message>
<xml_diff>
--- a/Specification/Editable source images/Images Spec Part 2 - 32bit data types.pptx
+++ b/Specification/Editable source images/Images Spec Part 2 - 32bit data types.pptx
@@ -108,7 +108,7 @@
   </p:defaultTextStyle>
   <p:extLst>
     <p:ext uri="{EFAFB233-063F-42B5-8137-9DF3F51BA10A}">
-      <p15:sldGuideLst xmlns:p15="http://schemas.microsoft.com/office/powerpoint/2012/main" xmlns=""/>
+      <p15:sldGuideLst xmlns="" xmlns:p15="http://schemas.microsoft.com/office/powerpoint/2012/main"/>
     </p:ext>
   </p:extLst>
 </p:presentation>
@@ -136,7 +136,7 @@
           <p:cNvPr id="2" name="Título 1">
             <a:extLst>
               <a:ext uri="{FF2B5EF4-FFF2-40B4-BE49-F238E27FC236}">
-                <a16:creationId xmlns:a16="http://schemas.microsoft.com/office/drawing/2014/main" xmlns="" id="{E3B9DF4B-0C72-4846-9560-CA4C0EF12637}"/>
+                <a16:creationId xmlns="" xmlns:a16="http://schemas.microsoft.com/office/drawing/2014/main" id="{E3B9DF4B-0C72-4846-9560-CA4C0EF12637}"/>
               </a:ext>
             </a:extLst>
           </p:cNvPr>
@@ -173,7 +173,7 @@
           <p:cNvPr id="3" name="Subtítulo 2">
             <a:extLst>
               <a:ext uri="{FF2B5EF4-FFF2-40B4-BE49-F238E27FC236}">
-                <a16:creationId xmlns:a16="http://schemas.microsoft.com/office/drawing/2014/main" xmlns="" id="{685B1628-0B9C-4511-8020-749CB381CA8A}"/>
+                <a16:creationId xmlns="" xmlns:a16="http://schemas.microsoft.com/office/drawing/2014/main" id="{685B1628-0B9C-4511-8020-749CB381CA8A}"/>
               </a:ext>
             </a:extLst>
           </p:cNvPr>
@@ -243,7 +243,7 @@
           <p:cNvPr id="4" name="Marcador de fecha 3">
             <a:extLst>
               <a:ext uri="{FF2B5EF4-FFF2-40B4-BE49-F238E27FC236}">
-                <a16:creationId xmlns:a16="http://schemas.microsoft.com/office/drawing/2014/main" xmlns="" id="{94B80B3E-D487-4AED-BB83-C0CCE4C60C28}"/>
+                <a16:creationId xmlns="" xmlns:a16="http://schemas.microsoft.com/office/drawing/2014/main" id="{94B80B3E-D487-4AED-BB83-C0CCE4C60C28}"/>
               </a:ext>
             </a:extLst>
           </p:cNvPr>
@@ -262,7 +262,7 @@
             <a:fld id="{EFBC5A1B-75D9-4BC9-8C41-860857045191}" type="datetimeFigureOut">
               <a:rPr lang="es-ES" smtClean="0"/>
               <a:pPr/>
-              <a:t>20/09/2021</a:t>
+              <a:t>26/11/2023</a:t>
             </a:fld>
             <a:endParaRPr lang="es-ES"/>
           </a:p>
@@ -273,7 +273,7 @@
           <p:cNvPr id="5" name="Marcador de pie de página 4">
             <a:extLst>
               <a:ext uri="{FF2B5EF4-FFF2-40B4-BE49-F238E27FC236}">
-                <a16:creationId xmlns:a16="http://schemas.microsoft.com/office/drawing/2014/main" xmlns="" id="{4C360251-304A-4F05-98C3-0F4C6ACE97D7}"/>
+                <a16:creationId xmlns="" xmlns:a16="http://schemas.microsoft.com/office/drawing/2014/main" id="{4C360251-304A-4F05-98C3-0F4C6ACE97D7}"/>
               </a:ext>
             </a:extLst>
           </p:cNvPr>
@@ -298,7 +298,7 @@
           <p:cNvPr id="6" name="Marcador de número de diapositiva 5">
             <a:extLst>
               <a:ext uri="{FF2B5EF4-FFF2-40B4-BE49-F238E27FC236}">
-                <a16:creationId xmlns:a16="http://schemas.microsoft.com/office/drawing/2014/main" xmlns="" id="{6799EFD0-FF52-4DE6-868B-77F17D2F4FF0}"/>
+                <a16:creationId xmlns="" xmlns:a16="http://schemas.microsoft.com/office/drawing/2014/main" id="{6799EFD0-FF52-4DE6-868B-77F17D2F4FF0}"/>
               </a:ext>
             </a:extLst>
           </p:cNvPr>
@@ -326,7 +326,7 @@
     </p:spTree>
     <p:extLst>
       <p:ext uri="{BB962C8B-B14F-4D97-AF65-F5344CB8AC3E}">
-        <p14:creationId xmlns:p14="http://schemas.microsoft.com/office/powerpoint/2010/main" xmlns="" val="3630569971"/>
+        <p14:creationId xmlns="" xmlns:p14="http://schemas.microsoft.com/office/powerpoint/2010/main" val="3630569971"/>
       </p:ext>
     </p:extLst>
   </p:cSld>
@@ -358,7 +358,7 @@
           <p:cNvPr id="2" name="Título 1">
             <a:extLst>
               <a:ext uri="{FF2B5EF4-FFF2-40B4-BE49-F238E27FC236}">
-                <a16:creationId xmlns:a16="http://schemas.microsoft.com/office/drawing/2014/main" xmlns="" id="{0DC87140-B7D9-4FA4-A34F-FB77A3666A4F}"/>
+                <a16:creationId xmlns="" xmlns:a16="http://schemas.microsoft.com/office/drawing/2014/main" id="{0DC87140-B7D9-4FA4-A34F-FB77A3666A4F}"/>
               </a:ext>
             </a:extLst>
           </p:cNvPr>
@@ -386,7 +386,7 @@
           <p:cNvPr id="3" name="Marcador de texto vertical 2">
             <a:extLst>
               <a:ext uri="{FF2B5EF4-FFF2-40B4-BE49-F238E27FC236}">
-                <a16:creationId xmlns:a16="http://schemas.microsoft.com/office/drawing/2014/main" xmlns="" id="{850563DB-D0F8-4DBB-A77B-19BBDF9BDBCD}"/>
+                <a16:creationId xmlns="" xmlns:a16="http://schemas.microsoft.com/office/drawing/2014/main" id="{850563DB-D0F8-4DBB-A77B-19BBDF9BDBCD}"/>
               </a:ext>
             </a:extLst>
           </p:cNvPr>
@@ -443,7 +443,7 @@
           <p:cNvPr id="4" name="Marcador de fecha 3">
             <a:extLst>
               <a:ext uri="{FF2B5EF4-FFF2-40B4-BE49-F238E27FC236}">
-                <a16:creationId xmlns:a16="http://schemas.microsoft.com/office/drawing/2014/main" xmlns="" id="{F3F66AC4-DE53-4169-9771-B049F319EEA9}"/>
+                <a16:creationId xmlns="" xmlns:a16="http://schemas.microsoft.com/office/drawing/2014/main" id="{F3F66AC4-DE53-4169-9771-B049F319EEA9}"/>
               </a:ext>
             </a:extLst>
           </p:cNvPr>
@@ -462,7 +462,7 @@
             <a:fld id="{EFBC5A1B-75D9-4BC9-8C41-860857045191}" type="datetimeFigureOut">
               <a:rPr lang="es-ES" smtClean="0"/>
               <a:pPr/>
-              <a:t>20/09/2021</a:t>
+              <a:t>26/11/2023</a:t>
             </a:fld>
             <a:endParaRPr lang="es-ES"/>
           </a:p>
@@ -473,7 +473,7 @@
           <p:cNvPr id="5" name="Marcador de pie de página 4">
             <a:extLst>
               <a:ext uri="{FF2B5EF4-FFF2-40B4-BE49-F238E27FC236}">
-                <a16:creationId xmlns:a16="http://schemas.microsoft.com/office/drawing/2014/main" xmlns="" id="{7F1B4E51-E6DE-4608-865D-CC9B9B289FC7}"/>
+                <a16:creationId xmlns="" xmlns:a16="http://schemas.microsoft.com/office/drawing/2014/main" id="{7F1B4E51-E6DE-4608-865D-CC9B9B289FC7}"/>
               </a:ext>
             </a:extLst>
           </p:cNvPr>
@@ -498,7 +498,7 @@
           <p:cNvPr id="6" name="Marcador de número de diapositiva 5">
             <a:extLst>
               <a:ext uri="{FF2B5EF4-FFF2-40B4-BE49-F238E27FC236}">
-                <a16:creationId xmlns:a16="http://schemas.microsoft.com/office/drawing/2014/main" xmlns="" id="{AC49A7EA-BD2D-4D11-9E44-7FD8F2848414}"/>
+                <a16:creationId xmlns="" xmlns:a16="http://schemas.microsoft.com/office/drawing/2014/main" id="{AC49A7EA-BD2D-4D11-9E44-7FD8F2848414}"/>
               </a:ext>
             </a:extLst>
           </p:cNvPr>
@@ -526,7 +526,7 @@
     </p:spTree>
     <p:extLst>
       <p:ext uri="{BB962C8B-B14F-4D97-AF65-F5344CB8AC3E}">
-        <p14:creationId xmlns:p14="http://schemas.microsoft.com/office/powerpoint/2010/main" xmlns="" val="3667736171"/>
+        <p14:creationId xmlns="" xmlns:p14="http://schemas.microsoft.com/office/powerpoint/2010/main" val="3667736171"/>
       </p:ext>
     </p:extLst>
   </p:cSld>
@@ -558,7 +558,7 @@
           <p:cNvPr id="2" name="Título vertical 1">
             <a:extLst>
               <a:ext uri="{FF2B5EF4-FFF2-40B4-BE49-F238E27FC236}">
-                <a16:creationId xmlns:a16="http://schemas.microsoft.com/office/drawing/2014/main" xmlns="" id="{5B32CEA0-9850-4637-812E-6A3BA3FDCDE1}"/>
+                <a16:creationId xmlns="" xmlns:a16="http://schemas.microsoft.com/office/drawing/2014/main" id="{5B32CEA0-9850-4637-812E-6A3BA3FDCDE1}"/>
               </a:ext>
             </a:extLst>
           </p:cNvPr>
@@ -591,7 +591,7 @@
           <p:cNvPr id="3" name="Marcador de texto vertical 2">
             <a:extLst>
               <a:ext uri="{FF2B5EF4-FFF2-40B4-BE49-F238E27FC236}">
-                <a16:creationId xmlns:a16="http://schemas.microsoft.com/office/drawing/2014/main" xmlns="" id="{939BC441-ACB3-491E-BDDF-AAB44A6A9480}"/>
+                <a16:creationId xmlns="" xmlns:a16="http://schemas.microsoft.com/office/drawing/2014/main" id="{939BC441-ACB3-491E-BDDF-AAB44A6A9480}"/>
               </a:ext>
             </a:extLst>
           </p:cNvPr>
@@ -653,7 +653,7 @@
           <p:cNvPr id="4" name="Marcador de fecha 3">
             <a:extLst>
               <a:ext uri="{FF2B5EF4-FFF2-40B4-BE49-F238E27FC236}">
-                <a16:creationId xmlns:a16="http://schemas.microsoft.com/office/drawing/2014/main" xmlns="" id="{4E5F3364-5D05-4590-944A-B62A5881200D}"/>
+                <a16:creationId xmlns="" xmlns:a16="http://schemas.microsoft.com/office/drawing/2014/main" id="{4E5F3364-5D05-4590-944A-B62A5881200D}"/>
               </a:ext>
             </a:extLst>
           </p:cNvPr>
@@ -672,7 +672,7 @@
             <a:fld id="{EFBC5A1B-75D9-4BC9-8C41-860857045191}" type="datetimeFigureOut">
               <a:rPr lang="es-ES" smtClean="0"/>
               <a:pPr/>
-              <a:t>20/09/2021</a:t>
+              <a:t>26/11/2023</a:t>
             </a:fld>
             <a:endParaRPr lang="es-ES"/>
           </a:p>
@@ -683,7 +683,7 @@
           <p:cNvPr id="5" name="Marcador de pie de página 4">
             <a:extLst>
               <a:ext uri="{FF2B5EF4-FFF2-40B4-BE49-F238E27FC236}">
-                <a16:creationId xmlns:a16="http://schemas.microsoft.com/office/drawing/2014/main" xmlns="" id="{F6634A9D-820F-4C3B-AD07-AAB5383B1C30}"/>
+                <a16:creationId xmlns="" xmlns:a16="http://schemas.microsoft.com/office/drawing/2014/main" id="{F6634A9D-820F-4C3B-AD07-AAB5383B1C30}"/>
               </a:ext>
             </a:extLst>
           </p:cNvPr>
@@ -708,7 +708,7 @@
           <p:cNvPr id="6" name="Marcador de número de diapositiva 5">
             <a:extLst>
               <a:ext uri="{FF2B5EF4-FFF2-40B4-BE49-F238E27FC236}">
-                <a16:creationId xmlns:a16="http://schemas.microsoft.com/office/drawing/2014/main" xmlns="" id="{AF9F029D-3E88-4B7B-BB5B-24C24BC15CA7}"/>
+                <a16:creationId xmlns="" xmlns:a16="http://schemas.microsoft.com/office/drawing/2014/main" id="{AF9F029D-3E88-4B7B-BB5B-24C24BC15CA7}"/>
               </a:ext>
             </a:extLst>
           </p:cNvPr>
@@ -736,7 +736,7 @@
     </p:spTree>
     <p:extLst>
       <p:ext uri="{BB962C8B-B14F-4D97-AF65-F5344CB8AC3E}">
-        <p14:creationId xmlns:p14="http://schemas.microsoft.com/office/powerpoint/2010/main" xmlns="" val="3527137102"/>
+        <p14:creationId xmlns="" xmlns:p14="http://schemas.microsoft.com/office/powerpoint/2010/main" val="3527137102"/>
       </p:ext>
     </p:extLst>
   </p:cSld>
@@ -768,7 +768,7 @@
           <p:cNvPr id="2" name="Título 1">
             <a:extLst>
               <a:ext uri="{FF2B5EF4-FFF2-40B4-BE49-F238E27FC236}">
-                <a16:creationId xmlns:a16="http://schemas.microsoft.com/office/drawing/2014/main" xmlns="" id="{08950D71-BF45-4BBD-819C-49E969998269}"/>
+                <a16:creationId xmlns="" xmlns:a16="http://schemas.microsoft.com/office/drawing/2014/main" id="{08950D71-BF45-4BBD-819C-49E969998269}"/>
               </a:ext>
             </a:extLst>
           </p:cNvPr>
@@ -796,7 +796,7 @@
           <p:cNvPr id="3" name="Marcador de contenido 2">
             <a:extLst>
               <a:ext uri="{FF2B5EF4-FFF2-40B4-BE49-F238E27FC236}">
-                <a16:creationId xmlns:a16="http://schemas.microsoft.com/office/drawing/2014/main" xmlns="" id="{961FBA74-E944-406F-826A-2C37A64FD07F}"/>
+                <a16:creationId xmlns="" xmlns:a16="http://schemas.microsoft.com/office/drawing/2014/main" id="{961FBA74-E944-406F-826A-2C37A64FD07F}"/>
               </a:ext>
             </a:extLst>
           </p:cNvPr>
@@ -853,7 +853,7 @@
           <p:cNvPr id="4" name="Marcador de fecha 3">
             <a:extLst>
               <a:ext uri="{FF2B5EF4-FFF2-40B4-BE49-F238E27FC236}">
-                <a16:creationId xmlns:a16="http://schemas.microsoft.com/office/drawing/2014/main" xmlns="" id="{9BF5C59E-1E2B-45B4-9381-181FD109BDB3}"/>
+                <a16:creationId xmlns="" xmlns:a16="http://schemas.microsoft.com/office/drawing/2014/main" id="{9BF5C59E-1E2B-45B4-9381-181FD109BDB3}"/>
               </a:ext>
             </a:extLst>
           </p:cNvPr>
@@ -872,7 +872,7 @@
             <a:fld id="{EFBC5A1B-75D9-4BC9-8C41-860857045191}" type="datetimeFigureOut">
               <a:rPr lang="es-ES" smtClean="0"/>
               <a:pPr/>
-              <a:t>20/09/2021</a:t>
+              <a:t>26/11/2023</a:t>
             </a:fld>
             <a:endParaRPr lang="es-ES"/>
           </a:p>
@@ -883,7 +883,7 @@
           <p:cNvPr id="5" name="Marcador de pie de página 4">
             <a:extLst>
               <a:ext uri="{FF2B5EF4-FFF2-40B4-BE49-F238E27FC236}">
-                <a16:creationId xmlns:a16="http://schemas.microsoft.com/office/drawing/2014/main" xmlns="" id="{A837392A-47E5-47F6-8C55-2267B7EEB618}"/>
+                <a16:creationId xmlns="" xmlns:a16="http://schemas.microsoft.com/office/drawing/2014/main" id="{A837392A-47E5-47F6-8C55-2267B7EEB618}"/>
               </a:ext>
             </a:extLst>
           </p:cNvPr>
@@ -908,7 +908,7 @@
           <p:cNvPr id="6" name="Marcador de número de diapositiva 5">
             <a:extLst>
               <a:ext uri="{FF2B5EF4-FFF2-40B4-BE49-F238E27FC236}">
-                <a16:creationId xmlns:a16="http://schemas.microsoft.com/office/drawing/2014/main" xmlns="" id="{2DAD3A73-252F-438F-9D6E-BFF97E283E0E}"/>
+                <a16:creationId xmlns="" xmlns:a16="http://schemas.microsoft.com/office/drawing/2014/main" id="{2DAD3A73-252F-438F-9D6E-BFF97E283E0E}"/>
               </a:ext>
             </a:extLst>
           </p:cNvPr>
@@ -936,7 +936,7 @@
     </p:spTree>
     <p:extLst>
       <p:ext uri="{BB962C8B-B14F-4D97-AF65-F5344CB8AC3E}">
-        <p14:creationId xmlns:p14="http://schemas.microsoft.com/office/powerpoint/2010/main" xmlns="" val="3101532947"/>
+        <p14:creationId xmlns="" xmlns:p14="http://schemas.microsoft.com/office/powerpoint/2010/main" val="3101532947"/>
       </p:ext>
     </p:extLst>
   </p:cSld>
@@ -968,7 +968,7 @@
           <p:cNvPr id="2" name="Título 1">
             <a:extLst>
               <a:ext uri="{FF2B5EF4-FFF2-40B4-BE49-F238E27FC236}">
-                <a16:creationId xmlns:a16="http://schemas.microsoft.com/office/drawing/2014/main" xmlns="" id="{D95F49E8-9F51-4C29-B594-41EFB07B151D}"/>
+                <a16:creationId xmlns="" xmlns:a16="http://schemas.microsoft.com/office/drawing/2014/main" id="{D95F49E8-9F51-4C29-B594-41EFB07B151D}"/>
               </a:ext>
             </a:extLst>
           </p:cNvPr>
@@ -1005,7 +1005,7 @@
           <p:cNvPr id="3" name="Marcador de texto 2">
             <a:extLst>
               <a:ext uri="{FF2B5EF4-FFF2-40B4-BE49-F238E27FC236}">
-                <a16:creationId xmlns:a16="http://schemas.microsoft.com/office/drawing/2014/main" xmlns="" id="{14212A7B-BB3F-43D7-BB50-5C778BF31233}"/>
+                <a16:creationId xmlns="" xmlns:a16="http://schemas.microsoft.com/office/drawing/2014/main" id="{14212A7B-BB3F-43D7-BB50-5C778BF31233}"/>
               </a:ext>
             </a:extLst>
           </p:cNvPr>
@@ -1130,7 +1130,7 @@
           <p:cNvPr id="4" name="Marcador de fecha 3">
             <a:extLst>
               <a:ext uri="{FF2B5EF4-FFF2-40B4-BE49-F238E27FC236}">
-                <a16:creationId xmlns:a16="http://schemas.microsoft.com/office/drawing/2014/main" xmlns="" id="{4D1F1240-5664-43E2-A8B7-3D42989C6517}"/>
+                <a16:creationId xmlns="" xmlns:a16="http://schemas.microsoft.com/office/drawing/2014/main" id="{4D1F1240-5664-43E2-A8B7-3D42989C6517}"/>
               </a:ext>
             </a:extLst>
           </p:cNvPr>
@@ -1149,7 +1149,7 @@
             <a:fld id="{EFBC5A1B-75D9-4BC9-8C41-860857045191}" type="datetimeFigureOut">
               <a:rPr lang="es-ES" smtClean="0"/>
               <a:pPr/>
-              <a:t>20/09/2021</a:t>
+              <a:t>26/11/2023</a:t>
             </a:fld>
             <a:endParaRPr lang="es-ES"/>
           </a:p>
@@ -1160,7 +1160,7 @@
           <p:cNvPr id="5" name="Marcador de pie de página 4">
             <a:extLst>
               <a:ext uri="{FF2B5EF4-FFF2-40B4-BE49-F238E27FC236}">
-                <a16:creationId xmlns:a16="http://schemas.microsoft.com/office/drawing/2014/main" xmlns="" id="{92038497-9614-49CA-BFAB-997CB1B236C1}"/>
+                <a16:creationId xmlns="" xmlns:a16="http://schemas.microsoft.com/office/drawing/2014/main" id="{92038497-9614-49CA-BFAB-997CB1B236C1}"/>
               </a:ext>
             </a:extLst>
           </p:cNvPr>
@@ -1185,7 +1185,7 @@
           <p:cNvPr id="6" name="Marcador de número de diapositiva 5">
             <a:extLst>
               <a:ext uri="{FF2B5EF4-FFF2-40B4-BE49-F238E27FC236}">
-                <a16:creationId xmlns:a16="http://schemas.microsoft.com/office/drawing/2014/main" xmlns="" id="{833C8CA2-40EC-4045-B0F5-731AF8AEEFD1}"/>
+                <a16:creationId xmlns="" xmlns:a16="http://schemas.microsoft.com/office/drawing/2014/main" id="{833C8CA2-40EC-4045-B0F5-731AF8AEEFD1}"/>
               </a:ext>
             </a:extLst>
           </p:cNvPr>
@@ -1213,7 +1213,7 @@
     </p:spTree>
     <p:extLst>
       <p:ext uri="{BB962C8B-B14F-4D97-AF65-F5344CB8AC3E}">
-        <p14:creationId xmlns:p14="http://schemas.microsoft.com/office/powerpoint/2010/main" xmlns="" val="3711361680"/>
+        <p14:creationId xmlns="" xmlns:p14="http://schemas.microsoft.com/office/powerpoint/2010/main" val="3711361680"/>
       </p:ext>
     </p:extLst>
   </p:cSld>
@@ -1245,7 +1245,7 @@
           <p:cNvPr id="2" name="Título 1">
             <a:extLst>
               <a:ext uri="{FF2B5EF4-FFF2-40B4-BE49-F238E27FC236}">
-                <a16:creationId xmlns:a16="http://schemas.microsoft.com/office/drawing/2014/main" xmlns="" id="{41A6C47D-FD4D-4D43-801F-330700505E61}"/>
+                <a16:creationId xmlns="" xmlns:a16="http://schemas.microsoft.com/office/drawing/2014/main" id="{41A6C47D-FD4D-4D43-801F-330700505E61}"/>
               </a:ext>
             </a:extLst>
           </p:cNvPr>
@@ -1273,7 +1273,7 @@
           <p:cNvPr id="3" name="Marcador de contenido 2">
             <a:extLst>
               <a:ext uri="{FF2B5EF4-FFF2-40B4-BE49-F238E27FC236}">
-                <a16:creationId xmlns:a16="http://schemas.microsoft.com/office/drawing/2014/main" xmlns="" id="{D281C82E-1633-42E6-B5C4-E8BF7CD2F9B4}"/>
+                <a16:creationId xmlns="" xmlns:a16="http://schemas.microsoft.com/office/drawing/2014/main" id="{D281C82E-1633-42E6-B5C4-E8BF7CD2F9B4}"/>
               </a:ext>
             </a:extLst>
           </p:cNvPr>
@@ -1335,7 +1335,7 @@
           <p:cNvPr id="4" name="Marcador de contenido 3">
             <a:extLst>
               <a:ext uri="{FF2B5EF4-FFF2-40B4-BE49-F238E27FC236}">
-                <a16:creationId xmlns:a16="http://schemas.microsoft.com/office/drawing/2014/main" xmlns="" id="{BCA14AFC-7189-41E3-BA37-BCF1815CF68C}"/>
+                <a16:creationId xmlns="" xmlns:a16="http://schemas.microsoft.com/office/drawing/2014/main" id="{BCA14AFC-7189-41E3-BA37-BCF1815CF68C}"/>
               </a:ext>
             </a:extLst>
           </p:cNvPr>
@@ -1397,7 +1397,7 @@
           <p:cNvPr id="5" name="Marcador de fecha 4">
             <a:extLst>
               <a:ext uri="{FF2B5EF4-FFF2-40B4-BE49-F238E27FC236}">
-                <a16:creationId xmlns:a16="http://schemas.microsoft.com/office/drawing/2014/main" xmlns="" id="{C9ABDD57-5E98-4A92-91B4-6445F2830FC3}"/>
+                <a16:creationId xmlns="" xmlns:a16="http://schemas.microsoft.com/office/drawing/2014/main" id="{C9ABDD57-5E98-4A92-91B4-6445F2830FC3}"/>
               </a:ext>
             </a:extLst>
           </p:cNvPr>
@@ -1416,7 +1416,7 @@
             <a:fld id="{EFBC5A1B-75D9-4BC9-8C41-860857045191}" type="datetimeFigureOut">
               <a:rPr lang="es-ES" smtClean="0"/>
               <a:pPr/>
-              <a:t>20/09/2021</a:t>
+              <a:t>26/11/2023</a:t>
             </a:fld>
             <a:endParaRPr lang="es-ES"/>
           </a:p>
@@ -1427,7 +1427,7 @@
           <p:cNvPr id="6" name="Marcador de pie de página 5">
             <a:extLst>
               <a:ext uri="{FF2B5EF4-FFF2-40B4-BE49-F238E27FC236}">
-                <a16:creationId xmlns:a16="http://schemas.microsoft.com/office/drawing/2014/main" xmlns="" id="{8BE8DE0D-8FE7-404D-82FA-81005C035303}"/>
+                <a16:creationId xmlns="" xmlns:a16="http://schemas.microsoft.com/office/drawing/2014/main" id="{8BE8DE0D-8FE7-404D-82FA-81005C035303}"/>
               </a:ext>
             </a:extLst>
           </p:cNvPr>
@@ -1452,7 +1452,7 @@
           <p:cNvPr id="7" name="Marcador de número de diapositiva 6">
             <a:extLst>
               <a:ext uri="{FF2B5EF4-FFF2-40B4-BE49-F238E27FC236}">
-                <a16:creationId xmlns:a16="http://schemas.microsoft.com/office/drawing/2014/main" xmlns="" id="{D89226D1-4424-4713-8FA0-A7E883DDCC6D}"/>
+                <a16:creationId xmlns="" xmlns:a16="http://schemas.microsoft.com/office/drawing/2014/main" id="{D89226D1-4424-4713-8FA0-A7E883DDCC6D}"/>
               </a:ext>
             </a:extLst>
           </p:cNvPr>
@@ -1480,7 +1480,7 @@
     </p:spTree>
     <p:extLst>
       <p:ext uri="{BB962C8B-B14F-4D97-AF65-F5344CB8AC3E}">
-        <p14:creationId xmlns:p14="http://schemas.microsoft.com/office/powerpoint/2010/main" xmlns="" val="2478964046"/>
+        <p14:creationId xmlns="" xmlns:p14="http://schemas.microsoft.com/office/powerpoint/2010/main" val="2478964046"/>
       </p:ext>
     </p:extLst>
   </p:cSld>
@@ -1512,7 +1512,7 @@
           <p:cNvPr id="2" name="Título 1">
             <a:extLst>
               <a:ext uri="{FF2B5EF4-FFF2-40B4-BE49-F238E27FC236}">
-                <a16:creationId xmlns:a16="http://schemas.microsoft.com/office/drawing/2014/main" xmlns="" id="{202F9D12-A55E-498F-94E5-6AA1DDDCC6AA}"/>
+                <a16:creationId xmlns="" xmlns:a16="http://schemas.microsoft.com/office/drawing/2014/main" id="{202F9D12-A55E-498F-94E5-6AA1DDDCC6AA}"/>
               </a:ext>
             </a:extLst>
           </p:cNvPr>
@@ -1545,7 +1545,7 @@
           <p:cNvPr id="3" name="Marcador de texto 2">
             <a:extLst>
               <a:ext uri="{FF2B5EF4-FFF2-40B4-BE49-F238E27FC236}">
-                <a16:creationId xmlns:a16="http://schemas.microsoft.com/office/drawing/2014/main" xmlns="" id="{F45F8F00-0AAE-4BCC-ACE0-EF39A7855793}"/>
+                <a16:creationId xmlns="" xmlns:a16="http://schemas.microsoft.com/office/drawing/2014/main" id="{F45F8F00-0AAE-4BCC-ACE0-EF39A7855793}"/>
               </a:ext>
             </a:extLst>
           </p:cNvPr>
@@ -1616,7 +1616,7 @@
           <p:cNvPr id="4" name="Marcador de contenido 3">
             <a:extLst>
               <a:ext uri="{FF2B5EF4-FFF2-40B4-BE49-F238E27FC236}">
-                <a16:creationId xmlns:a16="http://schemas.microsoft.com/office/drawing/2014/main" xmlns="" id="{480D2540-C401-4457-A666-27A2FE07A1EB}"/>
+                <a16:creationId xmlns="" xmlns:a16="http://schemas.microsoft.com/office/drawing/2014/main" id="{480D2540-C401-4457-A666-27A2FE07A1EB}"/>
               </a:ext>
             </a:extLst>
           </p:cNvPr>
@@ -1678,7 +1678,7 @@
           <p:cNvPr id="5" name="Marcador de texto 4">
             <a:extLst>
               <a:ext uri="{FF2B5EF4-FFF2-40B4-BE49-F238E27FC236}">
-                <a16:creationId xmlns:a16="http://schemas.microsoft.com/office/drawing/2014/main" xmlns="" id="{162F695D-A642-46C8-A831-1B43A3621DC9}"/>
+                <a16:creationId xmlns="" xmlns:a16="http://schemas.microsoft.com/office/drawing/2014/main" id="{162F695D-A642-46C8-A831-1B43A3621DC9}"/>
               </a:ext>
             </a:extLst>
           </p:cNvPr>
@@ -1749,7 +1749,7 @@
           <p:cNvPr id="6" name="Marcador de contenido 5">
             <a:extLst>
               <a:ext uri="{FF2B5EF4-FFF2-40B4-BE49-F238E27FC236}">
-                <a16:creationId xmlns:a16="http://schemas.microsoft.com/office/drawing/2014/main" xmlns="" id="{28899A86-5725-455F-94EE-5587484C3ADA}"/>
+                <a16:creationId xmlns="" xmlns:a16="http://schemas.microsoft.com/office/drawing/2014/main" id="{28899A86-5725-455F-94EE-5587484C3ADA}"/>
               </a:ext>
             </a:extLst>
           </p:cNvPr>
@@ -1811,7 +1811,7 @@
           <p:cNvPr id="7" name="Marcador de fecha 6">
             <a:extLst>
               <a:ext uri="{FF2B5EF4-FFF2-40B4-BE49-F238E27FC236}">
-                <a16:creationId xmlns:a16="http://schemas.microsoft.com/office/drawing/2014/main" xmlns="" id="{71554A8D-DBE0-4421-9267-7776721E8BE7}"/>
+                <a16:creationId xmlns="" xmlns:a16="http://schemas.microsoft.com/office/drawing/2014/main" id="{71554A8D-DBE0-4421-9267-7776721E8BE7}"/>
               </a:ext>
             </a:extLst>
           </p:cNvPr>
@@ -1830,7 +1830,7 @@
             <a:fld id="{EFBC5A1B-75D9-4BC9-8C41-860857045191}" type="datetimeFigureOut">
               <a:rPr lang="es-ES" smtClean="0"/>
               <a:pPr/>
-              <a:t>20/09/2021</a:t>
+              <a:t>26/11/2023</a:t>
             </a:fld>
             <a:endParaRPr lang="es-ES"/>
           </a:p>
@@ -1841,7 +1841,7 @@
           <p:cNvPr id="8" name="Marcador de pie de página 7">
             <a:extLst>
               <a:ext uri="{FF2B5EF4-FFF2-40B4-BE49-F238E27FC236}">
-                <a16:creationId xmlns:a16="http://schemas.microsoft.com/office/drawing/2014/main" xmlns="" id="{71B657D1-4479-4DAA-A27D-75F0872E33AC}"/>
+                <a16:creationId xmlns="" xmlns:a16="http://schemas.microsoft.com/office/drawing/2014/main" id="{71B657D1-4479-4DAA-A27D-75F0872E33AC}"/>
               </a:ext>
             </a:extLst>
           </p:cNvPr>
@@ -1866,7 +1866,7 @@
           <p:cNvPr id="9" name="Marcador de número de diapositiva 8">
             <a:extLst>
               <a:ext uri="{FF2B5EF4-FFF2-40B4-BE49-F238E27FC236}">
-                <a16:creationId xmlns:a16="http://schemas.microsoft.com/office/drawing/2014/main" xmlns="" id="{72E44760-02D4-4C5D-83CF-6712A8290F9D}"/>
+                <a16:creationId xmlns="" xmlns:a16="http://schemas.microsoft.com/office/drawing/2014/main" id="{72E44760-02D4-4C5D-83CF-6712A8290F9D}"/>
               </a:ext>
             </a:extLst>
           </p:cNvPr>
@@ -1894,7 +1894,7 @@
     </p:spTree>
     <p:extLst>
       <p:ext uri="{BB962C8B-B14F-4D97-AF65-F5344CB8AC3E}">
-        <p14:creationId xmlns:p14="http://schemas.microsoft.com/office/powerpoint/2010/main" xmlns="" val="4187433897"/>
+        <p14:creationId xmlns="" xmlns:p14="http://schemas.microsoft.com/office/powerpoint/2010/main" val="4187433897"/>
       </p:ext>
     </p:extLst>
   </p:cSld>
@@ -1926,7 +1926,7 @@
           <p:cNvPr id="2" name="Título 1">
             <a:extLst>
               <a:ext uri="{FF2B5EF4-FFF2-40B4-BE49-F238E27FC236}">
-                <a16:creationId xmlns:a16="http://schemas.microsoft.com/office/drawing/2014/main" xmlns="" id="{6270498C-939A-497C-AF25-022EDE14FDF4}"/>
+                <a16:creationId xmlns="" xmlns:a16="http://schemas.microsoft.com/office/drawing/2014/main" id="{6270498C-939A-497C-AF25-022EDE14FDF4}"/>
               </a:ext>
             </a:extLst>
           </p:cNvPr>
@@ -1954,7 +1954,7 @@
           <p:cNvPr id="3" name="Marcador de fecha 2">
             <a:extLst>
               <a:ext uri="{FF2B5EF4-FFF2-40B4-BE49-F238E27FC236}">
-                <a16:creationId xmlns:a16="http://schemas.microsoft.com/office/drawing/2014/main" xmlns="" id="{38BD6F06-A827-4D38-A1D9-D7BF5373DAD4}"/>
+                <a16:creationId xmlns="" xmlns:a16="http://schemas.microsoft.com/office/drawing/2014/main" id="{38BD6F06-A827-4D38-A1D9-D7BF5373DAD4}"/>
               </a:ext>
             </a:extLst>
           </p:cNvPr>
@@ -1973,7 +1973,7 @@
             <a:fld id="{EFBC5A1B-75D9-4BC9-8C41-860857045191}" type="datetimeFigureOut">
               <a:rPr lang="es-ES" smtClean="0"/>
               <a:pPr/>
-              <a:t>20/09/2021</a:t>
+              <a:t>26/11/2023</a:t>
             </a:fld>
             <a:endParaRPr lang="es-ES"/>
           </a:p>
@@ -1984,7 +1984,7 @@
           <p:cNvPr id="4" name="Marcador de pie de página 3">
             <a:extLst>
               <a:ext uri="{FF2B5EF4-FFF2-40B4-BE49-F238E27FC236}">
-                <a16:creationId xmlns:a16="http://schemas.microsoft.com/office/drawing/2014/main" xmlns="" id="{3F2DAFBA-2A4E-4070-8FD2-B6A0C9CD462C}"/>
+                <a16:creationId xmlns="" xmlns:a16="http://schemas.microsoft.com/office/drawing/2014/main" id="{3F2DAFBA-2A4E-4070-8FD2-B6A0C9CD462C}"/>
               </a:ext>
             </a:extLst>
           </p:cNvPr>
@@ -2009,7 +2009,7 @@
           <p:cNvPr id="5" name="Marcador de número de diapositiva 4">
             <a:extLst>
               <a:ext uri="{FF2B5EF4-FFF2-40B4-BE49-F238E27FC236}">
-                <a16:creationId xmlns:a16="http://schemas.microsoft.com/office/drawing/2014/main" xmlns="" id="{E3299BBA-08D4-4CE8-8C03-024C7A0AB49C}"/>
+                <a16:creationId xmlns="" xmlns:a16="http://schemas.microsoft.com/office/drawing/2014/main" id="{E3299BBA-08D4-4CE8-8C03-024C7A0AB49C}"/>
               </a:ext>
             </a:extLst>
           </p:cNvPr>
@@ -2037,7 +2037,7 @@
     </p:spTree>
     <p:extLst>
       <p:ext uri="{BB962C8B-B14F-4D97-AF65-F5344CB8AC3E}">
-        <p14:creationId xmlns:p14="http://schemas.microsoft.com/office/powerpoint/2010/main" xmlns="" val="1211332172"/>
+        <p14:creationId xmlns="" xmlns:p14="http://schemas.microsoft.com/office/powerpoint/2010/main" val="1211332172"/>
       </p:ext>
     </p:extLst>
   </p:cSld>
@@ -2069,7 +2069,7 @@
           <p:cNvPr id="2" name="Marcador de fecha 1">
             <a:extLst>
               <a:ext uri="{FF2B5EF4-FFF2-40B4-BE49-F238E27FC236}">
-                <a16:creationId xmlns:a16="http://schemas.microsoft.com/office/drawing/2014/main" xmlns="" id="{B2784211-5E54-4766-8B46-12C57FCBC2B6}"/>
+                <a16:creationId xmlns="" xmlns:a16="http://schemas.microsoft.com/office/drawing/2014/main" id="{B2784211-5E54-4766-8B46-12C57FCBC2B6}"/>
               </a:ext>
             </a:extLst>
           </p:cNvPr>
@@ -2088,7 +2088,7 @@
             <a:fld id="{EFBC5A1B-75D9-4BC9-8C41-860857045191}" type="datetimeFigureOut">
               <a:rPr lang="es-ES" smtClean="0"/>
               <a:pPr/>
-              <a:t>20/09/2021</a:t>
+              <a:t>26/11/2023</a:t>
             </a:fld>
             <a:endParaRPr lang="es-ES"/>
           </a:p>
@@ -2099,7 +2099,7 @@
           <p:cNvPr id="3" name="Marcador de pie de página 2">
             <a:extLst>
               <a:ext uri="{FF2B5EF4-FFF2-40B4-BE49-F238E27FC236}">
-                <a16:creationId xmlns:a16="http://schemas.microsoft.com/office/drawing/2014/main" xmlns="" id="{92520B57-CC9A-4071-8120-E857E89EDEB8}"/>
+                <a16:creationId xmlns="" xmlns:a16="http://schemas.microsoft.com/office/drawing/2014/main" id="{92520B57-CC9A-4071-8120-E857E89EDEB8}"/>
               </a:ext>
             </a:extLst>
           </p:cNvPr>
@@ -2124,7 +2124,7 @@
           <p:cNvPr id="4" name="Marcador de número de diapositiva 3">
             <a:extLst>
               <a:ext uri="{FF2B5EF4-FFF2-40B4-BE49-F238E27FC236}">
-                <a16:creationId xmlns:a16="http://schemas.microsoft.com/office/drawing/2014/main" xmlns="" id="{8787466D-3F3F-4F9A-B628-C2FA36CE4FE2}"/>
+                <a16:creationId xmlns="" xmlns:a16="http://schemas.microsoft.com/office/drawing/2014/main" id="{8787466D-3F3F-4F9A-B628-C2FA36CE4FE2}"/>
               </a:ext>
             </a:extLst>
           </p:cNvPr>
@@ -2152,7 +2152,7 @@
     </p:spTree>
     <p:extLst>
       <p:ext uri="{BB962C8B-B14F-4D97-AF65-F5344CB8AC3E}">
-        <p14:creationId xmlns:p14="http://schemas.microsoft.com/office/powerpoint/2010/main" xmlns="" val="2413498818"/>
+        <p14:creationId xmlns="" xmlns:p14="http://schemas.microsoft.com/office/powerpoint/2010/main" val="2413498818"/>
       </p:ext>
     </p:extLst>
   </p:cSld>
@@ -2184,7 +2184,7 @@
           <p:cNvPr id="2" name="Título 1">
             <a:extLst>
               <a:ext uri="{FF2B5EF4-FFF2-40B4-BE49-F238E27FC236}">
-                <a16:creationId xmlns:a16="http://schemas.microsoft.com/office/drawing/2014/main" xmlns="" id="{44E3FDF0-D5CD-4C55-83E1-A554A3F3F591}"/>
+                <a16:creationId xmlns="" xmlns:a16="http://schemas.microsoft.com/office/drawing/2014/main" id="{44E3FDF0-D5CD-4C55-83E1-A554A3F3F591}"/>
               </a:ext>
             </a:extLst>
           </p:cNvPr>
@@ -2221,7 +2221,7 @@
           <p:cNvPr id="3" name="Marcador de contenido 2">
             <a:extLst>
               <a:ext uri="{FF2B5EF4-FFF2-40B4-BE49-F238E27FC236}">
-                <a16:creationId xmlns:a16="http://schemas.microsoft.com/office/drawing/2014/main" xmlns="" id="{69135358-973E-4F29-858A-4C75727043F6}"/>
+                <a16:creationId xmlns="" xmlns:a16="http://schemas.microsoft.com/office/drawing/2014/main" id="{69135358-973E-4F29-858A-4C75727043F6}"/>
               </a:ext>
             </a:extLst>
           </p:cNvPr>
@@ -2311,7 +2311,7 @@
           <p:cNvPr id="4" name="Marcador de texto 3">
             <a:extLst>
               <a:ext uri="{FF2B5EF4-FFF2-40B4-BE49-F238E27FC236}">
-                <a16:creationId xmlns:a16="http://schemas.microsoft.com/office/drawing/2014/main" xmlns="" id="{F1FA2661-0462-4433-90DC-A12960285CEA}"/>
+                <a16:creationId xmlns="" xmlns:a16="http://schemas.microsoft.com/office/drawing/2014/main" id="{F1FA2661-0462-4433-90DC-A12960285CEA}"/>
               </a:ext>
             </a:extLst>
           </p:cNvPr>
@@ -2382,7 +2382,7 @@
           <p:cNvPr id="5" name="Marcador de fecha 4">
             <a:extLst>
               <a:ext uri="{FF2B5EF4-FFF2-40B4-BE49-F238E27FC236}">
-                <a16:creationId xmlns:a16="http://schemas.microsoft.com/office/drawing/2014/main" xmlns="" id="{49AD787B-F459-4052-B553-CF5A494DB782}"/>
+                <a16:creationId xmlns="" xmlns:a16="http://schemas.microsoft.com/office/drawing/2014/main" id="{49AD787B-F459-4052-B553-CF5A494DB782}"/>
               </a:ext>
             </a:extLst>
           </p:cNvPr>
@@ -2401,7 +2401,7 @@
             <a:fld id="{EFBC5A1B-75D9-4BC9-8C41-860857045191}" type="datetimeFigureOut">
               <a:rPr lang="es-ES" smtClean="0"/>
               <a:pPr/>
-              <a:t>20/09/2021</a:t>
+              <a:t>26/11/2023</a:t>
             </a:fld>
             <a:endParaRPr lang="es-ES"/>
           </a:p>
@@ -2412,7 +2412,7 @@
           <p:cNvPr id="6" name="Marcador de pie de página 5">
             <a:extLst>
               <a:ext uri="{FF2B5EF4-FFF2-40B4-BE49-F238E27FC236}">
-                <a16:creationId xmlns:a16="http://schemas.microsoft.com/office/drawing/2014/main" xmlns="" id="{382BE518-0B2A-4A03-AACE-B9DE17D076CB}"/>
+                <a16:creationId xmlns="" xmlns:a16="http://schemas.microsoft.com/office/drawing/2014/main" id="{382BE518-0B2A-4A03-AACE-B9DE17D076CB}"/>
               </a:ext>
             </a:extLst>
           </p:cNvPr>
@@ -2437,7 +2437,7 @@
           <p:cNvPr id="7" name="Marcador de número de diapositiva 6">
             <a:extLst>
               <a:ext uri="{FF2B5EF4-FFF2-40B4-BE49-F238E27FC236}">
-                <a16:creationId xmlns:a16="http://schemas.microsoft.com/office/drawing/2014/main" xmlns="" id="{3A808C19-9692-46CC-B81D-3AB421594BFD}"/>
+                <a16:creationId xmlns="" xmlns:a16="http://schemas.microsoft.com/office/drawing/2014/main" id="{3A808C19-9692-46CC-B81D-3AB421594BFD}"/>
               </a:ext>
             </a:extLst>
           </p:cNvPr>
@@ -2465,7 +2465,7 @@
     </p:spTree>
     <p:extLst>
       <p:ext uri="{BB962C8B-B14F-4D97-AF65-F5344CB8AC3E}">
-        <p14:creationId xmlns:p14="http://schemas.microsoft.com/office/powerpoint/2010/main" xmlns="" val="1899574245"/>
+        <p14:creationId xmlns="" xmlns:p14="http://schemas.microsoft.com/office/powerpoint/2010/main" val="1899574245"/>
       </p:ext>
     </p:extLst>
   </p:cSld>
@@ -2497,7 +2497,7 @@
           <p:cNvPr id="2" name="Título 1">
             <a:extLst>
               <a:ext uri="{FF2B5EF4-FFF2-40B4-BE49-F238E27FC236}">
-                <a16:creationId xmlns:a16="http://schemas.microsoft.com/office/drawing/2014/main" xmlns="" id="{5AD62FD5-B09C-4A87-8537-735604610918}"/>
+                <a16:creationId xmlns="" xmlns:a16="http://schemas.microsoft.com/office/drawing/2014/main" id="{5AD62FD5-B09C-4A87-8537-735604610918}"/>
               </a:ext>
             </a:extLst>
           </p:cNvPr>
@@ -2534,7 +2534,7 @@
           <p:cNvPr id="3" name="Marcador de posición de imagen 2">
             <a:extLst>
               <a:ext uri="{FF2B5EF4-FFF2-40B4-BE49-F238E27FC236}">
-                <a16:creationId xmlns:a16="http://schemas.microsoft.com/office/drawing/2014/main" xmlns="" id="{B3D90944-8F4E-47BC-BD69-8E893730E0D2}"/>
+                <a16:creationId xmlns="" xmlns:a16="http://schemas.microsoft.com/office/drawing/2014/main" id="{B3D90944-8F4E-47BC-BD69-8E893730E0D2}"/>
               </a:ext>
             </a:extLst>
           </p:cNvPr>
@@ -2601,7 +2601,7 @@
           <p:cNvPr id="4" name="Marcador de texto 3">
             <a:extLst>
               <a:ext uri="{FF2B5EF4-FFF2-40B4-BE49-F238E27FC236}">
-                <a16:creationId xmlns:a16="http://schemas.microsoft.com/office/drawing/2014/main" xmlns="" id="{094847E1-7783-460E-A2B7-D41F0DC2755F}"/>
+                <a16:creationId xmlns="" xmlns:a16="http://schemas.microsoft.com/office/drawing/2014/main" id="{094847E1-7783-460E-A2B7-D41F0DC2755F}"/>
               </a:ext>
             </a:extLst>
           </p:cNvPr>
@@ -2672,7 +2672,7 @@
           <p:cNvPr id="5" name="Marcador de fecha 4">
             <a:extLst>
               <a:ext uri="{FF2B5EF4-FFF2-40B4-BE49-F238E27FC236}">
-                <a16:creationId xmlns:a16="http://schemas.microsoft.com/office/drawing/2014/main" xmlns="" id="{28A8DEFC-7F7E-47C5-85E7-E75878DFD550}"/>
+                <a16:creationId xmlns="" xmlns:a16="http://schemas.microsoft.com/office/drawing/2014/main" id="{28A8DEFC-7F7E-47C5-85E7-E75878DFD550}"/>
               </a:ext>
             </a:extLst>
           </p:cNvPr>
@@ -2691,7 +2691,7 @@
             <a:fld id="{EFBC5A1B-75D9-4BC9-8C41-860857045191}" type="datetimeFigureOut">
               <a:rPr lang="es-ES" smtClean="0"/>
               <a:pPr/>
-              <a:t>20/09/2021</a:t>
+              <a:t>26/11/2023</a:t>
             </a:fld>
             <a:endParaRPr lang="es-ES"/>
           </a:p>
@@ -2702,7 +2702,7 @@
           <p:cNvPr id="6" name="Marcador de pie de página 5">
             <a:extLst>
               <a:ext uri="{FF2B5EF4-FFF2-40B4-BE49-F238E27FC236}">
-                <a16:creationId xmlns:a16="http://schemas.microsoft.com/office/drawing/2014/main" xmlns="" id="{6108570B-8B55-4DD4-ADE5-4F45C0073E55}"/>
+                <a16:creationId xmlns="" xmlns:a16="http://schemas.microsoft.com/office/drawing/2014/main" id="{6108570B-8B55-4DD4-ADE5-4F45C0073E55}"/>
               </a:ext>
             </a:extLst>
           </p:cNvPr>
@@ -2727,7 +2727,7 @@
           <p:cNvPr id="7" name="Marcador de número de diapositiva 6">
             <a:extLst>
               <a:ext uri="{FF2B5EF4-FFF2-40B4-BE49-F238E27FC236}">
-                <a16:creationId xmlns:a16="http://schemas.microsoft.com/office/drawing/2014/main" xmlns="" id="{46E94416-1E50-4C95-B4AF-F8B12D885D43}"/>
+                <a16:creationId xmlns="" xmlns:a16="http://schemas.microsoft.com/office/drawing/2014/main" id="{46E94416-1E50-4C95-B4AF-F8B12D885D43}"/>
               </a:ext>
             </a:extLst>
           </p:cNvPr>
@@ -2755,7 +2755,7 @@
     </p:spTree>
     <p:extLst>
       <p:ext uri="{BB962C8B-B14F-4D97-AF65-F5344CB8AC3E}">
-        <p14:creationId xmlns:p14="http://schemas.microsoft.com/office/powerpoint/2010/main" xmlns="" val="1689888809"/>
+        <p14:creationId xmlns="" xmlns:p14="http://schemas.microsoft.com/office/powerpoint/2010/main" val="1689888809"/>
       </p:ext>
     </p:extLst>
   </p:cSld>
@@ -2792,7 +2792,7 @@
           <p:cNvPr id="2" name="Marcador de título 1">
             <a:extLst>
               <a:ext uri="{FF2B5EF4-FFF2-40B4-BE49-F238E27FC236}">
-                <a16:creationId xmlns:a16="http://schemas.microsoft.com/office/drawing/2014/main" xmlns="" id="{1C4EA66B-8008-4E62-B470-D012372D9C54}"/>
+                <a16:creationId xmlns="" xmlns:a16="http://schemas.microsoft.com/office/drawing/2014/main" id="{1C4EA66B-8008-4E62-B470-D012372D9C54}"/>
               </a:ext>
             </a:extLst>
           </p:cNvPr>
@@ -2830,7 +2830,7 @@
           <p:cNvPr id="3" name="Marcador de texto 2">
             <a:extLst>
               <a:ext uri="{FF2B5EF4-FFF2-40B4-BE49-F238E27FC236}">
-                <a16:creationId xmlns:a16="http://schemas.microsoft.com/office/drawing/2014/main" xmlns="" id="{932AAA69-39C0-42B4-B0CB-603BEA360F90}"/>
+                <a16:creationId xmlns="" xmlns:a16="http://schemas.microsoft.com/office/drawing/2014/main" id="{932AAA69-39C0-42B4-B0CB-603BEA360F90}"/>
               </a:ext>
             </a:extLst>
           </p:cNvPr>
@@ -2897,7 +2897,7 @@
           <p:cNvPr id="4" name="Marcador de fecha 3">
             <a:extLst>
               <a:ext uri="{FF2B5EF4-FFF2-40B4-BE49-F238E27FC236}">
-                <a16:creationId xmlns:a16="http://schemas.microsoft.com/office/drawing/2014/main" xmlns="" id="{336B4845-2F33-4E2B-820D-DFDA0715031A}"/>
+                <a16:creationId xmlns="" xmlns:a16="http://schemas.microsoft.com/office/drawing/2014/main" id="{336B4845-2F33-4E2B-820D-DFDA0715031A}"/>
               </a:ext>
             </a:extLst>
           </p:cNvPr>
@@ -2934,7 +2934,7 @@
             <a:fld id="{EFBC5A1B-75D9-4BC9-8C41-860857045191}" type="datetimeFigureOut">
               <a:rPr lang="es-ES" smtClean="0"/>
               <a:pPr/>
-              <a:t>20/09/2021</a:t>
+              <a:t>26/11/2023</a:t>
             </a:fld>
             <a:endParaRPr lang="es-ES"/>
           </a:p>
@@ -2945,7 +2945,7 @@
           <p:cNvPr id="5" name="Marcador de pie de página 4">
             <a:extLst>
               <a:ext uri="{FF2B5EF4-FFF2-40B4-BE49-F238E27FC236}">
-                <a16:creationId xmlns:a16="http://schemas.microsoft.com/office/drawing/2014/main" xmlns="" id="{2377ABD5-FE97-43F4-9196-F24C9B97CADB}"/>
+                <a16:creationId xmlns="" xmlns:a16="http://schemas.microsoft.com/office/drawing/2014/main" id="{2377ABD5-FE97-43F4-9196-F24C9B97CADB}"/>
               </a:ext>
             </a:extLst>
           </p:cNvPr>
@@ -2988,7 +2988,7 @@
           <p:cNvPr id="6" name="Marcador de número de diapositiva 5">
             <a:extLst>
               <a:ext uri="{FF2B5EF4-FFF2-40B4-BE49-F238E27FC236}">
-                <a16:creationId xmlns:a16="http://schemas.microsoft.com/office/drawing/2014/main" xmlns="" id="{A20E76EC-D35B-45EB-B53D-F96C980103A1}"/>
+                <a16:creationId xmlns="" xmlns:a16="http://schemas.microsoft.com/office/drawing/2014/main" id="{A20E76EC-D35B-45EB-B53D-F96C980103A1}"/>
               </a:ext>
             </a:extLst>
           </p:cNvPr>
@@ -3034,7 +3034,7 @@
     </p:spTree>
     <p:extLst>
       <p:ext uri="{BB962C8B-B14F-4D97-AF65-F5344CB8AC3E}">
-        <p14:creationId xmlns:p14="http://schemas.microsoft.com/office/powerpoint/2010/main" xmlns="" val="3258147845"/>
+        <p14:creationId xmlns="" xmlns:p14="http://schemas.microsoft.com/office/powerpoint/2010/main" val="3258147845"/>
       </p:ext>
     </p:extLst>
   </p:cSld>
@@ -3357,7 +3357,7 @@
           <p:cNvPr id="37" name="Rectángulo 36">
             <a:extLst>
               <a:ext uri="{FF2B5EF4-FFF2-40B4-BE49-F238E27FC236}">
-                <a16:creationId xmlns:a16="http://schemas.microsoft.com/office/drawing/2014/main" xmlns="" id="{73A11322-BD7B-4952-9DD1-128E56555842}"/>
+                <a16:creationId xmlns="" xmlns:a16="http://schemas.microsoft.com/office/drawing/2014/main" id="{73A11322-BD7B-4952-9DD1-128E56555842}"/>
               </a:ext>
             </a:extLst>
           </p:cNvPr>
@@ -3409,7 +3409,7 @@
           <p:cNvPr id="39" name="Rectángulo 38">
             <a:extLst>
               <a:ext uri="{FF2B5EF4-FFF2-40B4-BE49-F238E27FC236}">
-                <a16:creationId xmlns:a16="http://schemas.microsoft.com/office/drawing/2014/main" xmlns="" id="{C53C5C9A-E5EB-4DA5-8C17-F97FBBF37148}"/>
+                <a16:creationId xmlns="" xmlns:a16="http://schemas.microsoft.com/office/drawing/2014/main" id="{C53C5C9A-E5EB-4DA5-8C17-F97FBBF37148}"/>
               </a:ext>
             </a:extLst>
           </p:cNvPr>
@@ -3461,7 +3461,7 @@
           <p:cNvPr id="41" name="Rectángulo 40">
             <a:extLst>
               <a:ext uri="{FF2B5EF4-FFF2-40B4-BE49-F238E27FC236}">
-                <a16:creationId xmlns:a16="http://schemas.microsoft.com/office/drawing/2014/main" xmlns="" id="{0F2EAB25-4CC2-4633-AB8F-8DB1CCE2D6E8}"/>
+                <a16:creationId xmlns="" xmlns:a16="http://schemas.microsoft.com/office/drawing/2014/main" id="{0F2EAB25-4CC2-4633-AB8F-8DB1CCE2D6E8}"/>
               </a:ext>
             </a:extLst>
           </p:cNvPr>
@@ -3513,7 +3513,7 @@
           <p:cNvPr id="43" name="Rectángulo 42">
             <a:extLst>
               <a:ext uri="{FF2B5EF4-FFF2-40B4-BE49-F238E27FC236}">
-                <a16:creationId xmlns:a16="http://schemas.microsoft.com/office/drawing/2014/main" xmlns="" id="{8408589A-C568-45CE-8FE2-359FEF996A5B}"/>
+                <a16:creationId xmlns="" xmlns:a16="http://schemas.microsoft.com/office/drawing/2014/main" id="{8408589A-C568-45CE-8FE2-359FEF996A5B}"/>
               </a:ext>
             </a:extLst>
           </p:cNvPr>
@@ -3565,7 +3565,7 @@
           <p:cNvPr id="45" name="Rectángulo 44">
             <a:extLst>
               <a:ext uri="{FF2B5EF4-FFF2-40B4-BE49-F238E27FC236}">
-                <a16:creationId xmlns:a16="http://schemas.microsoft.com/office/drawing/2014/main" xmlns="" id="{A49ADF89-E9B5-4F79-A008-E954C111F442}"/>
+                <a16:creationId xmlns="" xmlns:a16="http://schemas.microsoft.com/office/drawing/2014/main" id="{A49ADF89-E9B5-4F79-A008-E954C111F442}"/>
               </a:ext>
             </a:extLst>
           </p:cNvPr>
@@ -3617,7 +3617,7 @@
           <p:cNvPr id="47" name="Rectángulo 46">
             <a:extLst>
               <a:ext uri="{FF2B5EF4-FFF2-40B4-BE49-F238E27FC236}">
-                <a16:creationId xmlns:a16="http://schemas.microsoft.com/office/drawing/2014/main" xmlns="" id="{77FC50C9-9615-4656-B857-8741C629A335}"/>
+                <a16:creationId xmlns="" xmlns:a16="http://schemas.microsoft.com/office/drawing/2014/main" id="{77FC50C9-9615-4656-B857-8741C629A335}"/>
               </a:ext>
             </a:extLst>
           </p:cNvPr>
@@ -3669,7 +3669,7 @@
           <p:cNvPr id="49" name="Rectángulo 48">
             <a:extLst>
               <a:ext uri="{FF2B5EF4-FFF2-40B4-BE49-F238E27FC236}">
-                <a16:creationId xmlns:a16="http://schemas.microsoft.com/office/drawing/2014/main" xmlns="" id="{7B76901C-3641-43B1-91FD-7E1EB9CF8B4C}"/>
+                <a16:creationId xmlns="" xmlns:a16="http://schemas.microsoft.com/office/drawing/2014/main" id="{7B76901C-3641-43B1-91FD-7E1EB9CF8B4C}"/>
               </a:ext>
             </a:extLst>
           </p:cNvPr>
@@ -3721,7 +3721,7 @@
           <p:cNvPr id="51" name="Rectángulo 50">
             <a:extLst>
               <a:ext uri="{FF2B5EF4-FFF2-40B4-BE49-F238E27FC236}">
-                <a16:creationId xmlns:a16="http://schemas.microsoft.com/office/drawing/2014/main" xmlns="" id="{E8883506-0AEB-48CD-86B3-650E1B735A04}"/>
+                <a16:creationId xmlns="" xmlns:a16="http://schemas.microsoft.com/office/drawing/2014/main" id="{E8883506-0AEB-48CD-86B3-650E1B735A04}"/>
               </a:ext>
             </a:extLst>
           </p:cNvPr>
@@ -3773,7 +3773,7 @@
           <p:cNvPr id="53" name="Rectángulo 52">
             <a:extLst>
               <a:ext uri="{FF2B5EF4-FFF2-40B4-BE49-F238E27FC236}">
-                <a16:creationId xmlns:a16="http://schemas.microsoft.com/office/drawing/2014/main" xmlns="" id="{3647FA28-8B9B-4523-9A28-2C419E6BD457}"/>
+                <a16:creationId xmlns="" xmlns:a16="http://schemas.microsoft.com/office/drawing/2014/main" id="{3647FA28-8B9B-4523-9A28-2C419E6BD457}"/>
               </a:ext>
             </a:extLst>
           </p:cNvPr>
@@ -3825,7 +3825,7 @@
           <p:cNvPr id="55" name="Rectángulo 54">
             <a:extLst>
               <a:ext uri="{FF2B5EF4-FFF2-40B4-BE49-F238E27FC236}">
-                <a16:creationId xmlns:a16="http://schemas.microsoft.com/office/drawing/2014/main" xmlns="" id="{AC9C5108-0819-4498-8FA9-53C5473E8D27}"/>
+                <a16:creationId xmlns="" xmlns:a16="http://schemas.microsoft.com/office/drawing/2014/main" id="{AC9C5108-0819-4498-8FA9-53C5473E8D27}"/>
               </a:ext>
             </a:extLst>
           </p:cNvPr>
@@ -3877,7 +3877,7 @@
           <p:cNvPr id="57" name="Rectángulo 56">
             <a:extLst>
               <a:ext uri="{FF2B5EF4-FFF2-40B4-BE49-F238E27FC236}">
-                <a16:creationId xmlns:a16="http://schemas.microsoft.com/office/drawing/2014/main" xmlns="" id="{06EB9E5F-EAA4-4250-98C4-2A775787C77C}"/>
+                <a16:creationId xmlns="" xmlns:a16="http://schemas.microsoft.com/office/drawing/2014/main" id="{06EB9E5F-EAA4-4250-98C4-2A775787C77C}"/>
               </a:ext>
             </a:extLst>
           </p:cNvPr>
@@ -3929,7 +3929,7 @@
           <p:cNvPr id="59" name="Rectángulo 58">
             <a:extLst>
               <a:ext uri="{FF2B5EF4-FFF2-40B4-BE49-F238E27FC236}">
-                <a16:creationId xmlns:a16="http://schemas.microsoft.com/office/drawing/2014/main" xmlns="" id="{91E5A6FD-A6CE-477D-AC67-309F3D79896E}"/>
+                <a16:creationId xmlns="" xmlns:a16="http://schemas.microsoft.com/office/drawing/2014/main" id="{91E5A6FD-A6CE-477D-AC67-309F3D79896E}"/>
               </a:ext>
             </a:extLst>
           </p:cNvPr>
@@ -3981,7 +3981,7 @@
           <p:cNvPr id="61" name="Rectángulo 60">
             <a:extLst>
               <a:ext uri="{FF2B5EF4-FFF2-40B4-BE49-F238E27FC236}">
-                <a16:creationId xmlns:a16="http://schemas.microsoft.com/office/drawing/2014/main" xmlns="" id="{66BC7115-24DA-4563-9B74-FE2D1F2541B9}"/>
+                <a16:creationId xmlns="" xmlns:a16="http://schemas.microsoft.com/office/drawing/2014/main" id="{66BC7115-24DA-4563-9B74-FE2D1F2541B9}"/>
               </a:ext>
             </a:extLst>
           </p:cNvPr>
@@ -4036,7 +4036,7 @@
           <p:cNvPr id="63" name="Rectángulo 62">
             <a:extLst>
               <a:ext uri="{FF2B5EF4-FFF2-40B4-BE49-F238E27FC236}">
-                <a16:creationId xmlns:a16="http://schemas.microsoft.com/office/drawing/2014/main" xmlns="" id="{D4D6122B-29C3-4E64-A495-591E6D313C6D}"/>
+                <a16:creationId xmlns="" xmlns:a16="http://schemas.microsoft.com/office/drawing/2014/main" id="{D4D6122B-29C3-4E64-A495-591E6D313C6D}"/>
               </a:ext>
             </a:extLst>
           </p:cNvPr>
@@ -4091,7 +4091,7 @@
           <p:cNvPr id="65" name="Rectángulo 64">
             <a:extLst>
               <a:ext uri="{FF2B5EF4-FFF2-40B4-BE49-F238E27FC236}">
-                <a16:creationId xmlns:a16="http://schemas.microsoft.com/office/drawing/2014/main" xmlns="" id="{A0C5C6CD-42AB-4827-8F03-2D716DB4068E}"/>
+                <a16:creationId xmlns="" xmlns:a16="http://schemas.microsoft.com/office/drawing/2014/main" id="{A0C5C6CD-42AB-4827-8F03-2D716DB4068E}"/>
               </a:ext>
             </a:extLst>
           </p:cNvPr>
@@ -4146,7 +4146,7 @@
           <p:cNvPr id="67" name="Rectángulo 66">
             <a:extLst>
               <a:ext uri="{FF2B5EF4-FFF2-40B4-BE49-F238E27FC236}">
-                <a16:creationId xmlns:a16="http://schemas.microsoft.com/office/drawing/2014/main" xmlns="" id="{998369E3-C0D1-4062-B22B-FC1E030F1EC0}"/>
+                <a16:creationId xmlns="" xmlns:a16="http://schemas.microsoft.com/office/drawing/2014/main" id="{998369E3-C0D1-4062-B22B-FC1E030F1EC0}"/>
               </a:ext>
             </a:extLst>
           </p:cNvPr>
@@ -4201,7 +4201,7 @@
           <p:cNvPr id="69" name="Rectángulo 68">
             <a:extLst>
               <a:ext uri="{FF2B5EF4-FFF2-40B4-BE49-F238E27FC236}">
-                <a16:creationId xmlns:a16="http://schemas.microsoft.com/office/drawing/2014/main" xmlns="" id="{8C8A129F-CE3A-42F7-989D-57705327C731}"/>
+                <a16:creationId xmlns="" xmlns:a16="http://schemas.microsoft.com/office/drawing/2014/main" id="{8C8A129F-CE3A-42F7-989D-57705327C731}"/>
               </a:ext>
             </a:extLst>
           </p:cNvPr>
@@ -4253,7 +4253,7 @@
           <p:cNvPr id="71" name="Rectángulo 70">
             <a:extLst>
               <a:ext uri="{FF2B5EF4-FFF2-40B4-BE49-F238E27FC236}">
-                <a16:creationId xmlns:a16="http://schemas.microsoft.com/office/drawing/2014/main" xmlns="" id="{31118911-2DA9-4629-8126-3B0790309E88}"/>
+                <a16:creationId xmlns="" xmlns:a16="http://schemas.microsoft.com/office/drawing/2014/main" id="{31118911-2DA9-4629-8126-3B0790309E88}"/>
               </a:ext>
             </a:extLst>
           </p:cNvPr>
@@ -4305,7 +4305,7 @@
           <p:cNvPr id="73" name="Rectángulo 72">
             <a:extLst>
               <a:ext uri="{FF2B5EF4-FFF2-40B4-BE49-F238E27FC236}">
-                <a16:creationId xmlns:a16="http://schemas.microsoft.com/office/drawing/2014/main" xmlns="" id="{C298D969-0C75-4420-91F8-6F6DA98C4834}"/>
+                <a16:creationId xmlns="" xmlns:a16="http://schemas.microsoft.com/office/drawing/2014/main" id="{C298D969-0C75-4420-91F8-6F6DA98C4834}"/>
               </a:ext>
             </a:extLst>
           </p:cNvPr>
@@ -4357,7 +4357,7 @@
           <p:cNvPr id="75" name="Rectángulo 74">
             <a:extLst>
               <a:ext uri="{FF2B5EF4-FFF2-40B4-BE49-F238E27FC236}">
-                <a16:creationId xmlns:a16="http://schemas.microsoft.com/office/drawing/2014/main" xmlns="" id="{24A63E33-0EB4-406C-948A-7DCB4F602629}"/>
+                <a16:creationId xmlns="" xmlns:a16="http://schemas.microsoft.com/office/drawing/2014/main" id="{24A63E33-0EB4-406C-948A-7DCB4F602629}"/>
               </a:ext>
             </a:extLst>
           </p:cNvPr>
@@ -4409,7 +4409,7 @@
           <p:cNvPr id="77" name="Rectángulo 76">
             <a:extLst>
               <a:ext uri="{FF2B5EF4-FFF2-40B4-BE49-F238E27FC236}">
-                <a16:creationId xmlns:a16="http://schemas.microsoft.com/office/drawing/2014/main" xmlns="" id="{0AD256CC-2326-4D3A-A4F3-9009626585EF}"/>
+                <a16:creationId xmlns="" xmlns:a16="http://schemas.microsoft.com/office/drawing/2014/main" id="{0AD256CC-2326-4D3A-A4F3-9009626585EF}"/>
               </a:ext>
             </a:extLst>
           </p:cNvPr>
@@ -4461,7 +4461,7 @@
           <p:cNvPr id="79" name="Rectángulo 78">
             <a:extLst>
               <a:ext uri="{FF2B5EF4-FFF2-40B4-BE49-F238E27FC236}">
-                <a16:creationId xmlns:a16="http://schemas.microsoft.com/office/drawing/2014/main" xmlns="" id="{A54D63F3-7726-43D7-A4B5-73CAFA9AC152}"/>
+                <a16:creationId xmlns="" xmlns:a16="http://schemas.microsoft.com/office/drawing/2014/main" id="{A54D63F3-7726-43D7-A4B5-73CAFA9AC152}"/>
               </a:ext>
             </a:extLst>
           </p:cNvPr>
@@ -4513,7 +4513,7 @@
           <p:cNvPr id="81" name="Rectángulo 80">
             <a:extLst>
               <a:ext uri="{FF2B5EF4-FFF2-40B4-BE49-F238E27FC236}">
-                <a16:creationId xmlns:a16="http://schemas.microsoft.com/office/drawing/2014/main" xmlns="" id="{DD73C27A-9EDC-4EE2-B6F0-265E687B828F}"/>
+                <a16:creationId xmlns="" xmlns:a16="http://schemas.microsoft.com/office/drawing/2014/main" id="{DD73C27A-9EDC-4EE2-B6F0-265E687B828F}"/>
               </a:ext>
             </a:extLst>
           </p:cNvPr>
@@ -4565,7 +4565,7 @@
           <p:cNvPr id="83" name="Rectángulo 82">
             <a:extLst>
               <a:ext uri="{FF2B5EF4-FFF2-40B4-BE49-F238E27FC236}">
-                <a16:creationId xmlns:a16="http://schemas.microsoft.com/office/drawing/2014/main" xmlns="" id="{1C8F1824-E26A-43B2-95AD-4E622E969AFF}"/>
+                <a16:creationId xmlns="" xmlns:a16="http://schemas.microsoft.com/office/drawing/2014/main" id="{1C8F1824-E26A-43B2-95AD-4E622E969AFF}"/>
               </a:ext>
             </a:extLst>
           </p:cNvPr>
@@ -4617,7 +4617,7 @@
           <p:cNvPr id="85" name="Rectángulo 84">
             <a:extLst>
               <a:ext uri="{FF2B5EF4-FFF2-40B4-BE49-F238E27FC236}">
-                <a16:creationId xmlns:a16="http://schemas.microsoft.com/office/drawing/2014/main" xmlns="" id="{C5A90D2C-3ED6-46E2-B67D-D6035BC950AA}"/>
+                <a16:creationId xmlns="" xmlns:a16="http://schemas.microsoft.com/office/drawing/2014/main" id="{C5A90D2C-3ED6-46E2-B67D-D6035BC950AA}"/>
               </a:ext>
             </a:extLst>
           </p:cNvPr>
@@ -4669,7 +4669,7 @@
           <p:cNvPr id="87" name="Rectángulo 86">
             <a:extLst>
               <a:ext uri="{FF2B5EF4-FFF2-40B4-BE49-F238E27FC236}">
-                <a16:creationId xmlns:a16="http://schemas.microsoft.com/office/drawing/2014/main" xmlns="" id="{550271C9-0EC5-4ECC-B991-68E83A3F3C6A}"/>
+                <a16:creationId xmlns="" xmlns:a16="http://schemas.microsoft.com/office/drawing/2014/main" id="{550271C9-0EC5-4ECC-B991-68E83A3F3C6A}"/>
               </a:ext>
             </a:extLst>
           </p:cNvPr>
@@ -4721,7 +4721,7 @@
           <p:cNvPr id="89" name="Rectángulo 88">
             <a:extLst>
               <a:ext uri="{FF2B5EF4-FFF2-40B4-BE49-F238E27FC236}">
-                <a16:creationId xmlns:a16="http://schemas.microsoft.com/office/drawing/2014/main" xmlns="" id="{D0AE3233-DF2D-48B7-8323-62F5C33D99C3}"/>
+                <a16:creationId xmlns="" xmlns:a16="http://schemas.microsoft.com/office/drawing/2014/main" id="{D0AE3233-DF2D-48B7-8323-62F5C33D99C3}"/>
               </a:ext>
             </a:extLst>
           </p:cNvPr>
@@ -4773,7 +4773,7 @@
           <p:cNvPr id="91" name="Rectángulo 90">
             <a:extLst>
               <a:ext uri="{FF2B5EF4-FFF2-40B4-BE49-F238E27FC236}">
-                <a16:creationId xmlns:a16="http://schemas.microsoft.com/office/drawing/2014/main" xmlns="" id="{F12E477C-2CC6-4555-8235-719CBE3B0175}"/>
+                <a16:creationId xmlns="" xmlns:a16="http://schemas.microsoft.com/office/drawing/2014/main" id="{F12E477C-2CC6-4555-8235-719CBE3B0175}"/>
               </a:ext>
             </a:extLst>
           </p:cNvPr>
@@ -4825,7 +4825,7 @@
           <p:cNvPr id="93" name="Rectángulo 92">
             <a:extLst>
               <a:ext uri="{FF2B5EF4-FFF2-40B4-BE49-F238E27FC236}">
-                <a16:creationId xmlns:a16="http://schemas.microsoft.com/office/drawing/2014/main" xmlns="" id="{24E5F539-7A09-4F5B-95D8-8BDB50EF13FE}"/>
+                <a16:creationId xmlns="" xmlns:a16="http://schemas.microsoft.com/office/drawing/2014/main" id="{24E5F539-7A09-4F5B-95D8-8BDB50EF13FE}"/>
               </a:ext>
             </a:extLst>
           </p:cNvPr>
@@ -4877,7 +4877,7 @@
           <p:cNvPr id="95" name="Rectángulo 94">
             <a:extLst>
               <a:ext uri="{FF2B5EF4-FFF2-40B4-BE49-F238E27FC236}">
-                <a16:creationId xmlns:a16="http://schemas.microsoft.com/office/drawing/2014/main" xmlns="" id="{9CAC6246-ADC5-45A2-BCC1-DD852C7B11B7}"/>
+                <a16:creationId xmlns="" xmlns:a16="http://schemas.microsoft.com/office/drawing/2014/main" id="{9CAC6246-ADC5-45A2-BCC1-DD852C7B11B7}"/>
               </a:ext>
             </a:extLst>
           </p:cNvPr>
@@ -4929,7 +4929,7 @@
           <p:cNvPr id="97" name="Rectángulo 96">
             <a:extLst>
               <a:ext uri="{FF2B5EF4-FFF2-40B4-BE49-F238E27FC236}">
-                <a16:creationId xmlns:a16="http://schemas.microsoft.com/office/drawing/2014/main" xmlns="" id="{ECB51BA8-E69A-47F5-BD56-0A327E561C4C}"/>
+                <a16:creationId xmlns="" xmlns:a16="http://schemas.microsoft.com/office/drawing/2014/main" id="{ECB51BA8-E69A-47F5-BD56-0A327E561C4C}"/>
               </a:ext>
             </a:extLst>
           </p:cNvPr>
@@ -4981,7 +4981,7 @@
           <p:cNvPr id="99" name="Rectángulo 98">
             <a:extLst>
               <a:ext uri="{FF2B5EF4-FFF2-40B4-BE49-F238E27FC236}">
-                <a16:creationId xmlns:a16="http://schemas.microsoft.com/office/drawing/2014/main" xmlns="" id="{CEE39723-92D4-4422-990B-7B4260A35505}"/>
+                <a16:creationId xmlns="" xmlns:a16="http://schemas.microsoft.com/office/drawing/2014/main" id="{CEE39723-92D4-4422-990B-7B4260A35505}"/>
               </a:ext>
             </a:extLst>
           </p:cNvPr>
@@ -5033,7 +5033,7 @@
           <p:cNvPr id="102" name="Conector recto 101">
             <a:extLst>
               <a:ext uri="{FF2B5EF4-FFF2-40B4-BE49-F238E27FC236}">
-                <a16:creationId xmlns:a16="http://schemas.microsoft.com/office/drawing/2014/main" xmlns="" id="{86EF041D-DE48-4F5C-8744-8CBF0EB20DE0}"/>
+                <a16:creationId xmlns="" xmlns:a16="http://schemas.microsoft.com/office/drawing/2014/main" id="{86EF041D-DE48-4F5C-8744-8CBF0EB20DE0}"/>
               </a:ext>
             </a:extLst>
           </p:cNvPr>
@@ -5076,7 +5076,7 @@
           <p:cNvPr id="103" name="Conector recto 102">
             <a:extLst>
               <a:ext uri="{FF2B5EF4-FFF2-40B4-BE49-F238E27FC236}">
-                <a16:creationId xmlns:a16="http://schemas.microsoft.com/office/drawing/2014/main" xmlns="" id="{47E268D3-FA3C-4E68-9B0F-630F0330FE61}"/>
+                <a16:creationId xmlns="" xmlns:a16="http://schemas.microsoft.com/office/drawing/2014/main" id="{47E268D3-FA3C-4E68-9B0F-630F0330FE61}"/>
               </a:ext>
             </a:extLst>
           </p:cNvPr>
@@ -5119,7 +5119,7 @@
           <p:cNvPr id="104" name="Conector recto 103">
             <a:extLst>
               <a:ext uri="{FF2B5EF4-FFF2-40B4-BE49-F238E27FC236}">
-                <a16:creationId xmlns:a16="http://schemas.microsoft.com/office/drawing/2014/main" xmlns="" id="{66505EBE-DF94-4D46-A617-9B02F34E7864}"/>
+                <a16:creationId xmlns="" xmlns:a16="http://schemas.microsoft.com/office/drawing/2014/main" id="{66505EBE-DF94-4D46-A617-9B02F34E7864}"/>
               </a:ext>
             </a:extLst>
           </p:cNvPr>
@@ -5162,7 +5162,7 @@
           <p:cNvPr id="105" name="Conector recto 104">
             <a:extLst>
               <a:ext uri="{FF2B5EF4-FFF2-40B4-BE49-F238E27FC236}">
-                <a16:creationId xmlns:a16="http://schemas.microsoft.com/office/drawing/2014/main" xmlns="" id="{6A324006-7BFE-46BD-A68C-9DC10B2E9CA9}"/>
+                <a16:creationId xmlns="" xmlns:a16="http://schemas.microsoft.com/office/drawing/2014/main" id="{6A324006-7BFE-46BD-A68C-9DC10B2E9CA9}"/>
               </a:ext>
             </a:extLst>
           </p:cNvPr>
@@ -5205,7 +5205,7 @@
           <p:cNvPr id="106" name="Conector recto 105">
             <a:extLst>
               <a:ext uri="{FF2B5EF4-FFF2-40B4-BE49-F238E27FC236}">
-                <a16:creationId xmlns:a16="http://schemas.microsoft.com/office/drawing/2014/main" xmlns="" id="{9058EBC3-42C3-4B5A-BBBB-C1E1B37F6D1A}"/>
+                <a16:creationId xmlns="" xmlns:a16="http://schemas.microsoft.com/office/drawing/2014/main" id="{9058EBC3-42C3-4B5A-BBBB-C1E1B37F6D1A}"/>
               </a:ext>
             </a:extLst>
           </p:cNvPr>
@@ -5248,7 +5248,7 @@
           <p:cNvPr id="107" name="Conector recto 106">
             <a:extLst>
               <a:ext uri="{FF2B5EF4-FFF2-40B4-BE49-F238E27FC236}">
-                <a16:creationId xmlns:a16="http://schemas.microsoft.com/office/drawing/2014/main" xmlns="" id="{B2AE8D7F-112B-4A1B-B6A2-3D4847277991}"/>
+                <a16:creationId xmlns="" xmlns:a16="http://schemas.microsoft.com/office/drawing/2014/main" id="{B2AE8D7F-112B-4A1B-B6A2-3D4847277991}"/>
               </a:ext>
             </a:extLst>
           </p:cNvPr>
@@ -5291,7 +5291,7 @@
           <p:cNvPr id="109" name="Conector recto de flecha 108">
             <a:extLst>
               <a:ext uri="{FF2B5EF4-FFF2-40B4-BE49-F238E27FC236}">
-                <a16:creationId xmlns:a16="http://schemas.microsoft.com/office/drawing/2014/main" xmlns="" id="{D6EA153A-F288-498B-A862-027BC2639F72}"/>
+                <a16:creationId xmlns="" xmlns:a16="http://schemas.microsoft.com/office/drawing/2014/main" id="{D6EA153A-F288-498B-A862-027BC2639F72}"/>
               </a:ext>
             </a:extLst>
           </p:cNvPr>
@@ -5331,7 +5331,7 @@
           <p:cNvPr id="110" name="Conector recto de flecha 109">
             <a:extLst>
               <a:ext uri="{FF2B5EF4-FFF2-40B4-BE49-F238E27FC236}">
-                <a16:creationId xmlns:a16="http://schemas.microsoft.com/office/drawing/2014/main" xmlns="" id="{AB6AEAA7-B3DE-4392-84C0-F7BF95A97831}"/>
+                <a16:creationId xmlns="" xmlns:a16="http://schemas.microsoft.com/office/drawing/2014/main" id="{AB6AEAA7-B3DE-4392-84C0-F7BF95A97831}"/>
               </a:ext>
             </a:extLst>
           </p:cNvPr>
@@ -5373,7 +5373,7 @@
           <p:cNvPr id="112" name="Conector recto de flecha 111">
             <a:extLst>
               <a:ext uri="{FF2B5EF4-FFF2-40B4-BE49-F238E27FC236}">
-                <a16:creationId xmlns:a16="http://schemas.microsoft.com/office/drawing/2014/main" xmlns="" id="{F6ACDBDC-20EE-439D-9563-BF774C7421DA}"/>
+                <a16:creationId xmlns="" xmlns:a16="http://schemas.microsoft.com/office/drawing/2014/main" id="{F6ACDBDC-20EE-439D-9563-BF774C7421DA}"/>
               </a:ext>
             </a:extLst>
           </p:cNvPr>
@@ -5415,7 +5415,7 @@
           <p:cNvPr id="114" name="Conector recto de flecha 113">
             <a:extLst>
               <a:ext uri="{FF2B5EF4-FFF2-40B4-BE49-F238E27FC236}">
-                <a16:creationId xmlns:a16="http://schemas.microsoft.com/office/drawing/2014/main" xmlns="" id="{7083838C-726B-4982-AAC8-A11C3B433205}"/>
+                <a16:creationId xmlns="" xmlns:a16="http://schemas.microsoft.com/office/drawing/2014/main" id="{7083838C-726B-4982-AAC8-A11C3B433205}"/>
               </a:ext>
             </a:extLst>
           </p:cNvPr>
@@ -5457,7 +5457,7 @@
           <p:cNvPr id="116" name="Conector recto de flecha 115">
             <a:extLst>
               <a:ext uri="{FF2B5EF4-FFF2-40B4-BE49-F238E27FC236}">
-                <a16:creationId xmlns:a16="http://schemas.microsoft.com/office/drawing/2014/main" xmlns="" id="{3664F721-26A1-4880-8555-BB97AB35D9FB}"/>
+                <a16:creationId xmlns="" xmlns:a16="http://schemas.microsoft.com/office/drawing/2014/main" id="{3664F721-26A1-4880-8555-BB97AB35D9FB}"/>
               </a:ext>
             </a:extLst>
           </p:cNvPr>
@@ -5499,7 +5499,7 @@
           <p:cNvPr id="118" name="Conector recto de flecha 117">
             <a:extLst>
               <a:ext uri="{FF2B5EF4-FFF2-40B4-BE49-F238E27FC236}">
-                <a16:creationId xmlns:a16="http://schemas.microsoft.com/office/drawing/2014/main" xmlns="" id="{6C52B2C0-BB73-45F4-B1B0-022466ABDA68}"/>
+                <a16:creationId xmlns="" xmlns:a16="http://schemas.microsoft.com/office/drawing/2014/main" id="{6C52B2C0-BB73-45F4-B1B0-022466ABDA68}"/>
               </a:ext>
             </a:extLst>
           </p:cNvPr>
@@ -5541,7 +5541,7 @@
           <p:cNvPr id="119" name="Conector recto 118">
             <a:extLst>
               <a:ext uri="{FF2B5EF4-FFF2-40B4-BE49-F238E27FC236}">
-                <a16:creationId xmlns:a16="http://schemas.microsoft.com/office/drawing/2014/main" xmlns="" id="{7F0BCCC8-CF54-477C-A0E9-0EADB48ACAED}"/>
+                <a16:creationId xmlns="" xmlns:a16="http://schemas.microsoft.com/office/drawing/2014/main" id="{7F0BCCC8-CF54-477C-A0E9-0EADB48ACAED}"/>
               </a:ext>
             </a:extLst>
           </p:cNvPr>
@@ -5584,7 +5584,7 @@
           <p:cNvPr id="121" name="CuadroTexto 120">
             <a:extLst>
               <a:ext uri="{FF2B5EF4-FFF2-40B4-BE49-F238E27FC236}">
-                <a16:creationId xmlns:a16="http://schemas.microsoft.com/office/drawing/2014/main" xmlns="" id="{C055A25B-9E72-4CC3-9DBF-D79064A76E9A}"/>
+                <a16:creationId xmlns="" xmlns:a16="http://schemas.microsoft.com/office/drawing/2014/main" id="{C055A25B-9E72-4CC3-9DBF-D79064A76E9A}"/>
               </a:ext>
             </a:extLst>
           </p:cNvPr>
@@ -5620,7 +5620,7 @@
           <p:cNvPr id="122" name="CuadroTexto 121">
             <a:extLst>
               <a:ext uri="{FF2B5EF4-FFF2-40B4-BE49-F238E27FC236}">
-                <a16:creationId xmlns:a16="http://schemas.microsoft.com/office/drawing/2014/main" xmlns="" id="{8EE11C23-74C4-4FD5-9310-80C4C2FA101C}"/>
+                <a16:creationId xmlns="" xmlns:a16="http://schemas.microsoft.com/office/drawing/2014/main" id="{8EE11C23-74C4-4FD5-9310-80C4C2FA101C}"/>
               </a:ext>
             </a:extLst>
           </p:cNvPr>
@@ -5656,7 +5656,7 @@
           <p:cNvPr id="123" name="CuadroTexto 122">
             <a:extLst>
               <a:ext uri="{FF2B5EF4-FFF2-40B4-BE49-F238E27FC236}">
-                <a16:creationId xmlns:a16="http://schemas.microsoft.com/office/drawing/2014/main" xmlns="" id="{015E0DE8-C7F9-4FCF-AF48-E2682799DDCD}"/>
+                <a16:creationId xmlns="" xmlns:a16="http://schemas.microsoft.com/office/drawing/2014/main" id="{015E0DE8-C7F9-4FCF-AF48-E2682799DDCD}"/>
               </a:ext>
             </a:extLst>
           </p:cNvPr>
@@ -5692,7 +5692,7 @@
           <p:cNvPr id="124" name="CuadroTexto 123">
             <a:extLst>
               <a:ext uri="{FF2B5EF4-FFF2-40B4-BE49-F238E27FC236}">
-                <a16:creationId xmlns:a16="http://schemas.microsoft.com/office/drawing/2014/main" xmlns="" id="{991AA4AD-6A8B-40C6-B000-0139C9367DAF}"/>
+                <a16:creationId xmlns="" xmlns:a16="http://schemas.microsoft.com/office/drawing/2014/main" id="{991AA4AD-6A8B-40C6-B000-0139C9367DAF}"/>
               </a:ext>
             </a:extLst>
           </p:cNvPr>
@@ -5728,7 +5728,7 @@
           <p:cNvPr id="125" name="CuadroTexto 124">
             <a:extLst>
               <a:ext uri="{FF2B5EF4-FFF2-40B4-BE49-F238E27FC236}">
-                <a16:creationId xmlns:a16="http://schemas.microsoft.com/office/drawing/2014/main" xmlns="" id="{F45070FF-26DA-408B-A13F-3670BB778833}"/>
+                <a16:creationId xmlns="" xmlns:a16="http://schemas.microsoft.com/office/drawing/2014/main" id="{F45070FF-26DA-408B-A13F-3670BB778833}"/>
               </a:ext>
             </a:extLst>
           </p:cNvPr>
@@ -5764,7 +5764,7 @@
           <p:cNvPr id="126" name="CuadroTexto 125">
             <a:extLst>
               <a:ext uri="{FF2B5EF4-FFF2-40B4-BE49-F238E27FC236}">
-                <a16:creationId xmlns:a16="http://schemas.microsoft.com/office/drawing/2014/main" xmlns="" id="{EE943D83-DACD-4434-B6BE-80819EC8D2A2}"/>
+                <a16:creationId xmlns="" xmlns:a16="http://schemas.microsoft.com/office/drawing/2014/main" id="{EE943D83-DACD-4434-B6BE-80819EC8D2A2}"/>
               </a:ext>
             </a:extLst>
           </p:cNvPr>
@@ -5800,7 +5800,7 @@
           <p:cNvPr id="142" name="CuadroTexto 141">
             <a:extLst>
               <a:ext uri="{FF2B5EF4-FFF2-40B4-BE49-F238E27FC236}">
-                <a16:creationId xmlns:a16="http://schemas.microsoft.com/office/drawing/2014/main" xmlns="" id="{4F79BADF-8B36-475E-AD42-510A24A59FBE}"/>
+                <a16:creationId xmlns="" xmlns:a16="http://schemas.microsoft.com/office/drawing/2014/main" id="{4F79BADF-8B36-475E-AD42-510A24A59FBE}"/>
               </a:ext>
             </a:extLst>
           </p:cNvPr>
@@ -5840,7 +5840,7 @@
           <p:cNvPr id="143" name="CuadroTexto 142">
             <a:extLst>
               <a:ext uri="{FF2B5EF4-FFF2-40B4-BE49-F238E27FC236}">
-                <a16:creationId xmlns:a16="http://schemas.microsoft.com/office/drawing/2014/main" xmlns="" id="{C9BBCD3A-4FBF-44D5-90CE-8FBB5A1C5714}"/>
+                <a16:creationId xmlns="" xmlns:a16="http://schemas.microsoft.com/office/drawing/2014/main" id="{C9BBCD3A-4FBF-44D5-90CE-8FBB5A1C5714}"/>
               </a:ext>
             </a:extLst>
           </p:cNvPr>
@@ -5880,7 +5880,7 @@
           <p:cNvPr id="144" name="CuadroTexto 143">
             <a:extLst>
               <a:ext uri="{FF2B5EF4-FFF2-40B4-BE49-F238E27FC236}">
-                <a16:creationId xmlns:a16="http://schemas.microsoft.com/office/drawing/2014/main" xmlns="" id="{A4B769A3-1D71-4C9C-B62B-4D34193F966B}"/>
+                <a16:creationId xmlns="" xmlns:a16="http://schemas.microsoft.com/office/drawing/2014/main" id="{A4B769A3-1D71-4C9C-B62B-4D34193F966B}"/>
               </a:ext>
             </a:extLst>
           </p:cNvPr>
@@ -5920,7 +5920,7 @@
           <p:cNvPr id="145" name="CuadroTexto 144">
             <a:extLst>
               <a:ext uri="{FF2B5EF4-FFF2-40B4-BE49-F238E27FC236}">
-                <a16:creationId xmlns:a16="http://schemas.microsoft.com/office/drawing/2014/main" xmlns="" id="{438AEC21-FE7C-41F7-8FF8-1DF60DDD3D3F}"/>
+                <a16:creationId xmlns="" xmlns:a16="http://schemas.microsoft.com/office/drawing/2014/main" id="{438AEC21-FE7C-41F7-8FF8-1DF60DDD3D3F}"/>
               </a:ext>
             </a:extLst>
           </p:cNvPr>
@@ -5960,7 +5960,7 @@
           <p:cNvPr id="146" name="CuadroTexto 145">
             <a:extLst>
               <a:ext uri="{FF2B5EF4-FFF2-40B4-BE49-F238E27FC236}">
-                <a16:creationId xmlns:a16="http://schemas.microsoft.com/office/drawing/2014/main" xmlns="" id="{4751CD82-B19E-4F57-B70B-04448F1E4DFE}"/>
+                <a16:creationId xmlns="" xmlns:a16="http://schemas.microsoft.com/office/drawing/2014/main" id="{4751CD82-B19E-4F57-B70B-04448F1E4DFE}"/>
               </a:ext>
             </a:extLst>
           </p:cNvPr>
@@ -6000,7 +6000,7 @@
           <p:cNvPr id="148" name="Conector recto de flecha 147">
             <a:extLst>
               <a:ext uri="{FF2B5EF4-FFF2-40B4-BE49-F238E27FC236}">
-                <a16:creationId xmlns:a16="http://schemas.microsoft.com/office/drawing/2014/main" xmlns="" id="{A652BF30-FED7-43AB-9F84-048905F66CD7}"/>
+                <a16:creationId xmlns="" xmlns:a16="http://schemas.microsoft.com/office/drawing/2014/main" id="{A652BF30-FED7-43AB-9F84-048905F66CD7}"/>
               </a:ext>
             </a:extLst>
           </p:cNvPr>
@@ -6043,7 +6043,7 @@
           <p:cNvPr id="149" name="CuadroTexto 148">
             <a:extLst>
               <a:ext uri="{FF2B5EF4-FFF2-40B4-BE49-F238E27FC236}">
-                <a16:creationId xmlns:a16="http://schemas.microsoft.com/office/drawing/2014/main" xmlns="" id="{038A1AFE-092F-4490-ACEC-E9A589D7E562}"/>
+                <a16:creationId xmlns="" xmlns:a16="http://schemas.microsoft.com/office/drawing/2014/main" id="{038A1AFE-092F-4490-ACEC-E9A589D7E562}"/>
               </a:ext>
             </a:extLst>
           </p:cNvPr>
@@ -6083,7 +6083,7 @@
           <p:cNvPr id="150" name="Conector recto de flecha 149">
             <a:extLst>
               <a:ext uri="{FF2B5EF4-FFF2-40B4-BE49-F238E27FC236}">
-                <a16:creationId xmlns:a16="http://schemas.microsoft.com/office/drawing/2014/main" xmlns="" id="{381A71BA-8E7E-4EE6-9269-15B7E3A813EB}"/>
+                <a16:creationId xmlns="" xmlns:a16="http://schemas.microsoft.com/office/drawing/2014/main" id="{381A71BA-8E7E-4EE6-9269-15B7E3A813EB}"/>
               </a:ext>
             </a:extLst>
           </p:cNvPr>
@@ -6126,7 +6126,7 @@
           <p:cNvPr id="153" name="CuadroTexto 152">
             <a:extLst>
               <a:ext uri="{FF2B5EF4-FFF2-40B4-BE49-F238E27FC236}">
-                <a16:creationId xmlns:a16="http://schemas.microsoft.com/office/drawing/2014/main" xmlns="" id="{842F7379-7927-4A04-9F04-A65F65E85B4B}"/>
+                <a16:creationId xmlns="" xmlns:a16="http://schemas.microsoft.com/office/drawing/2014/main" id="{842F7379-7927-4A04-9F04-A65F65E85B4B}"/>
               </a:ext>
             </a:extLst>
           </p:cNvPr>
@@ -6169,7 +6169,7 @@
           <p:cNvPr id="154" name="CuadroTexto 153">
             <a:extLst>
               <a:ext uri="{FF2B5EF4-FFF2-40B4-BE49-F238E27FC236}">
-                <a16:creationId xmlns:a16="http://schemas.microsoft.com/office/drawing/2014/main" xmlns="" id="{0DC557E3-0D74-4B92-85AD-ACB09F131005}"/>
+                <a16:creationId xmlns="" xmlns:a16="http://schemas.microsoft.com/office/drawing/2014/main" id="{0DC557E3-0D74-4B92-85AD-ACB09F131005}"/>
               </a:ext>
             </a:extLst>
           </p:cNvPr>
@@ -6210,7 +6210,7 @@
           <p:cNvPr id="64" name="Rectángulo 63">
             <a:extLst>
               <a:ext uri="{FF2B5EF4-FFF2-40B4-BE49-F238E27FC236}">
-                <a16:creationId xmlns:a16="http://schemas.microsoft.com/office/drawing/2014/main" xmlns="" id="{67EB5223-ACA0-4E87-A173-373E523C7D3A}"/>
+                <a16:creationId xmlns="" xmlns:a16="http://schemas.microsoft.com/office/drawing/2014/main" id="{67EB5223-ACA0-4E87-A173-373E523C7D3A}"/>
               </a:ext>
             </a:extLst>
           </p:cNvPr>
@@ -6262,7 +6262,7 @@
           <p:cNvPr id="66" name="Rectángulo 65">
             <a:extLst>
               <a:ext uri="{FF2B5EF4-FFF2-40B4-BE49-F238E27FC236}">
-                <a16:creationId xmlns:a16="http://schemas.microsoft.com/office/drawing/2014/main" xmlns="" id="{FA0B435B-0B70-44E0-82F0-9E4273247D5F}"/>
+                <a16:creationId xmlns="" xmlns:a16="http://schemas.microsoft.com/office/drawing/2014/main" id="{FA0B435B-0B70-44E0-82F0-9E4273247D5F}"/>
               </a:ext>
             </a:extLst>
           </p:cNvPr>
@@ -6320,7 +6320,7 @@
           <p:cNvPr id="68" name="Rectángulo 67">
             <a:extLst>
               <a:ext uri="{FF2B5EF4-FFF2-40B4-BE49-F238E27FC236}">
-                <a16:creationId xmlns:a16="http://schemas.microsoft.com/office/drawing/2014/main" xmlns="" id="{7B02F6AC-6E84-4A64-917E-13FEB72414FF}"/>
+                <a16:creationId xmlns="" xmlns:a16="http://schemas.microsoft.com/office/drawing/2014/main" id="{7B02F6AC-6E84-4A64-917E-13FEB72414FF}"/>
               </a:ext>
             </a:extLst>
           </p:cNvPr>
@@ -6378,7 +6378,7 @@
           <p:cNvPr id="70" name="Rectángulo 69">
             <a:extLst>
               <a:ext uri="{FF2B5EF4-FFF2-40B4-BE49-F238E27FC236}">
-                <a16:creationId xmlns:a16="http://schemas.microsoft.com/office/drawing/2014/main" xmlns="" id="{02C91B38-0BF3-4F06-870C-006DD364C3B8}"/>
+                <a16:creationId xmlns="" xmlns:a16="http://schemas.microsoft.com/office/drawing/2014/main" id="{02C91B38-0BF3-4F06-870C-006DD364C3B8}"/>
               </a:ext>
             </a:extLst>
           </p:cNvPr>
@@ -6436,7 +6436,7 @@
           <p:cNvPr id="72" name="Rectángulo 71">
             <a:extLst>
               <a:ext uri="{FF2B5EF4-FFF2-40B4-BE49-F238E27FC236}">
-                <a16:creationId xmlns:a16="http://schemas.microsoft.com/office/drawing/2014/main" xmlns="" id="{EAA1FF42-EF35-4AAB-9F30-F152B4309EDD}"/>
+                <a16:creationId xmlns="" xmlns:a16="http://schemas.microsoft.com/office/drawing/2014/main" id="{EAA1FF42-EF35-4AAB-9F30-F152B4309EDD}"/>
               </a:ext>
             </a:extLst>
           </p:cNvPr>
@@ -6494,7 +6494,7 @@
           <p:cNvPr id="74" name="Rectángulo 73">
             <a:extLst>
               <a:ext uri="{FF2B5EF4-FFF2-40B4-BE49-F238E27FC236}">
-                <a16:creationId xmlns:a16="http://schemas.microsoft.com/office/drawing/2014/main" xmlns="" id="{29BA0FB6-87EE-4A6C-AD2D-40584421DBDA}"/>
+                <a16:creationId xmlns="" xmlns:a16="http://schemas.microsoft.com/office/drawing/2014/main" id="{29BA0FB6-87EE-4A6C-AD2D-40584421DBDA}"/>
               </a:ext>
             </a:extLst>
           </p:cNvPr>
@@ -6552,7 +6552,7 @@
           <p:cNvPr id="76" name="Rectángulo 75">
             <a:extLst>
               <a:ext uri="{FF2B5EF4-FFF2-40B4-BE49-F238E27FC236}">
-                <a16:creationId xmlns:a16="http://schemas.microsoft.com/office/drawing/2014/main" xmlns="" id="{6D2F09FD-84DC-4E98-A79E-76B38AD24F83}"/>
+                <a16:creationId xmlns="" xmlns:a16="http://schemas.microsoft.com/office/drawing/2014/main" id="{6D2F09FD-84DC-4E98-A79E-76B38AD24F83}"/>
               </a:ext>
             </a:extLst>
           </p:cNvPr>
@@ -6610,7 +6610,7 @@
           <p:cNvPr id="78" name="Rectángulo 77">
             <a:extLst>
               <a:ext uri="{FF2B5EF4-FFF2-40B4-BE49-F238E27FC236}">
-                <a16:creationId xmlns:a16="http://schemas.microsoft.com/office/drawing/2014/main" xmlns="" id="{C4A7B348-90DB-45FF-89C2-F22538BE97B2}"/>
+                <a16:creationId xmlns="" xmlns:a16="http://schemas.microsoft.com/office/drawing/2014/main" id="{C4A7B348-90DB-45FF-89C2-F22538BE97B2}"/>
               </a:ext>
             </a:extLst>
           </p:cNvPr>
@@ -6668,7 +6668,7 @@
           <p:cNvPr id="80" name="Rectángulo 79">
             <a:extLst>
               <a:ext uri="{FF2B5EF4-FFF2-40B4-BE49-F238E27FC236}">
-                <a16:creationId xmlns:a16="http://schemas.microsoft.com/office/drawing/2014/main" xmlns="" id="{8B8A4077-DC12-4DAE-B936-6FA590DB9438}"/>
+                <a16:creationId xmlns="" xmlns:a16="http://schemas.microsoft.com/office/drawing/2014/main" id="{8B8A4077-DC12-4DAE-B936-6FA590DB9438}"/>
               </a:ext>
             </a:extLst>
           </p:cNvPr>
@@ -6726,7 +6726,7 @@
           <p:cNvPr id="82" name="Rectángulo 81">
             <a:extLst>
               <a:ext uri="{FF2B5EF4-FFF2-40B4-BE49-F238E27FC236}">
-                <a16:creationId xmlns:a16="http://schemas.microsoft.com/office/drawing/2014/main" xmlns="" id="{752BF71D-36E9-4327-8F03-85ABBBE5FB53}"/>
+                <a16:creationId xmlns="" xmlns:a16="http://schemas.microsoft.com/office/drawing/2014/main" id="{752BF71D-36E9-4327-8F03-85ABBBE5FB53}"/>
               </a:ext>
             </a:extLst>
           </p:cNvPr>
@@ -6780,7 +6780,7 @@
           <p:cNvPr id="84" name="Rectángulo 83">
             <a:extLst>
               <a:ext uri="{FF2B5EF4-FFF2-40B4-BE49-F238E27FC236}">
-                <a16:creationId xmlns:a16="http://schemas.microsoft.com/office/drawing/2014/main" xmlns="" id="{C4593EB1-E629-4A66-8B5E-F9F8A5FA8DBD}"/>
+                <a16:creationId xmlns="" xmlns:a16="http://schemas.microsoft.com/office/drawing/2014/main" id="{C4593EB1-E629-4A66-8B5E-F9F8A5FA8DBD}"/>
               </a:ext>
             </a:extLst>
           </p:cNvPr>
@@ -6834,7 +6834,7 @@
           <p:cNvPr id="86" name="Rectángulo 85">
             <a:extLst>
               <a:ext uri="{FF2B5EF4-FFF2-40B4-BE49-F238E27FC236}">
-                <a16:creationId xmlns:a16="http://schemas.microsoft.com/office/drawing/2014/main" xmlns="" id="{3213A3A1-18B1-4C75-AA59-7B90A4ABB276}"/>
+                <a16:creationId xmlns="" xmlns:a16="http://schemas.microsoft.com/office/drawing/2014/main" id="{3213A3A1-18B1-4C75-AA59-7B90A4ABB276}"/>
               </a:ext>
             </a:extLst>
           </p:cNvPr>
@@ -6888,7 +6888,7 @@
           <p:cNvPr id="88" name="Rectángulo 87">
             <a:extLst>
               <a:ext uri="{FF2B5EF4-FFF2-40B4-BE49-F238E27FC236}">
-                <a16:creationId xmlns:a16="http://schemas.microsoft.com/office/drawing/2014/main" xmlns="" id="{6A46BFEB-D9DB-48F7-9B34-6AEDD9B9D747}"/>
+                <a16:creationId xmlns="" xmlns:a16="http://schemas.microsoft.com/office/drawing/2014/main" id="{6A46BFEB-D9DB-48F7-9B34-6AEDD9B9D747}"/>
               </a:ext>
             </a:extLst>
           </p:cNvPr>
@@ -6942,7 +6942,7 @@
           <p:cNvPr id="90" name="Rectángulo 89">
             <a:extLst>
               <a:ext uri="{FF2B5EF4-FFF2-40B4-BE49-F238E27FC236}">
-                <a16:creationId xmlns:a16="http://schemas.microsoft.com/office/drawing/2014/main" xmlns="" id="{A007A219-EAC2-450D-85A0-C07D743F45CE}"/>
+                <a16:creationId xmlns="" xmlns:a16="http://schemas.microsoft.com/office/drawing/2014/main" id="{A007A219-EAC2-450D-85A0-C07D743F45CE}"/>
               </a:ext>
             </a:extLst>
           </p:cNvPr>
@@ -6996,7 +6996,7 @@
           <p:cNvPr id="92" name="Rectángulo 91">
             <a:extLst>
               <a:ext uri="{FF2B5EF4-FFF2-40B4-BE49-F238E27FC236}">
-                <a16:creationId xmlns:a16="http://schemas.microsoft.com/office/drawing/2014/main" xmlns="" id="{2AC7EC60-FAD4-4DDE-8EDD-063482A1A274}"/>
+                <a16:creationId xmlns="" xmlns:a16="http://schemas.microsoft.com/office/drawing/2014/main" id="{2AC7EC60-FAD4-4DDE-8EDD-063482A1A274}"/>
               </a:ext>
             </a:extLst>
           </p:cNvPr>
@@ -7050,7 +7050,7 @@
           <p:cNvPr id="94" name="Rectángulo 93">
             <a:extLst>
               <a:ext uri="{FF2B5EF4-FFF2-40B4-BE49-F238E27FC236}">
-                <a16:creationId xmlns:a16="http://schemas.microsoft.com/office/drawing/2014/main" xmlns="" id="{5BFC7356-1A84-4CE4-844D-E1AF2BCF4815}"/>
+                <a16:creationId xmlns="" xmlns:a16="http://schemas.microsoft.com/office/drawing/2014/main" id="{5BFC7356-1A84-4CE4-844D-E1AF2BCF4815}"/>
               </a:ext>
             </a:extLst>
           </p:cNvPr>
@@ -7104,7 +7104,7 @@
           <p:cNvPr id="96" name="Rectángulo 95">
             <a:extLst>
               <a:ext uri="{FF2B5EF4-FFF2-40B4-BE49-F238E27FC236}">
-                <a16:creationId xmlns:a16="http://schemas.microsoft.com/office/drawing/2014/main" xmlns="" id="{7D95FFFE-35C2-4212-BE46-91577A75608F}"/>
+                <a16:creationId xmlns="" xmlns:a16="http://schemas.microsoft.com/office/drawing/2014/main" id="{7D95FFFE-35C2-4212-BE46-91577A75608F}"/>
               </a:ext>
             </a:extLst>
           </p:cNvPr>
@@ -7158,7 +7158,7 @@
           <p:cNvPr id="98" name="Rectángulo 97">
             <a:extLst>
               <a:ext uri="{FF2B5EF4-FFF2-40B4-BE49-F238E27FC236}">
-                <a16:creationId xmlns:a16="http://schemas.microsoft.com/office/drawing/2014/main" xmlns="" id="{3861101E-021E-4637-A326-9260732D78BA}"/>
+                <a16:creationId xmlns="" xmlns:a16="http://schemas.microsoft.com/office/drawing/2014/main" id="{3861101E-021E-4637-A326-9260732D78BA}"/>
               </a:ext>
             </a:extLst>
           </p:cNvPr>
@@ -7212,7 +7212,7 @@
           <p:cNvPr id="100" name="Rectángulo 99">
             <a:extLst>
               <a:ext uri="{FF2B5EF4-FFF2-40B4-BE49-F238E27FC236}">
-                <a16:creationId xmlns:a16="http://schemas.microsoft.com/office/drawing/2014/main" xmlns="" id="{C2F68246-2621-4F57-914E-A8D1B13EC5F4}"/>
+                <a16:creationId xmlns="" xmlns:a16="http://schemas.microsoft.com/office/drawing/2014/main" id="{C2F68246-2621-4F57-914E-A8D1B13EC5F4}"/>
               </a:ext>
             </a:extLst>
           </p:cNvPr>
@@ -7266,7 +7266,7 @@
           <p:cNvPr id="101" name="Rectángulo 100">
             <a:extLst>
               <a:ext uri="{FF2B5EF4-FFF2-40B4-BE49-F238E27FC236}">
-                <a16:creationId xmlns:a16="http://schemas.microsoft.com/office/drawing/2014/main" xmlns="" id="{C2F139AC-4B77-45E8-8CC4-315A2C311826}"/>
+                <a16:creationId xmlns="" xmlns:a16="http://schemas.microsoft.com/office/drawing/2014/main" id="{C2F139AC-4B77-45E8-8CC4-315A2C311826}"/>
               </a:ext>
             </a:extLst>
           </p:cNvPr>
@@ -7320,7 +7320,7 @@
           <p:cNvPr id="108" name="Rectángulo 107">
             <a:extLst>
               <a:ext uri="{FF2B5EF4-FFF2-40B4-BE49-F238E27FC236}">
-                <a16:creationId xmlns:a16="http://schemas.microsoft.com/office/drawing/2014/main" xmlns="" id="{D83996FC-5C3D-43A3-B233-9917C239AB66}"/>
+                <a16:creationId xmlns="" xmlns:a16="http://schemas.microsoft.com/office/drawing/2014/main" id="{D83996FC-5C3D-43A3-B233-9917C239AB66}"/>
               </a:ext>
             </a:extLst>
           </p:cNvPr>
@@ -7374,7 +7374,7 @@
           <p:cNvPr id="111" name="Rectángulo 110">
             <a:extLst>
               <a:ext uri="{FF2B5EF4-FFF2-40B4-BE49-F238E27FC236}">
-                <a16:creationId xmlns:a16="http://schemas.microsoft.com/office/drawing/2014/main" xmlns="" id="{2F7CACD6-754F-4C6A-B754-20207D468495}"/>
+                <a16:creationId xmlns="" xmlns:a16="http://schemas.microsoft.com/office/drawing/2014/main" id="{2F7CACD6-754F-4C6A-B754-20207D468495}"/>
               </a:ext>
             </a:extLst>
           </p:cNvPr>
@@ -7428,7 +7428,7 @@
           <p:cNvPr id="113" name="Rectángulo 112">
             <a:extLst>
               <a:ext uri="{FF2B5EF4-FFF2-40B4-BE49-F238E27FC236}">
-                <a16:creationId xmlns:a16="http://schemas.microsoft.com/office/drawing/2014/main" xmlns="" id="{AB3FB92B-78FD-43CA-ABE8-0F0511822C2C}"/>
+                <a16:creationId xmlns="" xmlns:a16="http://schemas.microsoft.com/office/drawing/2014/main" id="{AB3FB92B-78FD-43CA-ABE8-0F0511822C2C}"/>
               </a:ext>
             </a:extLst>
           </p:cNvPr>
@@ -7482,7 +7482,7 @@
           <p:cNvPr id="115" name="Rectángulo 114">
             <a:extLst>
               <a:ext uri="{FF2B5EF4-FFF2-40B4-BE49-F238E27FC236}">
-                <a16:creationId xmlns:a16="http://schemas.microsoft.com/office/drawing/2014/main" xmlns="" id="{529E6156-1DB1-4C6C-9ADF-EEA69DA63625}"/>
+                <a16:creationId xmlns="" xmlns:a16="http://schemas.microsoft.com/office/drawing/2014/main" id="{529E6156-1DB1-4C6C-9ADF-EEA69DA63625}"/>
               </a:ext>
             </a:extLst>
           </p:cNvPr>
@@ -7536,7 +7536,7 @@
           <p:cNvPr id="117" name="Rectángulo 116">
             <a:extLst>
               <a:ext uri="{FF2B5EF4-FFF2-40B4-BE49-F238E27FC236}">
-                <a16:creationId xmlns:a16="http://schemas.microsoft.com/office/drawing/2014/main" xmlns="" id="{FE018161-3DEF-4106-AB95-133ECD29F546}"/>
+                <a16:creationId xmlns="" xmlns:a16="http://schemas.microsoft.com/office/drawing/2014/main" id="{FE018161-3DEF-4106-AB95-133ECD29F546}"/>
               </a:ext>
             </a:extLst>
           </p:cNvPr>
@@ -7590,7 +7590,7 @@
           <p:cNvPr id="120" name="Rectángulo 119">
             <a:extLst>
               <a:ext uri="{FF2B5EF4-FFF2-40B4-BE49-F238E27FC236}">
-                <a16:creationId xmlns:a16="http://schemas.microsoft.com/office/drawing/2014/main" xmlns="" id="{7A117237-2018-4265-963F-83EA78A47F55}"/>
+                <a16:creationId xmlns="" xmlns:a16="http://schemas.microsoft.com/office/drawing/2014/main" id="{7A117237-2018-4265-963F-83EA78A47F55}"/>
               </a:ext>
             </a:extLst>
           </p:cNvPr>
@@ -7642,7 +7642,7 @@
           <p:cNvPr id="127" name="Rectángulo 126">
             <a:extLst>
               <a:ext uri="{FF2B5EF4-FFF2-40B4-BE49-F238E27FC236}">
-                <a16:creationId xmlns:a16="http://schemas.microsoft.com/office/drawing/2014/main" xmlns="" id="{4953101E-CFB9-4546-A90A-3EC9DBCABA54}"/>
+                <a16:creationId xmlns="" xmlns:a16="http://schemas.microsoft.com/office/drawing/2014/main" id="{4953101E-CFB9-4546-A90A-3EC9DBCABA54}"/>
               </a:ext>
             </a:extLst>
           </p:cNvPr>
@@ -7694,7 +7694,7 @@
           <p:cNvPr id="128" name="Rectángulo 127">
             <a:extLst>
               <a:ext uri="{FF2B5EF4-FFF2-40B4-BE49-F238E27FC236}">
-                <a16:creationId xmlns:a16="http://schemas.microsoft.com/office/drawing/2014/main" xmlns="" id="{5ADC9C01-01FA-4A4D-A255-661A9D954E90}"/>
+                <a16:creationId xmlns="" xmlns:a16="http://schemas.microsoft.com/office/drawing/2014/main" id="{5ADC9C01-01FA-4A4D-A255-661A9D954E90}"/>
               </a:ext>
             </a:extLst>
           </p:cNvPr>
@@ -7746,7 +7746,7 @@
           <p:cNvPr id="129" name="Rectángulo 128">
             <a:extLst>
               <a:ext uri="{FF2B5EF4-FFF2-40B4-BE49-F238E27FC236}">
-                <a16:creationId xmlns:a16="http://schemas.microsoft.com/office/drawing/2014/main" xmlns="" id="{85E3D79C-8BC9-42C8-9FEF-2502E6AA15F6}"/>
+                <a16:creationId xmlns="" xmlns:a16="http://schemas.microsoft.com/office/drawing/2014/main" id="{85E3D79C-8BC9-42C8-9FEF-2502E6AA15F6}"/>
               </a:ext>
             </a:extLst>
           </p:cNvPr>
@@ -7798,7 +7798,7 @@
           <p:cNvPr id="130" name="Rectángulo 129">
             <a:extLst>
               <a:ext uri="{FF2B5EF4-FFF2-40B4-BE49-F238E27FC236}">
-                <a16:creationId xmlns:a16="http://schemas.microsoft.com/office/drawing/2014/main" xmlns="" id="{B1F25F87-91B8-4DBA-8F4F-D1FCC6F48820}"/>
+                <a16:creationId xmlns="" xmlns:a16="http://schemas.microsoft.com/office/drawing/2014/main" id="{B1F25F87-91B8-4DBA-8F4F-D1FCC6F48820}"/>
               </a:ext>
             </a:extLst>
           </p:cNvPr>
@@ -7850,7 +7850,7 @@
           <p:cNvPr id="131" name="Rectángulo 130">
             <a:extLst>
               <a:ext uri="{FF2B5EF4-FFF2-40B4-BE49-F238E27FC236}">
-                <a16:creationId xmlns:a16="http://schemas.microsoft.com/office/drawing/2014/main" xmlns="" id="{554A8A0C-04C9-4B13-B680-ED2C530FDF0B}"/>
+                <a16:creationId xmlns="" xmlns:a16="http://schemas.microsoft.com/office/drawing/2014/main" id="{554A8A0C-04C9-4B13-B680-ED2C530FDF0B}"/>
               </a:ext>
             </a:extLst>
           </p:cNvPr>
@@ -7902,7 +7902,7 @@
           <p:cNvPr id="132" name="Rectángulo 131">
             <a:extLst>
               <a:ext uri="{FF2B5EF4-FFF2-40B4-BE49-F238E27FC236}">
-                <a16:creationId xmlns:a16="http://schemas.microsoft.com/office/drawing/2014/main" xmlns="" id="{A5FEB0EE-2054-45AE-9EE1-4B825B18E553}"/>
+                <a16:creationId xmlns="" xmlns:a16="http://schemas.microsoft.com/office/drawing/2014/main" id="{A5FEB0EE-2054-45AE-9EE1-4B825B18E553}"/>
               </a:ext>
             </a:extLst>
           </p:cNvPr>
@@ -7954,7 +7954,7 @@
           <p:cNvPr id="133" name="Conector recto 132">
             <a:extLst>
               <a:ext uri="{FF2B5EF4-FFF2-40B4-BE49-F238E27FC236}">
-                <a16:creationId xmlns:a16="http://schemas.microsoft.com/office/drawing/2014/main" xmlns="" id="{9728A080-C08B-4B7D-BC7E-0460FFF11793}"/>
+                <a16:creationId xmlns="" xmlns:a16="http://schemas.microsoft.com/office/drawing/2014/main" id="{9728A080-C08B-4B7D-BC7E-0460FFF11793}"/>
               </a:ext>
             </a:extLst>
           </p:cNvPr>
@@ -7997,7 +7997,7 @@
           <p:cNvPr id="134" name="Conector recto 133">
             <a:extLst>
               <a:ext uri="{FF2B5EF4-FFF2-40B4-BE49-F238E27FC236}">
-                <a16:creationId xmlns:a16="http://schemas.microsoft.com/office/drawing/2014/main" xmlns="" id="{4F1DD940-15C4-4EAF-A125-A6D6CDAE609B}"/>
+                <a16:creationId xmlns="" xmlns:a16="http://schemas.microsoft.com/office/drawing/2014/main" id="{4F1DD940-15C4-4EAF-A125-A6D6CDAE609B}"/>
               </a:ext>
             </a:extLst>
           </p:cNvPr>
@@ -8040,7 +8040,7 @@
           <p:cNvPr id="135" name="Conector recto 134">
             <a:extLst>
               <a:ext uri="{FF2B5EF4-FFF2-40B4-BE49-F238E27FC236}">
-                <a16:creationId xmlns:a16="http://schemas.microsoft.com/office/drawing/2014/main" xmlns="" id="{155A2527-4D8D-4EEE-8118-B9FF765DF795}"/>
+                <a16:creationId xmlns="" xmlns:a16="http://schemas.microsoft.com/office/drawing/2014/main" id="{155A2527-4D8D-4EEE-8118-B9FF765DF795}"/>
               </a:ext>
             </a:extLst>
           </p:cNvPr>
@@ -8083,7 +8083,7 @@
           <p:cNvPr id="136" name="Conector recto 135">
             <a:extLst>
               <a:ext uri="{FF2B5EF4-FFF2-40B4-BE49-F238E27FC236}">
-                <a16:creationId xmlns:a16="http://schemas.microsoft.com/office/drawing/2014/main" xmlns="" id="{BD625254-F11A-4485-AE92-3EA55D6A3E6B}"/>
+                <a16:creationId xmlns="" xmlns:a16="http://schemas.microsoft.com/office/drawing/2014/main" id="{BD625254-F11A-4485-AE92-3EA55D6A3E6B}"/>
               </a:ext>
             </a:extLst>
           </p:cNvPr>
@@ -8126,7 +8126,7 @@
           <p:cNvPr id="137" name="Conector recto de flecha 136">
             <a:extLst>
               <a:ext uri="{FF2B5EF4-FFF2-40B4-BE49-F238E27FC236}">
-                <a16:creationId xmlns:a16="http://schemas.microsoft.com/office/drawing/2014/main" xmlns="" id="{843F44FB-27B4-465F-B211-0C94290D22DD}"/>
+                <a16:creationId xmlns="" xmlns:a16="http://schemas.microsoft.com/office/drawing/2014/main" id="{843F44FB-27B4-465F-B211-0C94290D22DD}"/>
               </a:ext>
             </a:extLst>
           </p:cNvPr>
@@ -8168,7 +8168,7 @@
           <p:cNvPr id="138" name="Conector recto de flecha 137">
             <a:extLst>
               <a:ext uri="{FF2B5EF4-FFF2-40B4-BE49-F238E27FC236}">
-                <a16:creationId xmlns:a16="http://schemas.microsoft.com/office/drawing/2014/main" xmlns="" id="{2DEDEAE2-FC0A-4D54-99AD-9DE2C5AA17BD}"/>
+                <a16:creationId xmlns="" xmlns:a16="http://schemas.microsoft.com/office/drawing/2014/main" id="{2DEDEAE2-FC0A-4D54-99AD-9DE2C5AA17BD}"/>
               </a:ext>
             </a:extLst>
           </p:cNvPr>
@@ -8210,7 +8210,7 @@
           <p:cNvPr id="139" name="Conector recto de flecha 138">
             <a:extLst>
               <a:ext uri="{FF2B5EF4-FFF2-40B4-BE49-F238E27FC236}">
-                <a16:creationId xmlns:a16="http://schemas.microsoft.com/office/drawing/2014/main" xmlns="" id="{998EC291-D70D-4EFC-8A75-731BC842D4E6}"/>
+                <a16:creationId xmlns="" xmlns:a16="http://schemas.microsoft.com/office/drawing/2014/main" id="{998EC291-D70D-4EFC-8A75-731BC842D4E6}"/>
               </a:ext>
             </a:extLst>
           </p:cNvPr>
@@ -8252,7 +8252,7 @@
           <p:cNvPr id="140" name="Conector recto de flecha 139">
             <a:extLst>
               <a:ext uri="{FF2B5EF4-FFF2-40B4-BE49-F238E27FC236}">
-                <a16:creationId xmlns:a16="http://schemas.microsoft.com/office/drawing/2014/main" xmlns="" id="{4AF2E7B1-F24E-46BE-AC95-933F62E774B5}"/>
+                <a16:creationId xmlns="" xmlns:a16="http://schemas.microsoft.com/office/drawing/2014/main" id="{4AF2E7B1-F24E-46BE-AC95-933F62E774B5}"/>
               </a:ext>
             </a:extLst>
           </p:cNvPr>
@@ -8294,7 +8294,7 @@
           <p:cNvPr id="141" name="Conector recto 140">
             <a:extLst>
               <a:ext uri="{FF2B5EF4-FFF2-40B4-BE49-F238E27FC236}">
-                <a16:creationId xmlns:a16="http://schemas.microsoft.com/office/drawing/2014/main" xmlns="" id="{EBB8B0FF-9D51-4A12-BC21-792112FDDAAE}"/>
+                <a16:creationId xmlns="" xmlns:a16="http://schemas.microsoft.com/office/drawing/2014/main" id="{EBB8B0FF-9D51-4A12-BC21-792112FDDAAE}"/>
               </a:ext>
             </a:extLst>
           </p:cNvPr>
@@ -8337,7 +8337,7 @@
           <p:cNvPr id="147" name="CuadroTexto 146">
             <a:extLst>
               <a:ext uri="{FF2B5EF4-FFF2-40B4-BE49-F238E27FC236}">
-                <a16:creationId xmlns:a16="http://schemas.microsoft.com/office/drawing/2014/main" xmlns="" id="{9668C58C-D78E-4D25-8355-158E8981188F}"/>
+                <a16:creationId xmlns="" xmlns:a16="http://schemas.microsoft.com/office/drawing/2014/main" id="{9668C58C-D78E-4D25-8355-158E8981188F}"/>
               </a:ext>
             </a:extLst>
           </p:cNvPr>
@@ -8373,7 +8373,7 @@
           <p:cNvPr id="152" name="CuadroTexto 151">
             <a:extLst>
               <a:ext uri="{FF2B5EF4-FFF2-40B4-BE49-F238E27FC236}">
-                <a16:creationId xmlns:a16="http://schemas.microsoft.com/office/drawing/2014/main" xmlns="" id="{1F1C181A-0D8B-4F37-8944-6D716FB908D6}"/>
+                <a16:creationId xmlns="" xmlns:a16="http://schemas.microsoft.com/office/drawing/2014/main" id="{1F1C181A-0D8B-4F37-8944-6D716FB908D6}"/>
               </a:ext>
             </a:extLst>
           </p:cNvPr>
@@ -8416,7 +8416,7 @@
           <p:cNvPr id="155" name="CuadroTexto 154">
             <a:extLst>
               <a:ext uri="{FF2B5EF4-FFF2-40B4-BE49-F238E27FC236}">
-                <a16:creationId xmlns:a16="http://schemas.microsoft.com/office/drawing/2014/main" xmlns="" id="{07EEBB75-5FEB-4660-93E0-682F85271EC6}"/>
+                <a16:creationId xmlns="" xmlns:a16="http://schemas.microsoft.com/office/drawing/2014/main" id="{07EEBB75-5FEB-4660-93E0-682F85271EC6}"/>
               </a:ext>
             </a:extLst>
           </p:cNvPr>
@@ -8457,7 +8457,7 @@
           <p:cNvPr id="156" name="CuadroTexto 155">
             <a:extLst>
               <a:ext uri="{FF2B5EF4-FFF2-40B4-BE49-F238E27FC236}">
-                <a16:creationId xmlns:a16="http://schemas.microsoft.com/office/drawing/2014/main" xmlns="" id="{2594D48D-3FEC-4D47-ADA9-851FB6BC5DF9}"/>
+                <a16:creationId xmlns="" xmlns:a16="http://schemas.microsoft.com/office/drawing/2014/main" id="{2594D48D-3FEC-4D47-ADA9-851FB6BC5DF9}"/>
               </a:ext>
             </a:extLst>
           </p:cNvPr>
@@ -8493,7 +8493,7 @@
           <p:cNvPr id="158" name="CuadroTexto 157">
             <a:extLst>
               <a:ext uri="{FF2B5EF4-FFF2-40B4-BE49-F238E27FC236}">
-                <a16:creationId xmlns:a16="http://schemas.microsoft.com/office/drawing/2014/main" xmlns="" id="{1A45595B-0F85-4F39-BEB4-B08E617F365D}"/>
+                <a16:creationId xmlns="" xmlns:a16="http://schemas.microsoft.com/office/drawing/2014/main" id="{1A45595B-0F85-4F39-BEB4-B08E617F365D}"/>
               </a:ext>
             </a:extLst>
           </p:cNvPr>
@@ -8529,7 +8529,7 @@
           <p:cNvPr id="160" name="CuadroTexto 159">
             <a:extLst>
               <a:ext uri="{FF2B5EF4-FFF2-40B4-BE49-F238E27FC236}">
-                <a16:creationId xmlns:a16="http://schemas.microsoft.com/office/drawing/2014/main" xmlns="" id="{1DC87A09-1AD9-4E28-9B4D-410F0BF33507}"/>
+                <a16:creationId xmlns="" xmlns:a16="http://schemas.microsoft.com/office/drawing/2014/main" id="{1DC87A09-1AD9-4E28-9B4D-410F0BF33507}"/>
               </a:ext>
             </a:extLst>
           </p:cNvPr>
@@ -8563,7 +8563,7 @@
     </p:spTree>
     <p:extLst>
       <p:ext uri="{BB962C8B-B14F-4D97-AF65-F5344CB8AC3E}">
-        <p14:creationId xmlns:p14="http://schemas.microsoft.com/office/powerpoint/2010/main" xmlns="" val="3350800615"/>
+        <p14:creationId xmlns="" xmlns:p14="http://schemas.microsoft.com/office/powerpoint/2010/main" val="3350800615"/>
       </p:ext>
     </p:extLst>
   </p:cSld>
@@ -8595,7 +8595,7 @@
           <p:cNvPr id="37" name="Rectángulo 36">
             <a:extLst>
               <a:ext uri="{FF2B5EF4-FFF2-40B4-BE49-F238E27FC236}">
-                <a16:creationId xmlns:a16="http://schemas.microsoft.com/office/drawing/2014/main" xmlns="" id="{73A11322-BD7B-4952-9DD1-128E56555842}"/>
+                <a16:creationId xmlns="" xmlns:a16="http://schemas.microsoft.com/office/drawing/2014/main" id="{73A11322-BD7B-4952-9DD1-128E56555842}"/>
               </a:ext>
             </a:extLst>
           </p:cNvPr>
@@ -8605,6 +8605,58 @@
         <p:spPr>
           <a:xfrm>
             <a:off x="10884559" y="954504"/>
+            <a:ext cx="312821" cy="312821"/>
+          </a:xfrm>
+          <a:prstGeom prst="rect">
+            <a:avLst/>
+          </a:prstGeom>
+          <a:solidFill>
+            <a:srgbClr val="FF8181"/>
+          </a:solidFill>
+        </p:spPr>
+        <p:style>
+          <a:lnRef idx="2">
+            <a:schemeClr val="dk1"/>
+          </a:lnRef>
+          <a:fillRef idx="1">
+            <a:schemeClr val="lt1"/>
+          </a:fillRef>
+          <a:effectRef idx="0">
+            <a:schemeClr val="dk1"/>
+          </a:effectRef>
+          <a:fontRef idx="minor">
+            <a:schemeClr val="dk1"/>
+          </a:fontRef>
+        </p:style>
+        <p:txBody>
+          <a:bodyPr rtlCol="0" anchor="ctr"/>
+          <a:lstStyle/>
+          <a:p>
+            <a:pPr algn="ctr"/>
+            <a:r>
+              <a:rPr lang="es-ES" sz="1100">
+                <a:latin typeface="Arial Narrow" pitchFamily="34" charset="0"/>
+              </a:rPr>
+              <a:t>00</a:t>
+            </a:r>
+          </a:p>
+        </p:txBody>
+      </p:sp>
+      <p:sp>
+        <p:nvSpPr>
+          <p:cNvPr id="39" name="Rectángulo 38">
+            <a:extLst>
+              <a:ext uri="{FF2B5EF4-FFF2-40B4-BE49-F238E27FC236}">
+                <a16:creationId xmlns="" xmlns:a16="http://schemas.microsoft.com/office/drawing/2014/main" id="{C53C5C9A-E5EB-4DA5-8C17-F97FBBF37148}"/>
+              </a:ext>
+            </a:extLst>
+          </p:cNvPr>
+          <p:cNvSpPr/>
+          <p:nvPr/>
+        </p:nvSpPr>
+        <p:spPr>
+          <a:xfrm>
+            <a:off x="1187116" y="954504"/>
             <a:ext cx="312821" cy="312821"/>
           </a:xfrm>
           <a:prstGeom prst="rect">
@@ -8638,17 +8690,17 @@
                 <a:latin typeface="Arial Narrow" pitchFamily="34" charset="0"/>
                 <a:cs typeface="Arial" pitchFamily="34" charset="0"/>
               </a:rPr>
-              <a:t>00</a:t>
-            </a:r>
-          </a:p>
-        </p:txBody>
-      </p:sp>
-      <p:sp>
-        <p:nvSpPr>
-          <p:cNvPr id="39" name="Rectángulo 38">
-            <a:extLst>
-              <a:ext uri="{FF2B5EF4-FFF2-40B4-BE49-F238E27FC236}">
-                <a16:creationId xmlns:a16="http://schemas.microsoft.com/office/drawing/2014/main" xmlns="" id="{C53C5C9A-E5EB-4DA5-8C17-F97FBBF37148}"/>
+              <a:t>31</a:t>
+            </a:r>
+          </a:p>
+        </p:txBody>
+      </p:sp>
+      <p:sp>
+        <p:nvSpPr>
+          <p:cNvPr id="41" name="Rectángulo 40">
+            <a:extLst>
+              <a:ext uri="{FF2B5EF4-FFF2-40B4-BE49-F238E27FC236}">
+                <a16:creationId xmlns="" xmlns:a16="http://schemas.microsoft.com/office/drawing/2014/main" id="{0F2EAB25-4CC2-4633-AB8F-8DB1CCE2D6E8}"/>
               </a:ext>
             </a:extLst>
           </p:cNvPr>
@@ -8657,14 +8709,14 @@
         </p:nvSpPr>
         <p:spPr>
           <a:xfrm>
-            <a:off x="1187116" y="954504"/>
+            <a:off x="1499937" y="954504"/>
             <a:ext cx="312821" cy="312821"/>
           </a:xfrm>
           <a:prstGeom prst="rect">
             <a:avLst/>
           </a:prstGeom>
           <a:solidFill>
-            <a:srgbClr val="FFA0A0"/>
+            <a:schemeClr val="bg1"/>
           </a:solidFill>
         </p:spPr>
         <p:style>
@@ -8691,17 +8743,17 @@
                 <a:latin typeface="Arial Narrow" pitchFamily="34" charset="0"/>
                 <a:cs typeface="Arial" pitchFamily="34" charset="0"/>
               </a:rPr>
-              <a:t>31</a:t>
-            </a:r>
-          </a:p>
-        </p:txBody>
-      </p:sp>
-      <p:sp>
-        <p:nvSpPr>
-          <p:cNvPr id="41" name="Rectángulo 40">
-            <a:extLst>
-              <a:ext uri="{FF2B5EF4-FFF2-40B4-BE49-F238E27FC236}">
-                <a16:creationId xmlns:a16="http://schemas.microsoft.com/office/drawing/2014/main" xmlns="" id="{0F2EAB25-4CC2-4633-AB8F-8DB1CCE2D6E8}"/>
+              <a:t>30</a:t>
+            </a:r>
+          </a:p>
+        </p:txBody>
+      </p:sp>
+      <p:sp>
+        <p:nvSpPr>
+          <p:cNvPr id="43" name="Rectángulo 42">
+            <a:extLst>
+              <a:ext uri="{FF2B5EF4-FFF2-40B4-BE49-F238E27FC236}">
+                <a16:creationId xmlns="" xmlns:a16="http://schemas.microsoft.com/office/drawing/2014/main" id="{8408589A-C568-45CE-8FE2-359FEF996A5B}"/>
               </a:ext>
             </a:extLst>
           </p:cNvPr>
@@ -8710,14 +8762,14 @@
         </p:nvSpPr>
         <p:spPr>
           <a:xfrm>
-            <a:off x="1499937" y="954504"/>
+            <a:off x="1812758" y="954504"/>
             <a:ext cx="312821" cy="312821"/>
           </a:xfrm>
           <a:prstGeom prst="rect">
             <a:avLst/>
           </a:prstGeom>
           <a:solidFill>
-            <a:srgbClr val="FFA0A0"/>
+            <a:schemeClr val="bg1"/>
           </a:solidFill>
         </p:spPr>
         <p:style>
@@ -8744,17 +8796,17 @@
                 <a:latin typeface="Arial Narrow" pitchFamily="34" charset="0"/>
                 <a:cs typeface="Arial" pitchFamily="34" charset="0"/>
               </a:rPr>
-              <a:t>30</a:t>
-            </a:r>
-          </a:p>
-        </p:txBody>
-      </p:sp>
-      <p:sp>
-        <p:nvSpPr>
-          <p:cNvPr id="43" name="Rectángulo 42">
-            <a:extLst>
-              <a:ext uri="{FF2B5EF4-FFF2-40B4-BE49-F238E27FC236}">
-                <a16:creationId xmlns:a16="http://schemas.microsoft.com/office/drawing/2014/main" xmlns="" id="{8408589A-C568-45CE-8FE2-359FEF996A5B}"/>
+              <a:t>29</a:t>
+            </a:r>
+          </a:p>
+        </p:txBody>
+      </p:sp>
+      <p:sp>
+        <p:nvSpPr>
+          <p:cNvPr id="45" name="Rectángulo 44">
+            <a:extLst>
+              <a:ext uri="{FF2B5EF4-FFF2-40B4-BE49-F238E27FC236}">
+                <a16:creationId xmlns="" xmlns:a16="http://schemas.microsoft.com/office/drawing/2014/main" id="{A49ADF89-E9B5-4F79-A008-E954C111F442}"/>
               </a:ext>
             </a:extLst>
           </p:cNvPr>
@@ -8763,14 +8815,14 @@
         </p:nvSpPr>
         <p:spPr>
           <a:xfrm>
-            <a:off x="1812758" y="954504"/>
+            <a:off x="2125578" y="954504"/>
             <a:ext cx="312821" cy="312821"/>
           </a:xfrm>
           <a:prstGeom prst="rect">
             <a:avLst/>
           </a:prstGeom>
           <a:solidFill>
-            <a:srgbClr val="FFA0A0"/>
+            <a:schemeClr val="bg1"/>
           </a:solidFill>
         </p:spPr>
         <p:style>
@@ -8797,17 +8849,17 @@
                 <a:latin typeface="Arial Narrow" pitchFamily="34" charset="0"/>
                 <a:cs typeface="Arial" pitchFamily="34" charset="0"/>
               </a:rPr>
-              <a:t>29</a:t>
-            </a:r>
-          </a:p>
-        </p:txBody>
-      </p:sp>
-      <p:sp>
-        <p:nvSpPr>
-          <p:cNvPr id="45" name="Rectángulo 44">
-            <a:extLst>
-              <a:ext uri="{FF2B5EF4-FFF2-40B4-BE49-F238E27FC236}">
-                <a16:creationId xmlns:a16="http://schemas.microsoft.com/office/drawing/2014/main" xmlns="" id="{A49ADF89-E9B5-4F79-A008-E954C111F442}"/>
+              <a:t>28</a:t>
+            </a:r>
+          </a:p>
+        </p:txBody>
+      </p:sp>
+      <p:sp>
+        <p:nvSpPr>
+          <p:cNvPr id="47" name="Rectángulo 46">
+            <a:extLst>
+              <a:ext uri="{FF2B5EF4-FFF2-40B4-BE49-F238E27FC236}">
+                <a16:creationId xmlns="" xmlns:a16="http://schemas.microsoft.com/office/drawing/2014/main" id="{77FC50C9-9615-4656-B857-8741C629A335}"/>
               </a:ext>
             </a:extLst>
           </p:cNvPr>
@@ -8816,14 +8868,14 @@
         </p:nvSpPr>
         <p:spPr>
           <a:xfrm>
-            <a:off x="2125578" y="954504"/>
+            <a:off x="2438399" y="954504"/>
             <a:ext cx="312821" cy="312821"/>
           </a:xfrm>
           <a:prstGeom prst="rect">
             <a:avLst/>
           </a:prstGeom>
           <a:solidFill>
-            <a:srgbClr val="FFA0A0"/>
+            <a:schemeClr val="bg1"/>
           </a:solidFill>
         </p:spPr>
         <p:style>
@@ -8850,17 +8902,17 @@
                 <a:latin typeface="Arial Narrow" pitchFamily="34" charset="0"/>
                 <a:cs typeface="Arial" pitchFamily="34" charset="0"/>
               </a:rPr>
-              <a:t>28</a:t>
-            </a:r>
-          </a:p>
-        </p:txBody>
-      </p:sp>
-      <p:sp>
-        <p:nvSpPr>
-          <p:cNvPr id="47" name="Rectángulo 46">
-            <a:extLst>
-              <a:ext uri="{FF2B5EF4-FFF2-40B4-BE49-F238E27FC236}">
-                <a16:creationId xmlns:a16="http://schemas.microsoft.com/office/drawing/2014/main" xmlns="" id="{77FC50C9-9615-4656-B857-8741C629A335}"/>
+              <a:t>27</a:t>
+            </a:r>
+          </a:p>
+        </p:txBody>
+      </p:sp>
+      <p:sp>
+        <p:nvSpPr>
+          <p:cNvPr id="49" name="Rectángulo 48">
+            <a:extLst>
+              <a:ext uri="{FF2B5EF4-FFF2-40B4-BE49-F238E27FC236}">
+                <a16:creationId xmlns="" xmlns:a16="http://schemas.microsoft.com/office/drawing/2014/main" id="{7B76901C-3641-43B1-91FD-7E1EB9CF8B4C}"/>
               </a:ext>
             </a:extLst>
           </p:cNvPr>
@@ -8869,14 +8921,14 @@
         </p:nvSpPr>
         <p:spPr>
           <a:xfrm>
-            <a:off x="2438399" y="954504"/>
+            <a:off x="2751220" y="954504"/>
             <a:ext cx="312821" cy="312821"/>
           </a:xfrm>
           <a:prstGeom prst="rect">
             <a:avLst/>
           </a:prstGeom>
           <a:solidFill>
-            <a:srgbClr val="FFA0A0"/>
+            <a:schemeClr val="bg1"/>
           </a:solidFill>
         </p:spPr>
         <p:style>
@@ -8903,17 +8955,17 @@
                 <a:latin typeface="Arial Narrow" pitchFamily="34" charset="0"/>
                 <a:cs typeface="Arial" pitchFamily="34" charset="0"/>
               </a:rPr>
-              <a:t>27</a:t>
-            </a:r>
-          </a:p>
-        </p:txBody>
-      </p:sp>
-      <p:sp>
-        <p:nvSpPr>
-          <p:cNvPr id="49" name="Rectángulo 48">
-            <a:extLst>
-              <a:ext uri="{FF2B5EF4-FFF2-40B4-BE49-F238E27FC236}">
-                <a16:creationId xmlns:a16="http://schemas.microsoft.com/office/drawing/2014/main" xmlns="" id="{7B76901C-3641-43B1-91FD-7E1EB9CF8B4C}"/>
+              <a:t>26</a:t>
+            </a:r>
+          </a:p>
+        </p:txBody>
+      </p:sp>
+      <p:sp>
+        <p:nvSpPr>
+          <p:cNvPr id="51" name="Rectángulo 50">
+            <a:extLst>
+              <a:ext uri="{FF2B5EF4-FFF2-40B4-BE49-F238E27FC236}">
+                <a16:creationId xmlns="" xmlns:a16="http://schemas.microsoft.com/office/drawing/2014/main" id="{E8883506-0AEB-48CD-86B3-650E1B735A04}"/>
               </a:ext>
             </a:extLst>
           </p:cNvPr>
@@ -8922,14 +8974,14 @@
         </p:nvSpPr>
         <p:spPr>
           <a:xfrm>
-            <a:off x="2751220" y="954504"/>
+            <a:off x="3064041" y="954504"/>
             <a:ext cx="312821" cy="312821"/>
           </a:xfrm>
           <a:prstGeom prst="rect">
             <a:avLst/>
           </a:prstGeom>
           <a:solidFill>
-            <a:srgbClr val="FFA0A0"/>
+            <a:schemeClr val="bg1"/>
           </a:solidFill>
         </p:spPr>
         <p:style>
@@ -8956,17 +9008,17 @@
                 <a:latin typeface="Arial Narrow" pitchFamily="34" charset="0"/>
                 <a:cs typeface="Arial" pitchFamily="34" charset="0"/>
               </a:rPr>
-              <a:t>26</a:t>
-            </a:r>
-          </a:p>
-        </p:txBody>
-      </p:sp>
-      <p:sp>
-        <p:nvSpPr>
-          <p:cNvPr id="51" name="Rectángulo 50">
-            <a:extLst>
-              <a:ext uri="{FF2B5EF4-FFF2-40B4-BE49-F238E27FC236}">
-                <a16:creationId xmlns:a16="http://schemas.microsoft.com/office/drawing/2014/main" xmlns="" id="{E8883506-0AEB-48CD-86B3-650E1B735A04}"/>
+              <a:t>25</a:t>
+            </a:r>
+          </a:p>
+        </p:txBody>
+      </p:sp>
+      <p:sp>
+        <p:nvSpPr>
+          <p:cNvPr id="53" name="Rectángulo 52">
+            <a:extLst>
+              <a:ext uri="{FF2B5EF4-FFF2-40B4-BE49-F238E27FC236}">
+                <a16:creationId xmlns="" xmlns:a16="http://schemas.microsoft.com/office/drawing/2014/main" id="{3647FA28-8B9B-4523-9A28-2C419E6BD457}"/>
               </a:ext>
             </a:extLst>
           </p:cNvPr>
@@ -8975,14 +9027,14 @@
         </p:nvSpPr>
         <p:spPr>
           <a:xfrm>
-            <a:off x="3064041" y="954504"/>
+            <a:off x="3376861" y="954504"/>
             <a:ext cx="312821" cy="312821"/>
           </a:xfrm>
           <a:prstGeom prst="rect">
             <a:avLst/>
           </a:prstGeom>
           <a:solidFill>
-            <a:srgbClr val="FFA0A0"/>
+            <a:schemeClr val="bg1"/>
           </a:solidFill>
         </p:spPr>
         <p:style>
@@ -9009,17 +9061,17 @@
                 <a:latin typeface="Arial Narrow" pitchFamily="34" charset="0"/>
                 <a:cs typeface="Arial" pitchFamily="34" charset="0"/>
               </a:rPr>
-              <a:t>25</a:t>
-            </a:r>
-          </a:p>
-        </p:txBody>
-      </p:sp>
-      <p:sp>
-        <p:nvSpPr>
-          <p:cNvPr id="53" name="Rectángulo 52">
-            <a:extLst>
-              <a:ext uri="{FF2B5EF4-FFF2-40B4-BE49-F238E27FC236}">
-                <a16:creationId xmlns:a16="http://schemas.microsoft.com/office/drawing/2014/main" xmlns="" id="{3647FA28-8B9B-4523-9A28-2C419E6BD457}"/>
+              <a:t>24</a:t>
+            </a:r>
+          </a:p>
+        </p:txBody>
+      </p:sp>
+      <p:sp>
+        <p:nvSpPr>
+          <p:cNvPr id="55" name="Rectángulo 54">
+            <a:extLst>
+              <a:ext uri="{FF2B5EF4-FFF2-40B4-BE49-F238E27FC236}">
+                <a16:creationId xmlns="" xmlns:a16="http://schemas.microsoft.com/office/drawing/2014/main" id="{AC9C5108-0819-4498-8FA9-53C5473E8D27}"/>
               </a:ext>
             </a:extLst>
           </p:cNvPr>
@@ -9028,14 +9080,14 @@
         </p:nvSpPr>
         <p:spPr>
           <a:xfrm>
-            <a:off x="3376861" y="954504"/>
+            <a:off x="3689682" y="954504"/>
             <a:ext cx="312821" cy="312821"/>
           </a:xfrm>
           <a:prstGeom prst="rect">
             <a:avLst/>
           </a:prstGeom>
           <a:solidFill>
-            <a:srgbClr val="FFA0A0"/>
+            <a:srgbClr val="64A0FF"/>
           </a:solidFill>
         </p:spPr>
         <p:style>
@@ -9062,17 +9114,17 @@
                 <a:latin typeface="Arial Narrow" pitchFamily="34" charset="0"/>
                 <a:cs typeface="Arial" pitchFamily="34" charset="0"/>
               </a:rPr>
-              <a:t>24</a:t>
-            </a:r>
-          </a:p>
-        </p:txBody>
-      </p:sp>
-      <p:sp>
-        <p:nvSpPr>
-          <p:cNvPr id="55" name="Rectángulo 54">
-            <a:extLst>
-              <a:ext uri="{FF2B5EF4-FFF2-40B4-BE49-F238E27FC236}">
-                <a16:creationId xmlns:a16="http://schemas.microsoft.com/office/drawing/2014/main" xmlns="" id="{AC9C5108-0819-4498-8FA9-53C5473E8D27}"/>
+              <a:t>23</a:t>
+            </a:r>
+          </a:p>
+        </p:txBody>
+      </p:sp>
+      <p:sp>
+        <p:nvSpPr>
+          <p:cNvPr id="57" name="Rectángulo 56">
+            <a:extLst>
+              <a:ext uri="{FF2B5EF4-FFF2-40B4-BE49-F238E27FC236}">
+                <a16:creationId xmlns="" xmlns:a16="http://schemas.microsoft.com/office/drawing/2014/main" id="{06EB9E5F-EAA4-4250-98C4-2A775787C77C}"/>
               </a:ext>
             </a:extLst>
           </p:cNvPr>
@@ -9081,14 +9133,14 @@
         </p:nvSpPr>
         <p:spPr>
           <a:xfrm>
-            <a:off x="3689682" y="954504"/>
+            <a:off x="4002503" y="954504"/>
             <a:ext cx="312821" cy="312821"/>
           </a:xfrm>
           <a:prstGeom prst="rect">
             <a:avLst/>
           </a:prstGeom>
           <a:solidFill>
-            <a:srgbClr val="A0FFA0"/>
+            <a:srgbClr val="64A0FF"/>
           </a:solidFill>
         </p:spPr>
         <p:style>
@@ -9115,17 +9167,17 @@
                 <a:latin typeface="Arial Narrow" pitchFamily="34" charset="0"/>
                 <a:cs typeface="Arial" pitchFamily="34" charset="0"/>
               </a:rPr>
-              <a:t>23</a:t>
-            </a:r>
-          </a:p>
-        </p:txBody>
-      </p:sp>
-      <p:sp>
-        <p:nvSpPr>
-          <p:cNvPr id="57" name="Rectángulo 56">
-            <a:extLst>
-              <a:ext uri="{FF2B5EF4-FFF2-40B4-BE49-F238E27FC236}">
-                <a16:creationId xmlns:a16="http://schemas.microsoft.com/office/drawing/2014/main" xmlns="" id="{06EB9E5F-EAA4-4250-98C4-2A775787C77C}"/>
+              <a:t>22</a:t>
+            </a:r>
+          </a:p>
+        </p:txBody>
+      </p:sp>
+      <p:sp>
+        <p:nvSpPr>
+          <p:cNvPr id="59" name="Rectángulo 58">
+            <a:extLst>
+              <a:ext uri="{FF2B5EF4-FFF2-40B4-BE49-F238E27FC236}">
+                <a16:creationId xmlns="" xmlns:a16="http://schemas.microsoft.com/office/drawing/2014/main" id="{91E5A6FD-A6CE-477D-AC67-309F3D79896E}"/>
               </a:ext>
             </a:extLst>
           </p:cNvPr>
@@ -9134,14 +9186,14 @@
         </p:nvSpPr>
         <p:spPr>
           <a:xfrm>
-            <a:off x="4002503" y="954504"/>
+            <a:off x="4315324" y="954504"/>
             <a:ext cx="312821" cy="312821"/>
           </a:xfrm>
           <a:prstGeom prst="rect">
             <a:avLst/>
           </a:prstGeom>
           <a:solidFill>
-            <a:srgbClr val="A0FFA0"/>
+            <a:srgbClr val="64A0FF"/>
           </a:solidFill>
         </p:spPr>
         <p:style>
@@ -9168,17 +9220,17 @@
                 <a:latin typeface="Arial Narrow" pitchFamily="34" charset="0"/>
                 <a:cs typeface="Arial" pitchFamily="34" charset="0"/>
               </a:rPr>
-              <a:t>22</a:t>
-            </a:r>
-          </a:p>
-        </p:txBody>
-      </p:sp>
-      <p:sp>
-        <p:nvSpPr>
-          <p:cNvPr id="59" name="Rectángulo 58">
-            <a:extLst>
-              <a:ext uri="{FF2B5EF4-FFF2-40B4-BE49-F238E27FC236}">
-                <a16:creationId xmlns:a16="http://schemas.microsoft.com/office/drawing/2014/main" xmlns="" id="{91E5A6FD-A6CE-477D-AC67-309F3D79896E}"/>
+              <a:t>21</a:t>
+            </a:r>
+          </a:p>
+        </p:txBody>
+      </p:sp>
+      <p:sp>
+        <p:nvSpPr>
+          <p:cNvPr id="61" name="Rectángulo 60">
+            <a:extLst>
+              <a:ext uri="{FF2B5EF4-FFF2-40B4-BE49-F238E27FC236}">
+                <a16:creationId xmlns="" xmlns:a16="http://schemas.microsoft.com/office/drawing/2014/main" id="{66BC7115-24DA-4563-9B74-FE2D1F2541B9}"/>
               </a:ext>
             </a:extLst>
           </p:cNvPr>
@@ -9187,14 +9239,14 @@
         </p:nvSpPr>
         <p:spPr>
           <a:xfrm>
-            <a:off x="4315324" y="954504"/>
+            <a:off x="4628144" y="954504"/>
             <a:ext cx="312821" cy="312821"/>
           </a:xfrm>
           <a:prstGeom prst="rect">
             <a:avLst/>
           </a:prstGeom>
           <a:solidFill>
-            <a:srgbClr val="A0FFA0"/>
+            <a:srgbClr val="64A0FF"/>
           </a:solidFill>
         </p:spPr>
         <p:style>
@@ -9221,17 +9273,17 @@
                 <a:latin typeface="Arial Narrow" pitchFamily="34" charset="0"/>
                 <a:cs typeface="Arial" pitchFamily="34" charset="0"/>
               </a:rPr>
-              <a:t>21</a:t>
-            </a:r>
-          </a:p>
-        </p:txBody>
-      </p:sp>
-      <p:sp>
-        <p:nvSpPr>
-          <p:cNvPr id="61" name="Rectángulo 60">
-            <a:extLst>
-              <a:ext uri="{FF2B5EF4-FFF2-40B4-BE49-F238E27FC236}">
-                <a16:creationId xmlns:a16="http://schemas.microsoft.com/office/drawing/2014/main" xmlns="" id="{66BC7115-24DA-4563-9B74-FE2D1F2541B9}"/>
+              <a:t>20</a:t>
+            </a:r>
+          </a:p>
+        </p:txBody>
+      </p:sp>
+      <p:sp>
+        <p:nvSpPr>
+          <p:cNvPr id="63" name="Rectángulo 62">
+            <a:extLst>
+              <a:ext uri="{FF2B5EF4-FFF2-40B4-BE49-F238E27FC236}">
+                <a16:creationId xmlns="" xmlns:a16="http://schemas.microsoft.com/office/drawing/2014/main" id="{D4D6122B-29C3-4E64-A495-591E6D313C6D}"/>
               </a:ext>
             </a:extLst>
           </p:cNvPr>
@@ -9240,14 +9292,14 @@
         </p:nvSpPr>
         <p:spPr>
           <a:xfrm>
-            <a:off x="4628144" y="954504"/>
+            <a:off x="4940965" y="954504"/>
             <a:ext cx="312821" cy="312821"/>
           </a:xfrm>
           <a:prstGeom prst="rect">
             <a:avLst/>
           </a:prstGeom>
           <a:solidFill>
-            <a:srgbClr val="A0FFA0"/>
+            <a:srgbClr val="64A0FF"/>
           </a:solidFill>
         </p:spPr>
         <p:style>
@@ -9274,17 +9326,17 @@
                 <a:latin typeface="Arial Narrow" pitchFamily="34" charset="0"/>
                 <a:cs typeface="Arial" pitchFamily="34" charset="0"/>
               </a:rPr>
-              <a:t>20</a:t>
-            </a:r>
-          </a:p>
-        </p:txBody>
-      </p:sp>
-      <p:sp>
-        <p:nvSpPr>
-          <p:cNvPr id="63" name="Rectángulo 62">
-            <a:extLst>
-              <a:ext uri="{FF2B5EF4-FFF2-40B4-BE49-F238E27FC236}">
-                <a16:creationId xmlns:a16="http://schemas.microsoft.com/office/drawing/2014/main" xmlns="" id="{D4D6122B-29C3-4E64-A495-591E6D313C6D}"/>
+              <a:t>19</a:t>
+            </a:r>
+          </a:p>
+        </p:txBody>
+      </p:sp>
+      <p:sp>
+        <p:nvSpPr>
+          <p:cNvPr id="65" name="Rectángulo 64">
+            <a:extLst>
+              <a:ext uri="{FF2B5EF4-FFF2-40B4-BE49-F238E27FC236}">
+                <a16:creationId xmlns="" xmlns:a16="http://schemas.microsoft.com/office/drawing/2014/main" id="{A0C5C6CD-42AB-4827-8F03-2D716DB4068E}"/>
               </a:ext>
             </a:extLst>
           </p:cNvPr>
@@ -9293,14 +9345,14 @@
         </p:nvSpPr>
         <p:spPr>
           <a:xfrm>
-            <a:off x="4940965" y="954504"/>
+            <a:off x="5253786" y="954504"/>
             <a:ext cx="312821" cy="312821"/>
           </a:xfrm>
           <a:prstGeom prst="rect">
             <a:avLst/>
           </a:prstGeom>
           <a:solidFill>
-            <a:srgbClr val="A0FFA0"/>
+            <a:srgbClr val="64A0FF"/>
           </a:solidFill>
         </p:spPr>
         <p:style>
@@ -9327,17 +9379,17 @@
                 <a:latin typeface="Arial Narrow" pitchFamily="34" charset="0"/>
                 <a:cs typeface="Arial" pitchFamily="34" charset="0"/>
               </a:rPr>
-              <a:t>19</a:t>
-            </a:r>
-          </a:p>
-        </p:txBody>
-      </p:sp>
-      <p:sp>
-        <p:nvSpPr>
-          <p:cNvPr id="65" name="Rectángulo 64">
-            <a:extLst>
-              <a:ext uri="{FF2B5EF4-FFF2-40B4-BE49-F238E27FC236}">
-                <a16:creationId xmlns:a16="http://schemas.microsoft.com/office/drawing/2014/main" xmlns="" id="{A0C5C6CD-42AB-4827-8F03-2D716DB4068E}"/>
+              <a:t>18</a:t>
+            </a:r>
+          </a:p>
+        </p:txBody>
+      </p:sp>
+      <p:sp>
+        <p:nvSpPr>
+          <p:cNvPr id="67" name="Rectángulo 66">
+            <a:extLst>
+              <a:ext uri="{FF2B5EF4-FFF2-40B4-BE49-F238E27FC236}">
+                <a16:creationId xmlns="" xmlns:a16="http://schemas.microsoft.com/office/drawing/2014/main" id="{998369E3-C0D1-4062-B22B-FC1E030F1EC0}"/>
               </a:ext>
             </a:extLst>
           </p:cNvPr>
@@ -9346,14 +9398,14 @@
         </p:nvSpPr>
         <p:spPr>
           <a:xfrm>
-            <a:off x="5253786" y="954504"/>
+            <a:off x="5566607" y="954504"/>
             <a:ext cx="312821" cy="312821"/>
           </a:xfrm>
           <a:prstGeom prst="rect">
             <a:avLst/>
           </a:prstGeom>
           <a:solidFill>
-            <a:srgbClr val="A0FFA0"/>
+            <a:srgbClr val="64A0FF"/>
           </a:solidFill>
         </p:spPr>
         <p:style>
@@ -9380,17 +9432,17 @@
                 <a:latin typeface="Arial Narrow" pitchFamily="34" charset="0"/>
                 <a:cs typeface="Arial" pitchFamily="34" charset="0"/>
               </a:rPr>
-              <a:t>18</a:t>
-            </a:r>
-          </a:p>
-        </p:txBody>
-      </p:sp>
-      <p:sp>
-        <p:nvSpPr>
-          <p:cNvPr id="67" name="Rectángulo 66">
-            <a:extLst>
-              <a:ext uri="{FF2B5EF4-FFF2-40B4-BE49-F238E27FC236}">
-                <a16:creationId xmlns:a16="http://schemas.microsoft.com/office/drawing/2014/main" xmlns="" id="{998369E3-C0D1-4062-B22B-FC1E030F1EC0}"/>
+              <a:t>17</a:t>
+            </a:r>
+          </a:p>
+        </p:txBody>
+      </p:sp>
+      <p:sp>
+        <p:nvSpPr>
+          <p:cNvPr id="69" name="Rectángulo 68">
+            <a:extLst>
+              <a:ext uri="{FF2B5EF4-FFF2-40B4-BE49-F238E27FC236}">
+                <a16:creationId xmlns="" xmlns:a16="http://schemas.microsoft.com/office/drawing/2014/main" id="{8C8A129F-CE3A-42F7-989D-57705327C731}"/>
               </a:ext>
             </a:extLst>
           </p:cNvPr>
@@ -9399,14 +9451,14 @@
         </p:nvSpPr>
         <p:spPr>
           <a:xfrm>
-            <a:off x="5566607" y="954504"/>
+            <a:off x="5879427" y="954504"/>
             <a:ext cx="312821" cy="312821"/>
           </a:xfrm>
           <a:prstGeom prst="rect">
             <a:avLst/>
           </a:prstGeom>
           <a:solidFill>
-            <a:srgbClr val="A0FFA0"/>
+            <a:srgbClr val="64A0FF"/>
           </a:solidFill>
         </p:spPr>
         <p:style>
@@ -9433,17 +9485,17 @@
                 <a:latin typeface="Arial Narrow" pitchFamily="34" charset="0"/>
                 <a:cs typeface="Arial" pitchFamily="34" charset="0"/>
               </a:rPr>
-              <a:t>17</a:t>
-            </a:r>
-          </a:p>
-        </p:txBody>
-      </p:sp>
-      <p:sp>
-        <p:nvSpPr>
-          <p:cNvPr id="69" name="Rectángulo 68">
-            <a:extLst>
-              <a:ext uri="{FF2B5EF4-FFF2-40B4-BE49-F238E27FC236}">
-                <a16:creationId xmlns:a16="http://schemas.microsoft.com/office/drawing/2014/main" xmlns="" id="{8C8A129F-CE3A-42F7-989D-57705327C731}"/>
+              <a:t>16</a:t>
+            </a:r>
+          </a:p>
+        </p:txBody>
+      </p:sp>
+      <p:sp>
+        <p:nvSpPr>
+          <p:cNvPr id="71" name="Rectángulo 70">
+            <a:extLst>
+              <a:ext uri="{FF2B5EF4-FFF2-40B4-BE49-F238E27FC236}">
+                <a16:creationId xmlns="" xmlns:a16="http://schemas.microsoft.com/office/drawing/2014/main" id="{31118911-2DA9-4629-8126-3B0790309E88}"/>
               </a:ext>
             </a:extLst>
           </p:cNvPr>
@@ -9452,7 +9504,7 @@
         </p:nvSpPr>
         <p:spPr>
           <a:xfrm>
-            <a:off x="5879427" y="954504"/>
+            <a:off x="6192248" y="954504"/>
             <a:ext cx="312821" cy="312821"/>
           </a:xfrm>
           <a:prstGeom prst="rect">
@@ -9486,17 +9538,17 @@
                 <a:latin typeface="Arial Narrow" pitchFamily="34" charset="0"/>
                 <a:cs typeface="Arial" pitchFamily="34" charset="0"/>
               </a:rPr>
-              <a:t>16</a:t>
-            </a:r>
-          </a:p>
-        </p:txBody>
-      </p:sp>
-      <p:sp>
-        <p:nvSpPr>
-          <p:cNvPr id="71" name="Rectángulo 70">
-            <a:extLst>
-              <a:ext uri="{FF2B5EF4-FFF2-40B4-BE49-F238E27FC236}">
-                <a16:creationId xmlns:a16="http://schemas.microsoft.com/office/drawing/2014/main" xmlns="" id="{31118911-2DA9-4629-8126-3B0790309E88}"/>
+              <a:t>15</a:t>
+            </a:r>
+          </a:p>
+        </p:txBody>
+      </p:sp>
+      <p:sp>
+        <p:nvSpPr>
+          <p:cNvPr id="73" name="Rectángulo 72">
+            <a:extLst>
+              <a:ext uri="{FF2B5EF4-FFF2-40B4-BE49-F238E27FC236}">
+                <a16:creationId xmlns="" xmlns:a16="http://schemas.microsoft.com/office/drawing/2014/main" id="{C298D969-0C75-4420-91F8-6F6DA98C4834}"/>
               </a:ext>
             </a:extLst>
           </p:cNvPr>
@@ -9505,14 +9557,14 @@
         </p:nvSpPr>
         <p:spPr>
           <a:xfrm>
-            <a:off x="6192248" y="954504"/>
+            <a:off x="6505069" y="954504"/>
             <a:ext cx="312821" cy="312821"/>
           </a:xfrm>
           <a:prstGeom prst="rect">
             <a:avLst/>
           </a:prstGeom>
           <a:solidFill>
-            <a:srgbClr val="64A0FF"/>
+            <a:srgbClr val="A0FFA0"/>
           </a:solidFill>
         </p:spPr>
         <p:style>
@@ -9539,17 +9591,17 @@
                 <a:latin typeface="Arial Narrow" pitchFamily="34" charset="0"/>
                 <a:cs typeface="Arial" pitchFamily="34" charset="0"/>
               </a:rPr>
-              <a:t>15</a:t>
-            </a:r>
-          </a:p>
-        </p:txBody>
-      </p:sp>
-      <p:sp>
-        <p:nvSpPr>
-          <p:cNvPr id="73" name="Rectángulo 72">
-            <a:extLst>
-              <a:ext uri="{FF2B5EF4-FFF2-40B4-BE49-F238E27FC236}">
-                <a16:creationId xmlns:a16="http://schemas.microsoft.com/office/drawing/2014/main" xmlns="" id="{C298D969-0C75-4420-91F8-6F6DA98C4834}"/>
+              <a:t>14</a:t>
+            </a:r>
+          </a:p>
+        </p:txBody>
+      </p:sp>
+      <p:sp>
+        <p:nvSpPr>
+          <p:cNvPr id="75" name="Rectángulo 74">
+            <a:extLst>
+              <a:ext uri="{FF2B5EF4-FFF2-40B4-BE49-F238E27FC236}">
+                <a16:creationId xmlns="" xmlns:a16="http://schemas.microsoft.com/office/drawing/2014/main" id="{24A63E33-0EB4-406C-948A-7DCB4F602629}"/>
               </a:ext>
             </a:extLst>
           </p:cNvPr>
@@ -9558,14 +9610,14 @@
         </p:nvSpPr>
         <p:spPr>
           <a:xfrm>
-            <a:off x="6505069" y="954504"/>
+            <a:off x="6817890" y="954504"/>
             <a:ext cx="312821" cy="312821"/>
           </a:xfrm>
           <a:prstGeom prst="rect">
             <a:avLst/>
           </a:prstGeom>
           <a:solidFill>
-            <a:srgbClr val="64A0FF"/>
+            <a:srgbClr val="A0FFA0"/>
           </a:solidFill>
         </p:spPr>
         <p:style>
@@ -9592,17 +9644,17 @@
                 <a:latin typeface="Arial Narrow" pitchFamily="34" charset="0"/>
                 <a:cs typeface="Arial" pitchFamily="34" charset="0"/>
               </a:rPr>
-              <a:t>14</a:t>
-            </a:r>
-          </a:p>
-        </p:txBody>
-      </p:sp>
-      <p:sp>
-        <p:nvSpPr>
-          <p:cNvPr id="75" name="Rectángulo 74">
-            <a:extLst>
-              <a:ext uri="{FF2B5EF4-FFF2-40B4-BE49-F238E27FC236}">
-                <a16:creationId xmlns:a16="http://schemas.microsoft.com/office/drawing/2014/main" xmlns="" id="{24A63E33-0EB4-406C-948A-7DCB4F602629}"/>
+              <a:t>13</a:t>
+            </a:r>
+          </a:p>
+        </p:txBody>
+      </p:sp>
+      <p:sp>
+        <p:nvSpPr>
+          <p:cNvPr id="77" name="Rectángulo 76">
+            <a:extLst>
+              <a:ext uri="{FF2B5EF4-FFF2-40B4-BE49-F238E27FC236}">
+                <a16:creationId xmlns="" xmlns:a16="http://schemas.microsoft.com/office/drawing/2014/main" id="{0AD256CC-2326-4D3A-A4F3-9009626585EF}"/>
               </a:ext>
             </a:extLst>
           </p:cNvPr>
@@ -9611,14 +9663,14 @@
         </p:nvSpPr>
         <p:spPr>
           <a:xfrm>
-            <a:off x="6817890" y="954504"/>
+            <a:off x="7130710" y="954504"/>
             <a:ext cx="312821" cy="312821"/>
           </a:xfrm>
           <a:prstGeom prst="rect">
             <a:avLst/>
           </a:prstGeom>
           <a:solidFill>
-            <a:srgbClr val="64A0FF"/>
+            <a:srgbClr val="A0FFA0"/>
           </a:solidFill>
         </p:spPr>
         <p:style>
@@ -9645,17 +9697,17 @@
                 <a:latin typeface="Arial Narrow" pitchFamily="34" charset="0"/>
                 <a:cs typeface="Arial" pitchFamily="34" charset="0"/>
               </a:rPr>
-              <a:t>13</a:t>
-            </a:r>
-          </a:p>
-        </p:txBody>
-      </p:sp>
-      <p:sp>
-        <p:nvSpPr>
-          <p:cNvPr id="77" name="Rectángulo 76">
-            <a:extLst>
-              <a:ext uri="{FF2B5EF4-FFF2-40B4-BE49-F238E27FC236}">
-                <a16:creationId xmlns:a16="http://schemas.microsoft.com/office/drawing/2014/main" xmlns="" id="{0AD256CC-2326-4D3A-A4F3-9009626585EF}"/>
+              <a:t>12</a:t>
+            </a:r>
+          </a:p>
+        </p:txBody>
+      </p:sp>
+      <p:sp>
+        <p:nvSpPr>
+          <p:cNvPr id="79" name="Rectángulo 78">
+            <a:extLst>
+              <a:ext uri="{FF2B5EF4-FFF2-40B4-BE49-F238E27FC236}">
+                <a16:creationId xmlns="" xmlns:a16="http://schemas.microsoft.com/office/drawing/2014/main" id="{A54D63F3-7726-43D7-A4B5-73CAFA9AC152}"/>
               </a:ext>
             </a:extLst>
           </p:cNvPr>
@@ -9664,14 +9716,14 @@
         </p:nvSpPr>
         <p:spPr>
           <a:xfrm>
-            <a:off x="7130710" y="954504"/>
+            <a:off x="7443531" y="954504"/>
             <a:ext cx="312821" cy="312821"/>
           </a:xfrm>
           <a:prstGeom prst="rect">
             <a:avLst/>
           </a:prstGeom>
           <a:solidFill>
-            <a:srgbClr val="64A0FF"/>
+            <a:srgbClr val="A0FFA0"/>
           </a:solidFill>
         </p:spPr>
         <p:style>
@@ -9698,17 +9750,17 @@
                 <a:latin typeface="Arial Narrow" pitchFamily="34" charset="0"/>
                 <a:cs typeface="Arial" pitchFamily="34" charset="0"/>
               </a:rPr>
-              <a:t>12</a:t>
-            </a:r>
-          </a:p>
-        </p:txBody>
-      </p:sp>
-      <p:sp>
-        <p:nvSpPr>
-          <p:cNvPr id="79" name="Rectángulo 78">
-            <a:extLst>
-              <a:ext uri="{FF2B5EF4-FFF2-40B4-BE49-F238E27FC236}">
-                <a16:creationId xmlns:a16="http://schemas.microsoft.com/office/drawing/2014/main" xmlns="" id="{A54D63F3-7726-43D7-A4B5-73CAFA9AC152}"/>
+              <a:t>11</a:t>
+            </a:r>
+          </a:p>
+        </p:txBody>
+      </p:sp>
+      <p:sp>
+        <p:nvSpPr>
+          <p:cNvPr id="81" name="Rectángulo 80">
+            <a:extLst>
+              <a:ext uri="{FF2B5EF4-FFF2-40B4-BE49-F238E27FC236}">
+                <a16:creationId xmlns="" xmlns:a16="http://schemas.microsoft.com/office/drawing/2014/main" id="{DD73C27A-9EDC-4EE2-B6F0-265E687B828F}"/>
               </a:ext>
             </a:extLst>
           </p:cNvPr>
@@ -9717,14 +9769,14 @@
         </p:nvSpPr>
         <p:spPr>
           <a:xfrm>
-            <a:off x="7443531" y="954504"/>
+            <a:off x="7756352" y="954504"/>
             <a:ext cx="312821" cy="312821"/>
           </a:xfrm>
           <a:prstGeom prst="rect">
             <a:avLst/>
           </a:prstGeom>
           <a:solidFill>
-            <a:srgbClr val="64A0FF"/>
+            <a:srgbClr val="A0FFA0"/>
           </a:solidFill>
         </p:spPr>
         <p:style>
@@ -9751,17 +9803,17 @@
                 <a:latin typeface="Arial Narrow" pitchFamily="34" charset="0"/>
                 <a:cs typeface="Arial" pitchFamily="34" charset="0"/>
               </a:rPr>
-              <a:t>11</a:t>
-            </a:r>
-          </a:p>
-        </p:txBody>
-      </p:sp>
-      <p:sp>
-        <p:nvSpPr>
-          <p:cNvPr id="81" name="Rectángulo 80">
-            <a:extLst>
-              <a:ext uri="{FF2B5EF4-FFF2-40B4-BE49-F238E27FC236}">
-                <a16:creationId xmlns:a16="http://schemas.microsoft.com/office/drawing/2014/main" xmlns="" id="{DD73C27A-9EDC-4EE2-B6F0-265E687B828F}"/>
+              <a:t>10</a:t>
+            </a:r>
+          </a:p>
+        </p:txBody>
+      </p:sp>
+      <p:sp>
+        <p:nvSpPr>
+          <p:cNvPr id="83" name="Rectángulo 82">
+            <a:extLst>
+              <a:ext uri="{FF2B5EF4-FFF2-40B4-BE49-F238E27FC236}">
+                <a16:creationId xmlns="" xmlns:a16="http://schemas.microsoft.com/office/drawing/2014/main" id="{1C8F1824-E26A-43B2-95AD-4E622E969AFF}"/>
               </a:ext>
             </a:extLst>
           </p:cNvPr>
@@ -9770,14 +9822,14 @@
         </p:nvSpPr>
         <p:spPr>
           <a:xfrm>
-            <a:off x="7756352" y="954504"/>
+            <a:off x="8069173" y="954504"/>
             <a:ext cx="312821" cy="312821"/>
           </a:xfrm>
           <a:prstGeom prst="rect">
             <a:avLst/>
           </a:prstGeom>
           <a:solidFill>
-            <a:srgbClr val="64A0FF"/>
+            <a:srgbClr val="A0FFA0"/>
           </a:solidFill>
         </p:spPr>
         <p:style>
@@ -9804,17 +9856,17 @@
                 <a:latin typeface="Arial Narrow" pitchFamily="34" charset="0"/>
                 <a:cs typeface="Arial" pitchFamily="34" charset="0"/>
               </a:rPr>
-              <a:t>10</a:t>
-            </a:r>
-          </a:p>
-        </p:txBody>
-      </p:sp>
-      <p:sp>
-        <p:nvSpPr>
-          <p:cNvPr id="83" name="Rectángulo 82">
-            <a:extLst>
-              <a:ext uri="{FF2B5EF4-FFF2-40B4-BE49-F238E27FC236}">
-                <a16:creationId xmlns:a16="http://schemas.microsoft.com/office/drawing/2014/main" xmlns="" id="{1C8F1824-E26A-43B2-95AD-4E622E969AFF}"/>
+              <a:t>09</a:t>
+            </a:r>
+          </a:p>
+        </p:txBody>
+      </p:sp>
+      <p:sp>
+        <p:nvSpPr>
+          <p:cNvPr id="85" name="Rectángulo 84">
+            <a:extLst>
+              <a:ext uri="{FF2B5EF4-FFF2-40B4-BE49-F238E27FC236}">
+                <a16:creationId xmlns="" xmlns:a16="http://schemas.microsoft.com/office/drawing/2014/main" id="{C5A90D2C-3ED6-46E2-B67D-D6035BC950AA}"/>
               </a:ext>
             </a:extLst>
           </p:cNvPr>
@@ -9823,14 +9875,14 @@
         </p:nvSpPr>
         <p:spPr>
           <a:xfrm>
-            <a:off x="8069173" y="954504"/>
+            <a:off x="8381993" y="954504"/>
             <a:ext cx="312821" cy="312821"/>
           </a:xfrm>
           <a:prstGeom prst="rect">
             <a:avLst/>
           </a:prstGeom>
           <a:solidFill>
-            <a:srgbClr val="64A0FF"/>
+            <a:srgbClr val="A0FFA0"/>
           </a:solidFill>
         </p:spPr>
         <p:style>
@@ -9857,17 +9909,17 @@
                 <a:latin typeface="Arial Narrow" pitchFamily="34" charset="0"/>
                 <a:cs typeface="Arial" pitchFamily="34" charset="0"/>
               </a:rPr>
-              <a:t>09</a:t>
-            </a:r>
-          </a:p>
-        </p:txBody>
-      </p:sp>
-      <p:sp>
-        <p:nvSpPr>
-          <p:cNvPr id="85" name="Rectángulo 84">
-            <a:extLst>
-              <a:ext uri="{FF2B5EF4-FFF2-40B4-BE49-F238E27FC236}">
-                <a16:creationId xmlns:a16="http://schemas.microsoft.com/office/drawing/2014/main" xmlns="" id="{C5A90D2C-3ED6-46E2-B67D-D6035BC950AA}"/>
+              <a:t>08</a:t>
+            </a:r>
+          </a:p>
+        </p:txBody>
+      </p:sp>
+      <p:sp>
+        <p:nvSpPr>
+          <p:cNvPr id="87" name="Rectángulo 86">
+            <a:extLst>
+              <a:ext uri="{FF2B5EF4-FFF2-40B4-BE49-F238E27FC236}">
+                <a16:creationId xmlns="" xmlns:a16="http://schemas.microsoft.com/office/drawing/2014/main" id="{550271C9-0EC5-4ECC-B991-68E83A3F3C6A}"/>
               </a:ext>
             </a:extLst>
           </p:cNvPr>
@@ -9876,14 +9928,14 @@
         </p:nvSpPr>
         <p:spPr>
           <a:xfrm>
-            <a:off x="8381993" y="954504"/>
+            <a:off x="8694814" y="954504"/>
             <a:ext cx="312821" cy="312821"/>
           </a:xfrm>
           <a:prstGeom prst="rect">
             <a:avLst/>
           </a:prstGeom>
           <a:solidFill>
-            <a:srgbClr val="64A0FF"/>
+            <a:srgbClr val="FF8181"/>
           </a:solidFill>
         </p:spPr>
         <p:style>
@@ -9908,19 +9960,18 @@
             <a:r>
               <a:rPr lang="es-ES" sz="1100">
                 <a:latin typeface="Arial Narrow" pitchFamily="34" charset="0"/>
-                <a:cs typeface="Arial" pitchFamily="34" charset="0"/>
-              </a:rPr>
-              <a:t>08</a:t>
-            </a:r>
-          </a:p>
-        </p:txBody>
-      </p:sp>
-      <p:sp>
-        <p:nvSpPr>
-          <p:cNvPr id="87" name="Rectángulo 86">
-            <a:extLst>
-              <a:ext uri="{FF2B5EF4-FFF2-40B4-BE49-F238E27FC236}">
-                <a16:creationId xmlns:a16="http://schemas.microsoft.com/office/drawing/2014/main" xmlns="" id="{550271C9-0EC5-4ECC-B991-68E83A3F3C6A}"/>
+              </a:rPr>
+              <a:t>07</a:t>
+            </a:r>
+          </a:p>
+        </p:txBody>
+      </p:sp>
+      <p:sp>
+        <p:nvSpPr>
+          <p:cNvPr id="89" name="Rectángulo 88">
+            <a:extLst>
+              <a:ext uri="{FF2B5EF4-FFF2-40B4-BE49-F238E27FC236}">
+                <a16:creationId xmlns="" xmlns:a16="http://schemas.microsoft.com/office/drawing/2014/main" id="{D0AE3233-DF2D-48B7-8323-62F5C33D99C3}"/>
               </a:ext>
             </a:extLst>
           </p:cNvPr>
@@ -9929,14 +9980,14 @@
         </p:nvSpPr>
         <p:spPr>
           <a:xfrm>
-            <a:off x="8694814" y="954504"/>
+            <a:off x="9007635" y="954504"/>
             <a:ext cx="312821" cy="312821"/>
           </a:xfrm>
           <a:prstGeom prst="rect">
             <a:avLst/>
           </a:prstGeom>
           <a:solidFill>
-            <a:schemeClr val="bg1"/>
+            <a:srgbClr val="FF8181"/>
           </a:solidFill>
         </p:spPr>
         <p:style>
@@ -9961,19 +10012,18 @@
             <a:r>
               <a:rPr lang="es-ES" sz="1100">
                 <a:latin typeface="Arial Narrow" pitchFamily="34" charset="0"/>
-                <a:cs typeface="Arial" pitchFamily="34" charset="0"/>
-              </a:rPr>
-              <a:t>07</a:t>
-            </a:r>
-          </a:p>
-        </p:txBody>
-      </p:sp>
-      <p:sp>
-        <p:nvSpPr>
-          <p:cNvPr id="89" name="Rectángulo 88">
-            <a:extLst>
-              <a:ext uri="{FF2B5EF4-FFF2-40B4-BE49-F238E27FC236}">
-                <a16:creationId xmlns:a16="http://schemas.microsoft.com/office/drawing/2014/main" xmlns="" id="{D0AE3233-DF2D-48B7-8323-62F5C33D99C3}"/>
+              </a:rPr>
+              <a:t>06</a:t>
+            </a:r>
+          </a:p>
+        </p:txBody>
+      </p:sp>
+      <p:sp>
+        <p:nvSpPr>
+          <p:cNvPr id="91" name="Rectángulo 90">
+            <a:extLst>
+              <a:ext uri="{FF2B5EF4-FFF2-40B4-BE49-F238E27FC236}">
+                <a16:creationId xmlns="" xmlns:a16="http://schemas.microsoft.com/office/drawing/2014/main" id="{F12E477C-2CC6-4555-8235-719CBE3B0175}"/>
               </a:ext>
             </a:extLst>
           </p:cNvPr>
@@ -9982,14 +10032,14 @@
         </p:nvSpPr>
         <p:spPr>
           <a:xfrm>
-            <a:off x="9007635" y="954504"/>
+            <a:off x="9320456" y="954504"/>
             <a:ext cx="312821" cy="312821"/>
           </a:xfrm>
           <a:prstGeom prst="rect">
             <a:avLst/>
           </a:prstGeom>
           <a:solidFill>
-            <a:schemeClr val="bg1"/>
+            <a:srgbClr val="FF8181"/>
           </a:solidFill>
         </p:spPr>
         <p:style>
@@ -10014,19 +10064,18 @@
             <a:r>
               <a:rPr lang="es-ES" sz="1100">
                 <a:latin typeface="Arial Narrow" pitchFamily="34" charset="0"/>
-                <a:cs typeface="Arial" pitchFamily="34" charset="0"/>
-              </a:rPr>
-              <a:t>06</a:t>
-            </a:r>
-          </a:p>
-        </p:txBody>
-      </p:sp>
-      <p:sp>
-        <p:nvSpPr>
-          <p:cNvPr id="91" name="Rectángulo 90">
-            <a:extLst>
-              <a:ext uri="{FF2B5EF4-FFF2-40B4-BE49-F238E27FC236}">
-                <a16:creationId xmlns:a16="http://schemas.microsoft.com/office/drawing/2014/main" xmlns="" id="{F12E477C-2CC6-4555-8235-719CBE3B0175}"/>
+              </a:rPr>
+              <a:t>05</a:t>
+            </a:r>
+          </a:p>
+        </p:txBody>
+      </p:sp>
+      <p:sp>
+        <p:nvSpPr>
+          <p:cNvPr id="93" name="Rectángulo 92">
+            <a:extLst>
+              <a:ext uri="{FF2B5EF4-FFF2-40B4-BE49-F238E27FC236}">
+                <a16:creationId xmlns="" xmlns:a16="http://schemas.microsoft.com/office/drawing/2014/main" id="{24E5F539-7A09-4F5B-95D8-8BDB50EF13FE}"/>
               </a:ext>
             </a:extLst>
           </p:cNvPr>
@@ -10035,14 +10084,14 @@
         </p:nvSpPr>
         <p:spPr>
           <a:xfrm>
-            <a:off x="9320456" y="954504"/>
+            <a:off x="9633276" y="954504"/>
             <a:ext cx="312821" cy="312821"/>
           </a:xfrm>
           <a:prstGeom prst="rect">
             <a:avLst/>
           </a:prstGeom>
           <a:solidFill>
-            <a:schemeClr val="bg1"/>
+            <a:srgbClr val="FF8181"/>
           </a:solidFill>
         </p:spPr>
         <p:style>
@@ -10067,19 +10116,18 @@
             <a:r>
               <a:rPr lang="es-ES" sz="1100">
                 <a:latin typeface="Arial Narrow" pitchFamily="34" charset="0"/>
-                <a:cs typeface="Arial" pitchFamily="34" charset="0"/>
-              </a:rPr>
-              <a:t>05</a:t>
-            </a:r>
-          </a:p>
-        </p:txBody>
-      </p:sp>
-      <p:sp>
-        <p:nvSpPr>
-          <p:cNvPr id="93" name="Rectángulo 92">
-            <a:extLst>
-              <a:ext uri="{FF2B5EF4-FFF2-40B4-BE49-F238E27FC236}">
-                <a16:creationId xmlns:a16="http://schemas.microsoft.com/office/drawing/2014/main" xmlns="" id="{24E5F539-7A09-4F5B-95D8-8BDB50EF13FE}"/>
+              </a:rPr>
+              <a:t>04</a:t>
+            </a:r>
+          </a:p>
+        </p:txBody>
+      </p:sp>
+      <p:sp>
+        <p:nvSpPr>
+          <p:cNvPr id="95" name="Rectángulo 94">
+            <a:extLst>
+              <a:ext uri="{FF2B5EF4-FFF2-40B4-BE49-F238E27FC236}">
+                <a16:creationId xmlns="" xmlns:a16="http://schemas.microsoft.com/office/drawing/2014/main" id="{9CAC6246-ADC5-45A2-BCC1-DD852C7B11B7}"/>
               </a:ext>
             </a:extLst>
           </p:cNvPr>
@@ -10088,14 +10136,14 @@
         </p:nvSpPr>
         <p:spPr>
           <a:xfrm>
-            <a:off x="9633276" y="954504"/>
+            <a:off x="9946097" y="954504"/>
             <a:ext cx="312821" cy="312821"/>
           </a:xfrm>
           <a:prstGeom prst="rect">
             <a:avLst/>
           </a:prstGeom>
           <a:solidFill>
-            <a:schemeClr val="bg1"/>
+            <a:srgbClr val="FF8181"/>
           </a:solidFill>
         </p:spPr>
         <p:style>
@@ -10120,19 +10168,18 @@
             <a:r>
               <a:rPr lang="es-ES" sz="1100">
                 <a:latin typeface="Arial Narrow" pitchFamily="34" charset="0"/>
-                <a:cs typeface="Arial" pitchFamily="34" charset="0"/>
-              </a:rPr>
-              <a:t>04</a:t>
-            </a:r>
-          </a:p>
-        </p:txBody>
-      </p:sp>
-      <p:sp>
-        <p:nvSpPr>
-          <p:cNvPr id="95" name="Rectángulo 94">
-            <a:extLst>
-              <a:ext uri="{FF2B5EF4-FFF2-40B4-BE49-F238E27FC236}">
-                <a16:creationId xmlns:a16="http://schemas.microsoft.com/office/drawing/2014/main" xmlns="" id="{9CAC6246-ADC5-45A2-BCC1-DD852C7B11B7}"/>
+              </a:rPr>
+              <a:t>03</a:t>
+            </a:r>
+          </a:p>
+        </p:txBody>
+      </p:sp>
+      <p:sp>
+        <p:nvSpPr>
+          <p:cNvPr id="97" name="Rectángulo 96">
+            <a:extLst>
+              <a:ext uri="{FF2B5EF4-FFF2-40B4-BE49-F238E27FC236}">
+                <a16:creationId xmlns="" xmlns:a16="http://schemas.microsoft.com/office/drawing/2014/main" id="{ECB51BA8-E69A-47F5-BD56-0A327E561C4C}"/>
               </a:ext>
             </a:extLst>
           </p:cNvPr>
@@ -10141,14 +10188,14 @@
         </p:nvSpPr>
         <p:spPr>
           <a:xfrm>
-            <a:off x="9946097" y="954504"/>
+            <a:off x="10258918" y="954504"/>
             <a:ext cx="312821" cy="312821"/>
           </a:xfrm>
           <a:prstGeom prst="rect">
             <a:avLst/>
           </a:prstGeom>
           <a:solidFill>
-            <a:schemeClr val="bg1"/>
+            <a:srgbClr val="FF8181"/>
           </a:solidFill>
         </p:spPr>
         <p:style>
@@ -10173,19 +10220,18 @@
             <a:r>
               <a:rPr lang="es-ES" sz="1100">
                 <a:latin typeface="Arial Narrow" pitchFamily="34" charset="0"/>
-                <a:cs typeface="Arial" pitchFamily="34" charset="0"/>
-              </a:rPr>
-              <a:t>03</a:t>
-            </a:r>
-          </a:p>
-        </p:txBody>
-      </p:sp>
-      <p:sp>
-        <p:nvSpPr>
-          <p:cNvPr id="97" name="Rectángulo 96">
-            <a:extLst>
-              <a:ext uri="{FF2B5EF4-FFF2-40B4-BE49-F238E27FC236}">
-                <a16:creationId xmlns:a16="http://schemas.microsoft.com/office/drawing/2014/main" xmlns="" id="{ECB51BA8-E69A-47F5-BD56-0A327E561C4C}"/>
+              </a:rPr>
+              <a:t>02</a:t>
+            </a:r>
+          </a:p>
+        </p:txBody>
+      </p:sp>
+      <p:sp>
+        <p:nvSpPr>
+          <p:cNvPr id="99" name="Rectángulo 98">
+            <a:extLst>
+              <a:ext uri="{FF2B5EF4-FFF2-40B4-BE49-F238E27FC236}">
+                <a16:creationId xmlns="" xmlns:a16="http://schemas.microsoft.com/office/drawing/2014/main" id="{CEE39723-92D4-4422-990B-7B4260A35505}"/>
               </a:ext>
             </a:extLst>
           </p:cNvPr>
@@ -10194,14 +10240,14 @@
         </p:nvSpPr>
         <p:spPr>
           <a:xfrm>
-            <a:off x="10258918" y="954504"/>
+            <a:off x="10571739" y="954504"/>
             <a:ext cx="312821" cy="312821"/>
           </a:xfrm>
           <a:prstGeom prst="rect">
             <a:avLst/>
           </a:prstGeom>
           <a:solidFill>
-            <a:schemeClr val="bg1"/>
+            <a:srgbClr val="FF8181"/>
           </a:solidFill>
         </p:spPr>
         <p:style>
@@ -10226,60 +10272,6 @@
             <a:r>
               <a:rPr lang="es-ES" sz="1100">
                 <a:latin typeface="Arial Narrow" pitchFamily="34" charset="0"/>
-                <a:cs typeface="Arial" pitchFamily="34" charset="0"/>
-              </a:rPr>
-              <a:t>02</a:t>
-            </a:r>
-          </a:p>
-        </p:txBody>
-      </p:sp>
-      <p:sp>
-        <p:nvSpPr>
-          <p:cNvPr id="99" name="Rectángulo 98">
-            <a:extLst>
-              <a:ext uri="{FF2B5EF4-FFF2-40B4-BE49-F238E27FC236}">
-                <a16:creationId xmlns:a16="http://schemas.microsoft.com/office/drawing/2014/main" xmlns="" id="{CEE39723-92D4-4422-990B-7B4260A35505}"/>
-              </a:ext>
-            </a:extLst>
-          </p:cNvPr>
-          <p:cNvSpPr/>
-          <p:nvPr/>
-        </p:nvSpPr>
-        <p:spPr>
-          <a:xfrm>
-            <a:off x="10571739" y="954504"/>
-            <a:ext cx="312821" cy="312821"/>
-          </a:xfrm>
-          <a:prstGeom prst="rect">
-            <a:avLst/>
-          </a:prstGeom>
-          <a:solidFill>
-            <a:schemeClr val="bg1"/>
-          </a:solidFill>
-        </p:spPr>
-        <p:style>
-          <a:lnRef idx="2">
-            <a:schemeClr val="dk1"/>
-          </a:lnRef>
-          <a:fillRef idx="1">
-            <a:schemeClr val="lt1"/>
-          </a:fillRef>
-          <a:effectRef idx="0">
-            <a:schemeClr val="dk1"/>
-          </a:effectRef>
-          <a:fontRef idx="minor">
-            <a:schemeClr val="dk1"/>
-          </a:fontRef>
-        </p:style>
-        <p:txBody>
-          <a:bodyPr rtlCol="0" anchor="ctr"/>
-          <a:lstStyle/>
-          <a:p>
-            <a:pPr algn="ctr"/>
-            <a:r>
-              <a:rPr lang="es-ES" sz="1100">
-                <a:latin typeface="Arial Narrow" pitchFamily="34" charset="0"/>
-                <a:cs typeface="Arial" pitchFamily="34" charset="0"/>
               </a:rPr>
               <a:t>01</a:t>
             </a:r>
@@ -10291,7 +10283,7 @@
           <p:cNvPr id="103" name="Conector recto 102">
             <a:extLst>
               <a:ext uri="{FF2B5EF4-FFF2-40B4-BE49-F238E27FC236}">
-                <a16:creationId xmlns:a16="http://schemas.microsoft.com/office/drawing/2014/main" xmlns="" id="{47E268D3-FA3C-4E68-9B0F-630F0330FE61}"/>
+                <a16:creationId xmlns="" xmlns:a16="http://schemas.microsoft.com/office/drawing/2014/main" id="{47E268D3-FA3C-4E68-9B0F-630F0330FE61}"/>
               </a:ext>
             </a:extLst>
           </p:cNvPr>
@@ -10334,7 +10326,7 @@
           <p:cNvPr id="105" name="Conector recto 104">
             <a:extLst>
               <a:ext uri="{FF2B5EF4-FFF2-40B4-BE49-F238E27FC236}">
-                <a16:creationId xmlns:a16="http://schemas.microsoft.com/office/drawing/2014/main" xmlns="" id="{6A324006-7BFE-46BD-A68C-9DC10B2E9CA9}"/>
+                <a16:creationId xmlns="" xmlns:a16="http://schemas.microsoft.com/office/drawing/2014/main" id="{6A324006-7BFE-46BD-A68C-9DC10B2E9CA9}"/>
               </a:ext>
             </a:extLst>
           </p:cNvPr>
@@ -10377,7 +10369,7 @@
           <p:cNvPr id="106" name="Conector recto 105">
             <a:extLst>
               <a:ext uri="{FF2B5EF4-FFF2-40B4-BE49-F238E27FC236}">
-                <a16:creationId xmlns:a16="http://schemas.microsoft.com/office/drawing/2014/main" xmlns="" id="{9058EBC3-42C3-4B5A-BBBB-C1E1B37F6D1A}"/>
+                <a16:creationId xmlns="" xmlns:a16="http://schemas.microsoft.com/office/drawing/2014/main" id="{9058EBC3-42C3-4B5A-BBBB-C1E1B37F6D1A}"/>
               </a:ext>
             </a:extLst>
           </p:cNvPr>
@@ -10420,7 +10412,7 @@
           <p:cNvPr id="107" name="Conector recto 106">
             <a:extLst>
               <a:ext uri="{FF2B5EF4-FFF2-40B4-BE49-F238E27FC236}">
-                <a16:creationId xmlns:a16="http://schemas.microsoft.com/office/drawing/2014/main" xmlns="" id="{B2AE8D7F-112B-4A1B-B6A2-3D4847277991}"/>
+                <a16:creationId xmlns="" xmlns:a16="http://schemas.microsoft.com/office/drawing/2014/main" id="{B2AE8D7F-112B-4A1B-B6A2-3D4847277991}"/>
               </a:ext>
             </a:extLst>
           </p:cNvPr>
@@ -10463,7 +10455,7 @@
           <p:cNvPr id="109" name="Conector recto de flecha 108">
             <a:extLst>
               <a:ext uri="{FF2B5EF4-FFF2-40B4-BE49-F238E27FC236}">
-                <a16:creationId xmlns:a16="http://schemas.microsoft.com/office/drawing/2014/main" xmlns="" id="{D6EA153A-F288-498B-A862-027BC2639F72}"/>
+                <a16:creationId xmlns="" xmlns:a16="http://schemas.microsoft.com/office/drawing/2014/main" id="{D6EA153A-F288-498B-A862-027BC2639F72}"/>
               </a:ext>
             </a:extLst>
           </p:cNvPr>
@@ -10505,7 +10497,7 @@
           <p:cNvPr id="114" name="Conector recto de flecha 113">
             <a:extLst>
               <a:ext uri="{FF2B5EF4-FFF2-40B4-BE49-F238E27FC236}">
-                <a16:creationId xmlns:a16="http://schemas.microsoft.com/office/drawing/2014/main" xmlns="" id="{7083838C-726B-4982-AAC8-A11C3B433205}"/>
+                <a16:creationId xmlns="" xmlns:a16="http://schemas.microsoft.com/office/drawing/2014/main" id="{7083838C-726B-4982-AAC8-A11C3B433205}"/>
               </a:ext>
             </a:extLst>
           </p:cNvPr>
@@ -10547,7 +10539,7 @@
           <p:cNvPr id="116" name="Conector recto de flecha 115">
             <a:extLst>
               <a:ext uri="{FF2B5EF4-FFF2-40B4-BE49-F238E27FC236}">
-                <a16:creationId xmlns:a16="http://schemas.microsoft.com/office/drawing/2014/main" xmlns="" id="{3664F721-26A1-4880-8555-BB97AB35D9FB}"/>
+                <a16:creationId xmlns="" xmlns:a16="http://schemas.microsoft.com/office/drawing/2014/main" id="{3664F721-26A1-4880-8555-BB97AB35D9FB}"/>
               </a:ext>
             </a:extLst>
           </p:cNvPr>
@@ -10589,7 +10581,7 @@
           <p:cNvPr id="118" name="Conector recto de flecha 117">
             <a:extLst>
               <a:ext uri="{FF2B5EF4-FFF2-40B4-BE49-F238E27FC236}">
-                <a16:creationId xmlns:a16="http://schemas.microsoft.com/office/drawing/2014/main" xmlns="" id="{6C52B2C0-BB73-45F4-B1B0-022466ABDA68}"/>
+                <a16:creationId xmlns="" xmlns:a16="http://schemas.microsoft.com/office/drawing/2014/main" id="{6C52B2C0-BB73-45F4-B1B0-022466ABDA68}"/>
               </a:ext>
             </a:extLst>
           </p:cNvPr>
@@ -10631,7 +10623,7 @@
           <p:cNvPr id="119" name="Conector recto 118">
             <a:extLst>
               <a:ext uri="{FF2B5EF4-FFF2-40B4-BE49-F238E27FC236}">
-                <a16:creationId xmlns:a16="http://schemas.microsoft.com/office/drawing/2014/main" xmlns="" id="{7F0BCCC8-CF54-477C-A0E9-0EADB48ACAED}"/>
+                <a16:creationId xmlns="" xmlns:a16="http://schemas.microsoft.com/office/drawing/2014/main" id="{7F0BCCC8-CF54-477C-A0E9-0EADB48ACAED}"/>
               </a:ext>
             </a:extLst>
           </p:cNvPr>
@@ -10674,7 +10666,7 @@
           <p:cNvPr id="121" name="CuadroTexto 120">
             <a:extLst>
               <a:ext uri="{FF2B5EF4-FFF2-40B4-BE49-F238E27FC236}">
-                <a16:creationId xmlns:a16="http://schemas.microsoft.com/office/drawing/2014/main" xmlns="" id="{C055A25B-9E72-4CC3-9DBF-D79064A76E9A}"/>
+                <a16:creationId xmlns="" xmlns:a16="http://schemas.microsoft.com/office/drawing/2014/main" id="{C055A25B-9E72-4CC3-9DBF-D79064A76E9A}"/>
               </a:ext>
             </a:extLst>
           </p:cNvPr>
@@ -10710,7 +10702,7 @@
           <p:cNvPr id="142" name="CuadroTexto 141">
             <a:extLst>
               <a:ext uri="{FF2B5EF4-FFF2-40B4-BE49-F238E27FC236}">
-                <a16:creationId xmlns:a16="http://schemas.microsoft.com/office/drawing/2014/main" xmlns="" id="{4F79BADF-8B36-475E-AD42-510A24A59FBE}"/>
+                <a16:creationId xmlns="" xmlns:a16="http://schemas.microsoft.com/office/drawing/2014/main" id="{4F79BADF-8B36-475E-AD42-510A24A59FBE}"/>
               </a:ext>
             </a:extLst>
           </p:cNvPr>
@@ -10735,317 +10727,15 @@
           <a:p>
             <a:pPr algn="ctr"/>
             <a:r>
-              <a:rPr lang="es-ES">
+              <a:rPr lang="es-ES" smtClean="0">
                 <a:solidFill>
-                  <a:srgbClr val="FF0000"/>
+                  <a:schemeClr val="bg2">
+                    <a:lumMod val="50000"/>
+                  </a:schemeClr>
                 </a:solidFill>
               </a:rPr>
-              <a:t>Red component</a:t>
-            </a:r>
-          </a:p>
-        </p:txBody>
-      </p:sp>
-      <p:sp>
-        <p:nvSpPr>
-          <p:cNvPr id="153" name="CuadroTexto 152">
-            <a:extLst>
-              <a:ext uri="{FF2B5EF4-FFF2-40B4-BE49-F238E27FC236}">
-                <a16:creationId xmlns:a16="http://schemas.microsoft.com/office/drawing/2014/main" xmlns="" id="{842F7379-7927-4A04-9F04-A65F65E85B4B}"/>
-              </a:ext>
-            </a:extLst>
-          </p:cNvPr>
-          <p:cNvSpPr txBox="1"/>
-          <p:nvPr/>
-        </p:nvSpPr>
-        <p:spPr>
-          <a:xfrm>
-            <a:off x="8694814" y="589272"/>
-            <a:ext cx="2502566" cy="276999"/>
-          </a:xfrm>
-          <a:prstGeom prst="rect">
-            <a:avLst/>
-          </a:prstGeom>
-          <a:noFill/>
-        </p:spPr>
-        <p:txBody>
-          <a:bodyPr wrap="square" rtlCol="0" anchor="ctr">
-            <a:spAutoFit/>
-          </a:bodyPr>
-          <a:lstStyle/>
-          <a:p>
-            <a:pPr algn="r"/>
-            <a:r>
-              <a:rPr lang="es-ES" sz="1200"/>
-              <a:t>Least significant bits </a:t>
-            </a:r>
-            <a:r>
-              <a:rPr lang="es-ES" sz="1200">
-                <a:sym typeface="Wingdings" panose="05000000000000000000" pitchFamily="2" charset="2"/>
-              </a:rPr>
-              <a:t></a:t>
-            </a:r>
-            <a:endParaRPr lang="es-ES" sz="1200"/>
-          </a:p>
-        </p:txBody>
-      </p:sp>
-      <p:sp>
-        <p:nvSpPr>
-          <p:cNvPr id="154" name="CuadroTexto 153">
-            <a:extLst>
-              <a:ext uri="{FF2B5EF4-FFF2-40B4-BE49-F238E27FC236}">
-                <a16:creationId xmlns:a16="http://schemas.microsoft.com/office/drawing/2014/main" xmlns="" id="{0DC557E3-0D74-4B92-85AD-ACB09F131005}"/>
-              </a:ext>
-            </a:extLst>
-          </p:cNvPr>
-          <p:cNvSpPr txBox="1"/>
-          <p:nvPr/>
-        </p:nvSpPr>
-        <p:spPr>
-          <a:xfrm>
-            <a:off x="1187116" y="589272"/>
-            <a:ext cx="2502566" cy="276999"/>
-          </a:xfrm>
-          <a:prstGeom prst="rect">
-            <a:avLst/>
-          </a:prstGeom>
-          <a:noFill/>
-        </p:spPr>
-        <p:txBody>
-          <a:bodyPr wrap="square" rtlCol="0" anchor="ctr">
-            <a:spAutoFit/>
-          </a:bodyPr>
-          <a:lstStyle/>
-          <a:p>
-            <a:r>
-              <a:rPr lang="es-ES" sz="1200">
-                <a:sym typeface="Wingdings" panose="05000000000000000000" pitchFamily="2" charset="2"/>
-              </a:rPr>
-              <a:t> </a:t>
-            </a:r>
-            <a:r>
-              <a:rPr lang="es-ES" sz="1200"/>
-              <a:t>Most significant bits</a:t>
-            </a:r>
-          </a:p>
-        </p:txBody>
-      </p:sp>
-      <p:sp>
-        <p:nvSpPr>
-          <p:cNvPr id="74" name="CuadroTexto 73">
-            <a:extLst>
-              <a:ext uri="{FF2B5EF4-FFF2-40B4-BE49-F238E27FC236}">
-                <a16:creationId xmlns:a16="http://schemas.microsoft.com/office/drawing/2014/main" xmlns="" id="{EC7EB5A0-9EB7-4580-9947-4C081C7CD389}"/>
-              </a:ext>
-            </a:extLst>
-          </p:cNvPr>
-          <p:cNvSpPr txBox="1"/>
-          <p:nvPr/>
-        </p:nvSpPr>
-        <p:spPr>
-          <a:xfrm>
-            <a:off x="3697403" y="1776481"/>
-            <a:ext cx="2510511" cy="369332"/>
-          </a:xfrm>
-          <a:prstGeom prst="rect">
-            <a:avLst/>
-          </a:prstGeom>
-          <a:noFill/>
-        </p:spPr>
-        <p:txBody>
-          <a:bodyPr wrap="square" rtlCol="0" anchor="ctr">
-            <a:spAutoFit/>
-          </a:bodyPr>
-          <a:lstStyle/>
-          <a:p>
-            <a:pPr algn="ctr"/>
-            <a:r>
-              <a:rPr lang="es-ES"/>
-              <a:t>8 bits</a:t>
-            </a:r>
-          </a:p>
-        </p:txBody>
-      </p:sp>
-      <p:sp>
-        <p:nvSpPr>
-          <p:cNvPr id="76" name="CuadroTexto 75">
-            <a:extLst>
-              <a:ext uri="{FF2B5EF4-FFF2-40B4-BE49-F238E27FC236}">
-                <a16:creationId xmlns:a16="http://schemas.microsoft.com/office/drawing/2014/main" xmlns="" id="{A70D8229-F7B4-4F05-8DA8-A1F172A77638}"/>
-              </a:ext>
-            </a:extLst>
-          </p:cNvPr>
-          <p:cNvSpPr txBox="1"/>
-          <p:nvPr/>
-        </p:nvSpPr>
-        <p:spPr>
-          <a:xfrm>
-            <a:off x="3697614" y="2125579"/>
-            <a:ext cx="2510511" cy="369332"/>
-          </a:xfrm>
-          <a:prstGeom prst="rect">
-            <a:avLst/>
-          </a:prstGeom>
-          <a:noFill/>
-        </p:spPr>
-        <p:txBody>
-          <a:bodyPr wrap="square" rtlCol="0" anchor="ctr">
-            <a:spAutoFit/>
-          </a:bodyPr>
-          <a:lstStyle/>
-          <a:p>
-            <a:pPr algn="ctr"/>
-            <a:r>
-              <a:rPr lang="es-ES">
-                <a:solidFill>
-                  <a:srgbClr val="00B050"/>
-                </a:solidFill>
-              </a:rPr>
-              <a:t>Green component</a:t>
-            </a:r>
-          </a:p>
-        </p:txBody>
-      </p:sp>
-      <p:sp>
-        <p:nvSpPr>
-          <p:cNvPr id="78" name="CuadroTexto 77">
-            <a:extLst>
-              <a:ext uri="{FF2B5EF4-FFF2-40B4-BE49-F238E27FC236}">
-                <a16:creationId xmlns:a16="http://schemas.microsoft.com/office/drawing/2014/main" xmlns="" id="{2F7FB464-302F-4CF5-A06A-A3792F16F161}"/>
-              </a:ext>
-            </a:extLst>
-          </p:cNvPr>
-          <p:cNvSpPr txBox="1"/>
-          <p:nvPr/>
-        </p:nvSpPr>
-        <p:spPr>
-          <a:xfrm>
-            <a:off x="6192037" y="1776481"/>
-            <a:ext cx="2510511" cy="369332"/>
-          </a:xfrm>
-          <a:prstGeom prst="rect">
-            <a:avLst/>
-          </a:prstGeom>
-          <a:noFill/>
-        </p:spPr>
-        <p:txBody>
-          <a:bodyPr wrap="square" rtlCol="0" anchor="ctr">
-            <a:spAutoFit/>
-          </a:bodyPr>
-          <a:lstStyle/>
-          <a:p>
-            <a:pPr algn="ctr"/>
-            <a:r>
-              <a:rPr lang="es-ES"/>
-              <a:t>8 bits</a:t>
-            </a:r>
-          </a:p>
-        </p:txBody>
-      </p:sp>
-      <p:sp>
-        <p:nvSpPr>
-          <p:cNvPr id="80" name="CuadroTexto 79">
-            <a:extLst>
-              <a:ext uri="{FF2B5EF4-FFF2-40B4-BE49-F238E27FC236}">
-                <a16:creationId xmlns:a16="http://schemas.microsoft.com/office/drawing/2014/main" xmlns="" id="{324B035A-4BFC-42E2-AF97-B3915E794013}"/>
-              </a:ext>
-            </a:extLst>
-          </p:cNvPr>
-          <p:cNvSpPr txBox="1"/>
-          <p:nvPr/>
-        </p:nvSpPr>
-        <p:spPr>
-          <a:xfrm>
-            <a:off x="6192248" y="2125579"/>
-            <a:ext cx="2510511" cy="369332"/>
-          </a:xfrm>
-          <a:prstGeom prst="rect">
-            <a:avLst/>
-          </a:prstGeom>
-          <a:noFill/>
-        </p:spPr>
-        <p:txBody>
-          <a:bodyPr wrap="square" rtlCol="0" anchor="ctr">
-            <a:spAutoFit/>
-          </a:bodyPr>
-          <a:lstStyle/>
-          <a:p>
-            <a:pPr algn="ctr"/>
-            <a:r>
-              <a:rPr lang="es-ES">
-                <a:solidFill>
-                  <a:srgbClr val="0070C0"/>
-                </a:solidFill>
-              </a:rPr>
-              <a:t>Blue component</a:t>
-            </a:r>
-          </a:p>
-        </p:txBody>
-      </p:sp>
-      <p:sp>
-        <p:nvSpPr>
-          <p:cNvPr id="82" name="CuadroTexto 81">
-            <a:extLst>
-              <a:ext uri="{FF2B5EF4-FFF2-40B4-BE49-F238E27FC236}">
-                <a16:creationId xmlns:a16="http://schemas.microsoft.com/office/drawing/2014/main" xmlns="" id="{71BDD27D-305D-494F-94A9-7A84BB5B4173}"/>
-              </a:ext>
-            </a:extLst>
-          </p:cNvPr>
-          <p:cNvSpPr txBox="1"/>
-          <p:nvPr/>
-        </p:nvSpPr>
-        <p:spPr>
-          <a:xfrm>
-            <a:off x="8694603" y="1776481"/>
-            <a:ext cx="2510511" cy="369332"/>
-          </a:xfrm>
-          <a:prstGeom prst="rect">
-            <a:avLst/>
-          </a:prstGeom>
-          <a:noFill/>
-        </p:spPr>
-        <p:txBody>
-          <a:bodyPr wrap="square" rtlCol="0" anchor="ctr">
-            <a:spAutoFit/>
-          </a:bodyPr>
-          <a:lstStyle/>
-          <a:p>
-            <a:pPr algn="ctr"/>
-            <a:r>
-              <a:rPr lang="es-ES"/>
-              <a:t>8 bits</a:t>
-            </a:r>
-          </a:p>
-        </p:txBody>
-      </p:sp>
-      <p:sp>
-        <p:nvSpPr>
-          <p:cNvPr id="84" name="CuadroTexto 83">
-            <a:extLst>
-              <a:ext uri="{FF2B5EF4-FFF2-40B4-BE49-F238E27FC236}">
-                <a16:creationId xmlns:a16="http://schemas.microsoft.com/office/drawing/2014/main" xmlns="" id="{FBB4F18B-E462-40E8-9747-7C455266C069}"/>
-              </a:ext>
-            </a:extLst>
-          </p:cNvPr>
-          <p:cNvSpPr txBox="1"/>
-          <p:nvPr/>
-        </p:nvSpPr>
-        <p:spPr>
-          <a:xfrm>
-            <a:off x="8694814" y="2125579"/>
-            <a:ext cx="2510511" cy="369332"/>
-          </a:xfrm>
-          <a:prstGeom prst="rect">
-            <a:avLst/>
-          </a:prstGeom>
-          <a:noFill/>
-        </p:spPr>
-        <p:txBody>
-          <a:bodyPr wrap="square" rtlCol="0" anchor="ctr">
-            <a:spAutoFit/>
-          </a:bodyPr>
-          <a:lstStyle/>
-          <a:p>
-            <a:pPr algn="ctr"/>
+              <a:t>Alpha </a:t>
+            </a:r>
             <a:r>
               <a:rPr lang="es-ES">
                 <a:solidFill>
@@ -11054,7 +10744,343 @@
                   </a:schemeClr>
                 </a:solidFill>
               </a:rPr>
-              <a:t>Alpha component</a:t>
+              <a:t>component</a:t>
+            </a:r>
+          </a:p>
+        </p:txBody>
+      </p:sp>
+      <p:sp>
+        <p:nvSpPr>
+          <p:cNvPr id="153" name="CuadroTexto 152">
+            <a:extLst>
+              <a:ext uri="{FF2B5EF4-FFF2-40B4-BE49-F238E27FC236}">
+                <a16:creationId xmlns="" xmlns:a16="http://schemas.microsoft.com/office/drawing/2014/main" id="{842F7379-7927-4A04-9F04-A65F65E85B4B}"/>
+              </a:ext>
+            </a:extLst>
+          </p:cNvPr>
+          <p:cNvSpPr txBox="1"/>
+          <p:nvPr/>
+        </p:nvSpPr>
+        <p:spPr>
+          <a:xfrm>
+            <a:off x="8694814" y="589272"/>
+            <a:ext cx="2502566" cy="276999"/>
+          </a:xfrm>
+          <a:prstGeom prst="rect">
+            <a:avLst/>
+          </a:prstGeom>
+          <a:noFill/>
+        </p:spPr>
+        <p:txBody>
+          <a:bodyPr wrap="square" rtlCol="0" anchor="ctr">
+            <a:spAutoFit/>
+          </a:bodyPr>
+          <a:lstStyle/>
+          <a:p>
+            <a:pPr algn="r"/>
+            <a:r>
+              <a:rPr lang="es-ES" sz="1200"/>
+              <a:t>Least significant bits </a:t>
+            </a:r>
+            <a:r>
+              <a:rPr lang="es-ES" sz="1200">
+                <a:sym typeface="Wingdings" panose="05000000000000000000" pitchFamily="2" charset="2"/>
+              </a:rPr>
+              <a:t></a:t>
+            </a:r>
+            <a:endParaRPr lang="es-ES" sz="1200"/>
+          </a:p>
+        </p:txBody>
+      </p:sp>
+      <p:sp>
+        <p:nvSpPr>
+          <p:cNvPr id="154" name="CuadroTexto 153">
+            <a:extLst>
+              <a:ext uri="{FF2B5EF4-FFF2-40B4-BE49-F238E27FC236}">
+                <a16:creationId xmlns="" xmlns:a16="http://schemas.microsoft.com/office/drawing/2014/main" id="{0DC557E3-0D74-4B92-85AD-ACB09F131005}"/>
+              </a:ext>
+            </a:extLst>
+          </p:cNvPr>
+          <p:cNvSpPr txBox="1"/>
+          <p:nvPr/>
+        </p:nvSpPr>
+        <p:spPr>
+          <a:xfrm>
+            <a:off x="1187116" y="589272"/>
+            <a:ext cx="2502566" cy="276999"/>
+          </a:xfrm>
+          <a:prstGeom prst="rect">
+            <a:avLst/>
+          </a:prstGeom>
+          <a:noFill/>
+        </p:spPr>
+        <p:txBody>
+          <a:bodyPr wrap="square" rtlCol="0" anchor="ctr">
+            <a:spAutoFit/>
+          </a:bodyPr>
+          <a:lstStyle/>
+          <a:p>
+            <a:r>
+              <a:rPr lang="es-ES" sz="1200">
+                <a:sym typeface="Wingdings" panose="05000000000000000000" pitchFamily="2" charset="2"/>
+              </a:rPr>
+              <a:t> </a:t>
+            </a:r>
+            <a:r>
+              <a:rPr lang="es-ES" sz="1200"/>
+              <a:t>Most significant bits</a:t>
+            </a:r>
+          </a:p>
+        </p:txBody>
+      </p:sp>
+      <p:sp>
+        <p:nvSpPr>
+          <p:cNvPr id="74" name="CuadroTexto 73">
+            <a:extLst>
+              <a:ext uri="{FF2B5EF4-FFF2-40B4-BE49-F238E27FC236}">
+                <a16:creationId xmlns="" xmlns:a16="http://schemas.microsoft.com/office/drawing/2014/main" id="{EC7EB5A0-9EB7-4580-9947-4C081C7CD389}"/>
+              </a:ext>
+            </a:extLst>
+          </p:cNvPr>
+          <p:cNvSpPr txBox="1"/>
+          <p:nvPr/>
+        </p:nvSpPr>
+        <p:spPr>
+          <a:xfrm>
+            <a:off x="3697403" y="1776481"/>
+            <a:ext cx="2510511" cy="369332"/>
+          </a:xfrm>
+          <a:prstGeom prst="rect">
+            <a:avLst/>
+          </a:prstGeom>
+          <a:noFill/>
+        </p:spPr>
+        <p:txBody>
+          <a:bodyPr wrap="square" rtlCol="0" anchor="ctr">
+            <a:spAutoFit/>
+          </a:bodyPr>
+          <a:lstStyle/>
+          <a:p>
+            <a:pPr algn="ctr"/>
+            <a:r>
+              <a:rPr lang="es-ES"/>
+              <a:t>8 bits</a:t>
+            </a:r>
+          </a:p>
+        </p:txBody>
+      </p:sp>
+      <p:sp>
+        <p:nvSpPr>
+          <p:cNvPr id="76" name="CuadroTexto 75">
+            <a:extLst>
+              <a:ext uri="{FF2B5EF4-FFF2-40B4-BE49-F238E27FC236}">
+                <a16:creationId xmlns="" xmlns:a16="http://schemas.microsoft.com/office/drawing/2014/main" id="{A70D8229-F7B4-4F05-8DA8-A1F172A77638}"/>
+              </a:ext>
+            </a:extLst>
+          </p:cNvPr>
+          <p:cNvSpPr txBox="1"/>
+          <p:nvPr/>
+        </p:nvSpPr>
+        <p:spPr>
+          <a:xfrm>
+            <a:off x="3697614" y="2125579"/>
+            <a:ext cx="2510511" cy="369332"/>
+          </a:xfrm>
+          <a:prstGeom prst="rect">
+            <a:avLst/>
+          </a:prstGeom>
+          <a:noFill/>
+        </p:spPr>
+        <p:txBody>
+          <a:bodyPr wrap="square" rtlCol="0" anchor="ctr">
+            <a:spAutoFit/>
+          </a:bodyPr>
+          <a:lstStyle/>
+          <a:p>
+            <a:pPr algn="ctr"/>
+            <a:r>
+              <a:rPr lang="es-ES" smtClean="0">
+                <a:solidFill>
+                  <a:srgbClr val="0070C0"/>
+                </a:solidFill>
+              </a:rPr>
+              <a:t>Blue </a:t>
+            </a:r>
+            <a:r>
+              <a:rPr lang="es-ES">
+                <a:solidFill>
+                  <a:srgbClr val="0070C0"/>
+                </a:solidFill>
+              </a:rPr>
+              <a:t>component</a:t>
+            </a:r>
+          </a:p>
+        </p:txBody>
+      </p:sp>
+      <p:sp>
+        <p:nvSpPr>
+          <p:cNvPr id="78" name="CuadroTexto 77">
+            <a:extLst>
+              <a:ext uri="{FF2B5EF4-FFF2-40B4-BE49-F238E27FC236}">
+                <a16:creationId xmlns="" xmlns:a16="http://schemas.microsoft.com/office/drawing/2014/main" id="{2F7FB464-302F-4CF5-A06A-A3792F16F161}"/>
+              </a:ext>
+            </a:extLst>
+          </p:cNvPr>
+          <p:cNvSpPr txBox="1"/>
+          <p:nvPr/>
+        </p:nvSpPr>
+        <p:spPr>
+          <a:xfrm>
+            <a:off x="6192037" y="1776481"/>
+            <a:ext cx="2510511" cy="369332"/>
+          </a:xfrm>
+          <a:prstGeom prst="rect">
+            <a:avLst/>
+          </a:prstGeom>
+          <a:noFill/>
+        </p:spPr>
+        <p:txBody>
+          <a:bodyPr wrap="square" rtlCol="0" anchor="ctr">
+            <a:spAutoFit/>
+          </a:bodyPr>
+          <a:lstStyle/>
+          <a:p>
+            <a:pPr algn="ctr"/>
+            <a:r>
+              <a:rPr lang="es-ES"/>
+              <a:t>8 bits</a:t>
+            </a:r>
+          </a:p>
+        </p:txBody>
+      </p:sp>
+      <p:sp>
+        <p:nvSpPr>
+          <p:cNvPr id="80" name="CuadroTexto 79">
+            <a:extLst>
+              <a:ext uri="{FF2B5EF4-FFF2-40B4-BE49-F238E27FC236}">
+                <a16:creationId xmlns="" xmlns:a16="http://schemas.microsoft.com/office/drawing/2014/main" id="{324B035A-4BFC-42E2-AF97-B3915E794013}"/>
+              </a:ext>
+            </a:extLst>
+          </p:cNvPr>
+          <p:cNvSpPr txBox="1"/>
+          <p:nvPr/>
+        </p:nvSpPr>
+        <p:spPr>
+          <a:xfrm>
+            <a:off x="6192248" y="2125579"/>
+            <a:ext cx="2510511" cy="369332"/>
+          </a:xfrm>
+          <a:prstGeom prst="rect">
+            <a:avLst/>
+          </a:prstGeom>
+          <a:noFill/>
+        </p:spPr>
+        <p:txBody>
+          <a:bodyPr wrap="square" rtlCol="0" anchor="ctr">
+            <a:spAutoFit/>
+          </a:bodyPr>
+          <a:lstStyle/>
+          <a:p>
+            <a:pPr algn="ctr"/>
+            <a:r>
+              <a:rPr lang="es-ES" smtClean="0">
+                <a:solidFill>
+                  <a:srgbClr val="00B050"/>
+                </a:solidFill>
+              </a:rPr>
+              <a:t>Green </a:t>
+            </a:r>
+            <a:r>
+              <a:rPr lang="es-ES">
+                <a:solidFill>
+                  <a:srgbClr val="00B050"/>
+                </a:solidFill>
+              </a:rPr>
+              <a:t>component</a:t>
+            </a:r>
+          </a:p>
+        </p:txBody>
+      </p:sp>
+      <p:sp>
+        <p:nvSpPr>
+          <p:cNvPr id="82" name="CuadroTexto 81">
+            <a:extLst>
+              <a:ext uri="{FF2B5EF4-FFF2-40B4-BE49-F238E27FC236}">
+                <a16:creationId xmlns="" xmlns:a16="http://schemas.microsoft.com/office/drawing/2014/main" id="{71BDD27D-305D-494F-94A9-7A84BB5B4173}"/>
+              </a:ext>
+            </a:extLst>
+          </p:cNvPr>
+          <p:cNvSpPr txBox="1"/>
+          <p:nvPr/>
+        </p:nvSpPr>
+        <p:spPr>
+          <a:xfrm>
+            <a:off x="8694603" y="1776481"/>
+            <a:ext cx="2510511" cy="369332"/>
+          </a:xfrm>
+          <a:prstGeom prst="rect">
+            <a:avLst/>
+          </a:prstGeom>
+          <a:noFill/>
+        </p:spPr>
+        <p:txBody>
+          <a:bodyPr wrap="square" rtlCol="0" anchor="ctr">
+            <a:spAutoFit/>
+          </a:bodyPr>
+          <a:lstStyle/>
+          <a:p>
+            <a:pPr algn="ctr"/>
+            <a:r>
+              <a:rPr lang="es-ES"/>
+              <a:t>8 bits</a:t>
+            </a:r>
+          </a:p>
+        </p:txBody>
+      </p:sp>
+      <p:sp>
+        <p:nvSpPr>
+          <p:cNvPr id="84" name="CuadroTexto 83">
+            <a:extLst>
+              <a:ext uri="{FF2B5EF4-FFF2-40B4-BE49-F238E27FC236}">
+                <a16:creationId xmlns="" xmlns:a16="http://schemas.microsoft.com/office/drawing/2014/main" id="{FBB4F18B-E462-40E8-9747-7C455266C069}"/>
+              </a:ext>
+            </a:extLst>
+          </p:cNvPr>
+          <p:cNvSpPr txBox="1"/>
+          <p:nvPr/>
+        </p:nvSpPr>
+        <p:spPr>
+          <a:xfrm>
+            <a:off x="8694814" y="2125579"/>
+            <a:ext cx="2510511" cy="369332"/>
+          </a:xfrm>
+          <a:prstGeom prst="rect">
+            <a:avLst/>
+          </a:prstGeom>
+          <a:noFill/>
+        </p:spPr>
+        <p:txBody>
+          <a:bodyPr wrap="square" rtlCol="0" anchor="ctr">
+            <a:spAutoFit/>
+          </a:bodyPr>
+          <a:lstStyle/>
+          <a:p>
+            <a:pPr algn="ctr"/>
+            <a:r>
+              <a:rPr lang="es-ES" smtClean="0">
+                <a:solidFill>
+                  <a:srgbClr val="FF0000"/>
+                </a:solidFill>
+              </a:rPr>
+              <a:t>Red </a:t>
+            </a:r>
+            <a:r>
+              <a:rPr lang="es-ES">
+                <a:solidFill>
+                  <a:srgbClr val="FF0000"/>
+                </a:solidFill>
+              </a:rPr>
+              <a:t>component</a:t>
             </a:r>
           </a:p>
         </p:txBody>
@@ -11064,7 +11090,7 @@
           <p:cNvPr id="86" name="Rectángulo 85">
             <a:extLst>
               <a:ext uri="{FF2B5EF4-FFF2-40B4-BE49-F238E27FC236}">
-                <a16:creationId xmlns:a16="http://schemas.microsoft.com/office/drawing/2014/main" xmlns="" id="{D136B626-B99A-4919-8609-F0DA15C64A07}"/>
+                <a16:creationId xmlns="" xmlns:a16="http://schemas.microsoft.com/office/drawing/2014/main" id="{D136B626-B99A-4919-8609-F0DA15C64A07}"/>
               </a:ext>
             </a:extLst>
           </p:cNvPr>
@@ -11116,7 +11142,7 @@
           <p:cNvPr id="88" name="Rectángulo 87">
             <a:extLst>
               <a:ext uri="{FF2B5EF4-FFF2-40B4-BE49-F238E27FC236}">
-                <a16:creationId xmlns:a16="http://schemas.microsoft.com/office/drawing/2014/main" xmlns="" id="{1D5C81C2-3A8D-4B79-84C3-767501CFBACA}"/>
+                <a16:creationId xmlns="" xmlns:a16="http://schemas.microsoft.com/office/drawing/2014/main" id="{1D5C81C2-3A8D-4B79-84C3-767501CFBACA}"/>
               </a:ext>
             </a:extLst>
           </p:cNvPr>
@@ -11168,7 +11194,7 @@
           <p:cNvPr id="90" name="Rectángulo 89">
             <a:extLst>
               <a:ext uri="{FF2B5EF4-FFF2-40B4-BE49-F238E27FC236}">
-                <a16:creationId xmlns:a16="http://schemas.microsoft.com/office/drawing/2014/main" xmlns="" id="{3561981F-4785-4A09-8181-E0BC6A56A32D}"/>
+                <a16:creationId xmlns="" xmlns:a16="http://schemas.microsoft.com/office/drawing/2014/main" id="{3561981F-4785-4A09-8181-E0BC6A56A32D}"/>
               </a:ext>
             </a:extLst>
           </p:cNvPr>
@@ -11220,7 +11246,7 @@
           <p:cNvPr id="92" name="Rectángulo 91">
             <a:extLst>
               <a:ext uri="{FF2B5EF4-FFF2-40B4-BE49-F238E27FC236}">
-                <a16:creationId xmlns:a16="http://schemas.microsoft.com/office/drawing/2014/main" xmlns="" id="{BC1258C2-8AC5-44BE-A819-DA652F727394}"/>
+                <a16:creationId xmlns="" xmlns:a16="http://schemas.microsoft.com/office/drawing/2014/main" id="{BC1258C2-8AC5-44BE-A819-DA652F727394}"/>
               </a:ext>
             </a:extLst>
           </p:cNvPr>
@@ -11272,7 +11298,7 @@
           <p:cNvPr id="94" name="Rectángulo 93">
             <a:extLst>
               <a:ext uri="{FF2B5EF4-FFF2-40B4-BE49-F238E27FC236}">
-                <a16:creationId xmlns:a16="http://schemas.microsoft.com/office/drawing/2014/main" xmlns="" id="{09FA9F8B-4F70-4843-9EAC-9A6B1124B191}"/>
+                <a16:creationId xmlns="" xmlns:a16="http://schemas.microsoft.com/office/drawing/2014/main" id="{09FA9F8B-4F70-4843-9EAC-9A6B1124B191}"/>
               </a:ext>
             </a:extLst>
           </p:cNvPr>
@@ -11324,7 +11350,7 @@
           <p:cNvPr id="96" name="Rectángulo 95">
             <a:extLst>
               <a:ext uri="{FF2B5EF4-FFF2-40B4-BE49-F238E27FC236}">
-                <a16:creationId xmlns:a16="http://schemas.microsoft.com/office/drawing/2014/main" xmlns="" id="{BDE75ADB-62F6-4B06-A8C8-48FFC0734776}"/>
+                <a16:creationId xmlns="" xmlns:a16="http://schemas.microsoft.com/office/drawing/2014/main" id="{BDE75ADB-62F6-4B06-A8C8-48FFC0734776}"/>
               </a:ext>
             </a:extLst>
           </p:cNvPr>
@@ -11376,7 +11402,7 @@
           <p:cNvPr id="98" name="Rectángulo 97">
             <a:extLst>
               <a:ext uri="{FF2B5EF4-FFF2-40B4-BE49-F238E27FC236}">
-                <a16:creationId xmlns:a16="http://schemas.microsoft.com/office/drawing/2014/main" xmlns="" id="{CE8D17C1-C2A2-4D3F-9B83-195AFB3C969B}"/>
+                <a16:creationId xmlns="" xmlns:a16="http://schemas.microsoft.com/office/drawing/2014/main" id="{CE8D17C1-C2A2-4D3F-9B83-195AFB3C969B}"/>
               </a:ext>
             </a:extLst>
           </p:cNvPr>
@@ -11428,7 +11454,7 @@
           <p:cNvPr id="100" name="Rectángulo 99">
             <a:extLst>
               <a:ext uri="{FF2B5EF4-FFF2-40B4-BE49-F238E27FC236}">
-                <a16:creationId xmlns:a16="http://schemas.microsoft.com/office/drawing/2014/main" xmlns="" id="{3BEECC94-5FF0-48DA-BCEC-E87CA93FD03A}"/>
+                <a16:creationId xmlns="" xmlns:a16="http://schemas.microsoft.com/office/drawing/2014/main" id="{3BEECC94-5FF0-48DA-BCEC-E87CA93FD03A}"/>
               </a:ext>
             </a:extLst>
           </p:cNvPr>
@@ -11480,7 +11506,7 @@
           <p:cNvPr id="101" name="Rectángulo 100">
             <a:extLst>
               <a:ext uri="{FF2B5EF4-FFF2-40B4-BE49-F238E27FC236}">
-                <a16:creationId xmlns:a16="http://schemas.microsoft.com/office/drawing/2014/main" xmlns="" id="{5AF5D5E5-FA6F-48E1-AEEC-C2D0AFCABAD3}"/>
+                <a16:creationId xmlns="" xmlns:a16="http://schemas.microsoft.com/office/drawing/2014/main" id="{5AF5D5E5-FA6F-48E1-AEEC-C2D0AFCABAD3}"/>
               </a:ext>
             </a:extLst>
           </p:cNvPr>
@@ -11532,7 +11558,7 @@
           <p:cNvPr id="108" name="Rectángulo 107">
             <a:extLst>
               <a:ext uri="{FF2B5EF4-FFF2-40B4-BE49-F238E27FC236}">
-                <a16:creationId xmlns:a16="http://schemas.microsoft.com/office/drawing/2014/main" xmlns="" id="{FC54B5E4-BD6D-47B2-A73F-551173B6F644}"/>
+                <a16:creationId xmlns="" xmlns:a16="http://schemas.microsoft.com/office/drawing/2014/main" id="{FC54B5E4-BD6D-47B2-A73F-551173B6F644}"/>
               </a:ext>
             </a:extLst>
           </p:cNvPr>
@@ -11584,7 +11610,7 @@
           <p:cNvPr id="111" name="Rectángulo 110">
             <a:extLst>
               <a:ext uri="{FF2B5EF4-FFF2-40B4-BE49-F238E27FC236}">
-                <a16:creationId xmlns:a16="http://schemas.microsoft.com/office/drawing/2014/main" xmlns="" id="{A01D818C-C207-48AE-B849-41C661FD0762}"/>
+                <a16:creationId xmlns="" xmlns:a16="http://schemas.microsoft.com/office/drawing/2014/main" id="{A01D818C-C207-48AE-B849-41C661FD0762}"/>
               </a:ext>
             </a:extLst>
           </p:cNvPr>
@@ -11636,7 +11662,7 @@
           <p:cNvPr id="113" name="Rectángulo 112">
             <a:extLst>
               <a:ext uri="{FF2B5EF4-FFF2-40B4-BE49-F238E27FC236}">
-                <a16:creationId xmlns:a16="http://schemas.microsoft.com/office/drawing/2014/main" xmlns="" id="{925158CF-29ED-4A4A-B3AF-C72B5B7BB7EC}"/>
+                <a16:creationId xmlns="" xmlns:a16="http://schemas.microsoft.com/office/drawing/2014/main" id="{925158CF-29ED-4A4A-B3AF-C72B5B7BB7EC}"/>
               </a:ext>
             </a:extLst>
           </p:cNvPr>
@@ -11688,7 +11714,7 @@
           <p:cNvPr id="115" name="Rectángulo 114">
             <a:extLst>
               <a:ext uri="{FF2B5EF4-FFF2-40B4-BE49-F238E27FC236}">
-                <a16:creationId xmlns:a16="http://schemas.microsoft.com/office/drawing/2014/main" xmlns="" id="{499E038A-214A-49F9-8103-A9A3A620F489}"/>
+                <a16:creationId xmlns="" xmlns:a16="http://schemas.microsoft.com/office/drawing/2014/main" id="{499E038A-214A-49F9-8103-A9A3A620F489}"/>
               </a:ext>
             </a:extLst>
           </p:cNvPr>
@@ -11740,7 +11766,7 @@
           <p:cNvPr id="117" name="Rectángulo 116">
             <a:extLst>
               <a:ext uri="{FF2B5EF4-FFF2-40B4-BE49-F238E27FC236}">
-                <a16:creationId xmlns:a16="http://schemas.microsoft.com/office/drawing/2014/main" xmlns="" id="{0664541E-0833-4A5E-A8EF-5A3FCF77F63E}"/>
+                <a16:creationId xmlns="" xmlns:a16="http://schemas.microsoft.com/office/drawing/2014/main" id="{0664541E-0833-4A5E-A8EF-5A3FCF77F63E}"/>
               </a:ext>
             </a:extLst>
           </p:cNvPr>
@@ -11792,7 +11818,7 @@
           <p:cNvPr id="120" name="Rectángulo 119">
             <a:extLst>
               <a:ext uri="{FF2B5EF4-FFF2-40B4-BE49-F238E27FC236}">
-                <a16:creationId xmlns:a16="http://schemas.microsoft.com/office/drawing/2014/main" xmlns="" id="{79D68643-0A1E-495E-80FB-534377898035}"/>
+                <a16:creationId xmlns="" xmlns:a16="http://schemas.microsoft.com/office/drawing/2014/main" id="{79D68643-0A1E-495E-80FB-534377898035}"/>
               </a:ext>
             </a:extLst>
           </p:cNvPr>
@@ -11844,7 +11870,7 @@
           <p:cNvPr id="127" name="Rectángulo 126">
             <a:extLst>
               <a:ext uri="{FF2B5EF4-FFF2-40B4-BE49-F238E27FC236}">
-                <a16:creationId xmlns:a16="http://schemas.microsoft.com/office/drawing/2014/main" xmlns="" id="{E7BD9940-F968-4B8B-8CF6-01F0F9A79FC5}"/>
+                <a16:creationId xmlns="" xmlns:a16="http://schemas.microsoft.com/office/drawing/2014/main" id="{E7BD9940-F968-4B8B-8CF6-01F0F9A79FC5}"/>
               </a:ext>
             </a:extLst>
           </p:cNvPr>
@@ -11896,7 +11922,7 @@
           <p:cNvPr id="128" name="Rectángulo 127">
             <a:extLst>
               <a:ext uri="{FF2B5EF4-FFF2-40B4-BE49-F238E27FC236}">
-                <a16:creationId xmlns:a16="http://schemas.microsoft.com/office/drawing/2014/main" xmlns="" id="{9A111A93-0EBA-486F-9846-8B244017B371}"/>
+                <a16:creationId xmlns="" xmlns:a16="http://schemas.microsoft.com/office/drawing/2014/main" id="{9A111A93-0EBA-486F-9846-8B244017B371}"/>
               </a:ext>
             </a:extLst>
           </p:cNvPr>
@@ -11948,7 +11974,7 @@
           <p:cNvPr id="129" name="Rectángulo 128">
             <a:extLst>
               <a:ext uri="{FF2B5EF4-FFF2-40B4-BE49-F238E27FC236}">
-                <a16:creationId xmlns:a16="http://schemas.microsoft.com/office/drawing/2014/main" xmlns="" id="{2EDC590C-B79B-4455-B21A-E52CD413002F}"/>
+                <a16:creationId xmlns="" xmlns:a16="http://schemas.microsoft.com/office/drawing/2014/main" id="{2EDC590C-B79B-4455-B21A-E52CD413002F}"/>
               </a:ext>
             </a:extLst>
           </p:cNvPr>
@@ -12000,7 +12026,7 @@
           <p:cNvPr id="130" name="Rectángulo 129">
             <a:extLst>
               <a:ext uri="{FF2B5EF4-FFF2-40B4-BE49-F238E27FC236}">
-                <a16:creationId xmlns:a16="http://schemas.microsoft.com/office/drawing/2014/main" xmlns="" id="{BFE52AF6-0715-45AA-BE61-460045DFF830}"/>
+                <a16:creationId xmlns="" xmlns:a16="http://schemas.microsoft.com/office/drawing/2014/main" id="{BFE52AF6-0715-45AA-BE61-460045DFF830}"/>
               </a:ext>
             </a:extLst>
           </p:cNvPr>
@@ -12052,7 +12078,7 @@
           <p:cNvPr id="131" name="Rectángulo 130">
             <a:extLst>
               <a:ext uri="{FF2B5EF4-FFF2-40B4-BE49-F238E27FC236}">
-                <a16:creationId xmlns:a16="http://schemas.microsoft.com/office/drawing/2014/main" xmlns="" id="{ABD5847F-75F1-4799-9544-668E918A0AC5}"/>
+                <a16:creationId xmlns="" xmlns:a16="http://schemas.microsoft.com/office/drawing/2014/main" id="{ABD5847F-75F1-4799-9544-668E918A0AC5}"/>
               </a:ext>
             </a:extLst>
           </p:cNvPr>
@@ -12104,7 +12130,7 @@
           <p:cNvPr id="132" name="Rectángulo 131">
             <a:extLst>
               <a:ext uri="{FF2B5EF4-FFF2-40B4-BE49-F238E27FC236}">
-                <a16:creationId xmlns:a16="http://schemas.microsoft.com/office/drawing/2014/main" xmlns="" id="{8B57A71E-4CB6-4D59-94FC-2987F4485F43}"/>
+                <a16:creationId xmlns="" xmlns:a16="http://schemas.microsoft.com/office/drawing/2014/main" id="{8B57A71E-4CB6-4D59-94FC-2987F4485F43}"/>
               </a:ext>
             </a:extLst>
           </p:cNvPr>
@@ -12156,7 +12182,7 @@
           <p:cNvPr id="133" name="Rectángulo 132">
             <a:extLst>
               <a:ext uri="{FF2B5EF4-FFF2-40B4-BE49-F238E27FC236}">
-                <a16:creationId xmlns:a16="http://schemas.microsoft.com/office/drawing/2014/main" xmlns="" id="{852973DA-04D7-48FC-8EEF-735C27611E8E}"/>
+                <a16:creationId xmlns="" xmlns:a16="http://schemas.microsoft.com/office/drawing/2014/main" id="{852973DA-04D7-48FC-8EEF-735C27611E8E}"/>
               </a:ext>
             </a:extLst>
           </p:cNvPr>
@@ -12208,7 +12234,7 @@
           <p:cNvPr id="134" name="Rectángulo 133">
             <a:extLst>
               <a:ext uri="{FF2B5EF4-FFF2-40B4-BE49-F238E27FC236}">
-                <a16:creationId xmlns:a16="http://schemas.microsoft.com/office/drawing/2014/main" xmlns="" id="{722DFA65-C143-4D0A-94F4-305BA1B1E318}"/>
+                <a16:creationId xmlns="" xmlns:a16="http://schemas.microsoft.com/office/drawing/2014/main" id="{722DFA65-C143-4D0A-94F4-305BA1B1E318}"/>
               </a:ext>
             </a:extLst>
           </p:cNvPr>
@@ -12260,7 +12286,7 @@
           <p:cNvPr id="135" name="Rectángulo 134">
             <a:extLst>
               <a:ext uri="{FF2B5EF4-FFF2-40B4-BE49-F238E27FC236}">
-                <a16:creationId xmlns:a16="http://schemas.microsoft.com/office/drawing/2014/main" xmlns="" id="{05562AE3-F2A7-4FE9-BCD7-055717A12BA2}"/>
+                <a16:creationId xmlns="" xmlns:a16="http://schemas.microsoft.com/office/drawing/2014/main" id="{05562AE3-F2A7-4FE9-BCD7-055717A12BA2}"/>
               </a:ext>
             </a:extLst>
           </p:cNvPr>
@@ -12312,7 +12338,7 @@
           <p:cNvPr id="136" name="Rectángulo 135">
             <a:extLst>
               <a:ext uri="{FF2B5EF4-FFF2-40B4-BE49-F238E27FC236}">
-                <a16:creationId xmlns:a16="http://schemas.microsoft.com/office/drawing/2014/main" xmlns="" id="{45204B18-3348-4086-8A71-A0A62EB4C662}"/>
+                <a16:creationId xmlns="" xmlns:a16="http://schemas.microsoft.com/office/drawing/2014/main" id="{45204B18-3348-4086-8A71-A0A62EB4C662}"/>
               </a:ext>
             </a:extLst>
           </p:cNvPr>
@@ -12364,7 +12390,7 @@
           <p:cNvPr id="137" name="Rectángulo 136">
             <a:extLst>
               <a:ext uri="{FF2B5EF4-FFF2-40B4-BE49-F238E27FC236}">
-                <a16:creationId xmlns:a16="http://schemas.microsoft.com/office/drawing/2014/main" xmlns="" id="{4431FD59-9C6C-4FD4-A087-B445A8EF6FDF}"/>
+                <a16:creationId xmlns="" xmlns:a16="http://schemas.microsoft.com/office/drawing/2014/main" id="{4431FD59-9C6C-4FD4-A087-B445A8EF6FDF}"/>
               </a:ext>
             </a:extLst>
           </p:cNvPr>
@@ -12416,7 +12442,7 @@
           <p:cNvPr id="138" name="Rectángulo 137">
             <a:extLst>
               <a:ext uri="{FF2B5EF4-FFF2-40B4-BE49-F238E27FC236}">
-                <a16:creationId xmlns:a16="http://schemas.microsoft.com/office/drawing/2014/main" xmlns="" id="{831ABC75-3734-44DE-B678-F9A08F453CA9}"/>
+                <a16:creationId xmlns="" xmlns:a16="http://schemas.microsoft.com/office/drawing/2014/main" id="{831ABC75-3734-44DE-B678-F9A08F453CA9}"/>
               </a:ext>
             </a:extLst>
           </p:cNvPr>
@@ -12468,7 +12494,7 @@
           <p:cNvPr id="139" name="Rectángulo 138">
             <a:extLst>
               <a:ext uri="{FF2B5EF4-FFF2-40B4-BE49-F238E27FC236}">
-                <a16:creationId xmlns:a16="http://schemas.microsoft.com/office/drawing/2014/main" xmlns="" id="{6747C598-6F27-48F6-8699-DE71CA8AAC56}"/>
+                <a16:creationId xmlns="" xmlns:a16="http://schemas.microsoft.com/office/drawing/2014/main" id="{6747C598-6F27-48F6-8699-DE71CA8AAC56}"/>
               </a:ext>
             </a:extLst>
           </p:cNvPr>
@@ -12520,7 +12546,7 @@
           <p:cNvPr id="140" name="Rectángulo 139">
             <a:extLst>
               <a:ext uri="{FF2B5EF4-FFF2-40B4-BE49-F238E27FC236}">
-                <a16:creationId xmlns:a16="http://schemas.microsoft.com/office/drawing/2014/main" xmlns="" id="{C847B380-C1D4-4340-AFA5-431A25138A62}"/>
+                <a16:creationId xmlns="" xmlns:a16="http://schemas.microsoft.com/office/drawing/2014/main" id="{C847B380-C1D4-4340-AFA5-431A25138A62}"/>
               </a:ext>
             </a:extLst>
           </p:cNvPr>
@@ -12572,7 +12598,7 @@
           <p:cNvPr id="141" name="Rectángulo 140">
             <a:extLst>
               <a:ext uri="{FF2B5EF4-FFF2-40B4-BE49-F238E27FC236}">
-                <a16:creationId xmlns:a16="http://schemas.microsoft.com/office/drawing/2014/main" xmlns="" id="{E7925BD4-0E84-4AC6-9E38-CD5780EE73A7}"/>
+                <a16:creationId xmlns="" xmlns:a16="http://schemas.microsoft.com/office/drawing/2014/main" id="{E7925BD4-0E84-4AC6-9E38-CD5780EE73A7}"/>
               </a:ext>
             </a:extLst>
           </p:cNvPr>
@@ -12624,7 +12650,7 @@
           <p:cNvPr id="147" name="Rectángulo 146">
             <a:extLst>
               <a:ext uri="{FF2B5EF4-FFF2-40B4-BE49-F238E27FC236}">
-                <a16:creationId xmlns:a16="http://schemas.microsoft.com/office/drawing/2014/main" xmlns="" id="{2A8C2ECE-5ECC-4C5D-85C5-B01FE7E065E5}"/>
+                <a16:creationId xmlns="" xmlns:a16="http://schemas.microsoft.com/office/drawing/2014/main" id="{2A8C2ECE-5ECC-4C5D-85C5-B01FE7E065E5}"/>
               </a:ext>
             </a:extLst>
           </p:cNvPr>
@@ -12676,7 +12702,7 @@
           <p:cNvPr id="151" name="Rectángulo 150">
             <a:extLst>
               <a:ext uri="{FF2B5EF4-FFF2-40B4-BE49-F238E27FC236}">
-                <a16:creationId xmlns:a16="http://schemas.microsoft.com/office/drawing/2014/main" xmlns="" id="{39BED3B9-5161-4238-A6B4-E73C2313BF03}"/>
+                <a16:creationId xmlns="" xmlns:a16="http://schemas.microsoft.com/office/drawing/2014/main" id="{39BED3B9-5161-4238-A6B4-E73C2313BF03}"/>
               </a:ext>
             </a:extLst>
           </p:cNvPr>
@@ -12728,7 +12754,7 @@
           <p:cNvPr id="152" name="Conector recto 151">
             <a:extLst>
               <a:ext uri="{FF2B5EF4-FFF2-40B4-BE49-F238E27FC236}">
-                <a16:creationId xmlns:a16="http://schemas.microsoft.com/office/drawing/2014/main" xmlns="" id="{7E9F22F7-742E-4F2E-ABEF-67ECBC1C0BB1}"/>
+                <a16:creationId xmlns="" xmlns:a16="http://schemas.microsoft.com/office/drawing/2014/main" id="{7E9F22F7-742E-4F2E-ABEF-67ECBC1C0BB1}"/>
               </a:ext>
             </a:extLst>
           </p:cNvPr>
@@ -12771,7 +12797,7 @@
           <p:cNvPr id="156" name="Conector recto 155">
             <a:extLst>
               <a:ext uri="{FF2B5EF4-FFF2-40B4-BE49-F238E27FC236}">
-                <a16:creationId xmlns:a16="http://schemas.microsoft.com/office/drawing/2014/main" xmlns="" id="{ADE4CF5E-7706-4075-9EBC-713026A07A99}"/>
+                <a16:creationId xmlns="" xmlns:a16="http://schemas.microsoft.com/office/drawing/2014/main" id="{ADE4CF5E-7706-4075-9EBC-713026A07A99}"/>
               </a:ext>
             </a:extLst>
           </p:cNvPr>
@@ -12814,7 +12840,7 @@
           <p:cNvPr id="158" name="Conector recto de flecha 157">
             <a:extLst>
               <a:ext uri="{FF2B5EF4-FFF2-40B4-BE49-F238E27FC236}">
-                <a16:creationId xmlns:a16="http://schemas.microsoft.com/office/drawing/2014/main" xmlns="" id="{E462C51E-1902-4E27-A25A-6B3B8509589C}"/>
+                <a16:creationId xmlns="" xmlns:a16="http://schemas.microsoft.com/office/drawing/2014/main" id="{E462C51E-1902-4E27-A25A-6B3B8509589C}"/>
               </a:ext>
             </a:extLst>
           </p:cNvPr>
@@ -12856,7 +12882,7 @@
           <p:cNvPr id="160" name="Conector recto de flecha 159">
             <a:extLst>
               <a:ext uri="{FF2B5EF4-FFF2-40B4-BE49-F238E27FC236}">
-                <a16:creationId xmlns:a16="http://schemas.microsoft.com/office/drawing/2014/main" xmlns="" id="{2EEE090E-2E31-4BF1-976D-E3FD7FD7BB67}"/>
+                <a16:creationId xmlns="" xmlns:a16="http://schemas.microsoft.com/office/drawing/2014/main" id="{2EEE090E-2E31-4BF1-976D-E3FD7FD7BB67}"/>
               </a:ext>
             </a:extLst>
           </p:cNvPr>
@@ -12898,7 +12924,7 @@
           <p:cNvPr id="162" name="Conector recto 161">
             <a:extLst>
               <a:ext uri="{FF2B5EF4-FFF2-40B4-BE49-F238E27FC236}">
-                <a16:creationId xmlns:a16="http://schemas.microsoft.com/office/drawing/2014/main" xmlns="" id="{72A94A24-0428-400E-8F53-1E6C7C368BFC}"/>
+                <a16:creationId xmlns="" xmlns:a16="http://schemas.microsoft.com/office/drawing/2014/main" id="{72A94A24-0428-400E-8F53-1E6C7C368BFC}"/>
               </a:ext>
             </a:extLst>
           </p:cNvPr>
@@ -12941,7 +12967,7 @@
           <p:cNvPr id="163" name="CuadroTexto 162">
             <a:extLst>
               <a:ext uri="{FF2B5EF4-FFF2-40B4-BE49-F238E27FC236}">
-                <a16:creationId xmlns:a16="http://schemas.microsoft.com/office/drawing/2014/main" xmlns="" id="{A447CBF8-295A-4EB8-BE3C-DB2C86627377}"/>
+                <a16:creationId xmlns="" xmlns:a16="http://schemas.microsoft.com/office/drawing/2014/main" id="{A447CBF8-295A-4EB8-BE3C-DB2C86627377}"/>
               </a:ext>
             </a:extLst>
           </p:cNvPr>
@@ -12977,7 +13003,7 @@
           <p:cNvPr id="164" name="CuadroTexto 163">
             <a:extLst>
               <a:ext uri="{FF2B5EF4-FFF2-40B4-BE49-F238E27FC236}">
-                <a16:creationId xmlns:a16="http://schemas.microsoft.com/office/drawing/2014/main" xmlns="" id="{17A3A88F-AEAD-46DE-A3B5-BD5151511C03}"/>
+                <a16:creationId xmlns="" xmlns:a16="http://schemas.microsoft.com/office/drawing/2014/main" id="{17A3A88F-AEAD-46DE-A3B5-BD5151511C03}"/>
               </a:ext>
             </a:extLst>
           </p:cNvPr>
@@ -13017,7 +13043,7 @@
           <p:cNvPr id="165" name="CuadroTexto 164">
             <a:extLst>
               <a:ext uri="{FF2B5EF4-FFF2-40B4-BE49-F238E27FC236}">
-                <a16:creationId xmlns:a16="http://schemas.microsoft.com/office/drawing/2014/main" xmlns="" id="{E3051239-9AF1-42B5-B808-D697445F69F3}"/>
+                <a16:creationId xmlns="" xmlns:a16="http://schemas.microsoft.com/office/drawing/2014/main" id="{E3051239-9AF1-42B5-B808-D697445F69F3}"/>
               </a:ext>
             </a:extLst>
           </p:cNvPr>
@@ -13060,7 +13086,7 @@
           <p:cNvPr id="166" name="CuadroTexto 165">
             <a:extLst>
               <a:ext uri="{FF2B5EF4-FFF2-40B4-BE49-F238E27FC236}">
-                <a16:creationId xmlns:a16="http://schemas.microsoft.com/office/drawing/2014/main" xmlns="" id="{630684B5-FECF-4D6E-9125-3E66582C6529}"/>
+                <a16:creationId xmlns="" xmlns:a16="http://schemas.microsoft.com/office/drawing/2014/main" id="{630684B5-FECF-4D6E-9125-3E66582C6529}"/>
               </a:ext>
             </a:extLst>
           </p:cNvPr>
@@ -13101,7 +13127,7 @@
           <p:cNvPr id="169" name="CuadroTexto 168">
             <a:extLst>
               <a:ext uri="{FF2B5EF4-FFF2-40B4-BE49-F238E27FC236}">
-                <a16:creationId xmlns:a16="http://schemas.microsoft.com/office/drawing/2014/main" xmlns="" id="{0C17D9FD-88A0-4C7D-974A-8AA5C997A50B}"/>
+                <a16:creationId xmlns="" xmlns:a16="http://schemas.microsoft.com/office/drawing/2014/main" id="{0C17D9FD-88A0-4C7D-974A-8AA5C997A50B}"/>
               </a:ext>
             </a:extLst>
           </p:cNvPr>
@@ -13137,7 +13163,7 @@
           <p:cNvPr id="170" name="CuadroTexto 169">
             <a:extLst>
               <a:ext uri="{FF2B5EF4-FFF2-40B4-BE49-F238E27FC236}">
-                <a16:creationId xmlns:a16="http://schemas.microsoft.com/office/drawing/2014/main" xmlns="" id="{439BC4A8-140F-4E0A-AAC6-205EFE14EB9D}"/>
+                <a16:creationId xmlns="" xmlns:a16="http://schemas.microsoft.com/office/drawing/2014/main" id="{439BC4A8-140F-4E0A-AAC6-205EFE14EB9D}"/>
               </a:ext>
             </a:extLst>
           </p:cNvPr>
@@ -13175,7 +13201,7 @@
     </p:spTree>
     <p:extLst>
       <p:ext uri="{BB962C8B-B14F-4D97-AF65-F5344CB8AC3E}">
-        <p14:creationId xmlns:p14="http://schemas.microsoft.com/office/powerpoint/2010/main" xmlns="" val="2376407795"/>
+        <p14:creationId xmlns="" xmlns:p14="http://schemas.microsoft.com/office/powerpoint/2010/main" val="2376407795"/>
       </p:ext>
     </p:extLst>
   </p:cSld>
@@ -13207,7 +13233,7 @@
           <p:cNvPr id="159" name="Rectángulo 158">
             <a:extLst>
               <a:ext uri="{FF2B5EF4-FFF2-40B4-BE49-F238E27FC236}">
-                <a16:creationId xmlns:a16="http://schemas.microsoft.com/office/drawing/2014/main" xmlns="" id="{66DAE5FD-FF54-4A17-88E1-B27DA9EBD6E5}"/>
+                <a16:creationId xmlns="" xmlns:a16="http://schemas.microsoft.com/office/drawing/2014/main" id="{66DAE5FD-FF54-4A17-88E1-B27DA9EBD6E5}"/>
               </a:ext>
             </a:extLst>
           </p:cNvPr>
@@ -13259,7 +13285,7 @@
           <p:cNvPr id="161" name="Rectángulo 160">
             <a:extLst>
               <a:ext uri="{FF2B5EF4-FFF2-40B4-BE49-F238E27FC236}">
-                <a16:creationId xmlns:a16="http://schemas.microsoft.com/office/drawing/2014/main" xmlns="" id="{7A49526C-72B2-49C0-838A-9C2FBCBA62C7}"/>
+                <a16:creationId xmlns="" xmlns:a16="http://schemas.microsoft.com/office/drawing/2014/main" id="{7A49526C-72B2-49C0-838A-9C2FBCBA62C7}"/>
               </a:ext>
             </a:extLst>
           </p:cNvPr>
@@ -13311,7 +13337,7 @@
           <p:cNvPr id="162" name="Rectángulo 161">
             <a:extLst>
               <a:ext uri="{FF2B5EF4-FFF2-40B4-BE49-F238E27FC236}">
-                <a16:creationId xmlns:a16="http://schemas.microsoft.com/office/drawing/2014/main" xmlns="" id="{8BCA4A8C-802C-4C31-BE15-EAC2198956B0}"/>
+                <a16:creationId xmlns="" xmlns:a16="http://schemas.microsoft.com/office/drawing/2014/main" id="{8BCA4A8C-802C-4C31-BE15-EAC2198956B0}"/>
               </a:ext>
             </a:extLst>
           </p:cNvPr>
@@ -13363,7 +13389,7 @@
           <p:cNvPr id="163" name="Rectángulo 162">
             <a:extLst>
               <a:ext uri="{FF2B5EF4-FFF2-40B4-BE49-F238E27FC236}">
-                <a16:creationId xmlns:a16="http://schemas.microsoft.com/office/drawing/2014/main" xmlns="" id="{DB8F882F-8972-41F5-B084-FDA3BBA07866}"/>
+                <a16:creationId xmlns="" xmlns:a16="http://schemas.microsoft.com/office/drawing/2014/main" id="{DB8F882F-8972-41F5-B084-FDA3BBA07866}"/>
               </a:ext>
             </a:extLst>
           </p:cNvPr>
@@ -13415,7 +13441,7 @@
           <p:cNvPr id="164" name="Rectángulo 163">
             <a:extLst>
               <a:ext uri="{FF2B5EF4-FFF2-40B4-BE49-F238E27FC236}">
-                <a16:creationId xmlns:a16="http://schemas.microsoft.com/office/drawing/2014/main" xmlns="" id="{99AD3D07-35A7-4098-9A37-845649BF9757}"/>
+                <a16:creationId xmlns="" xmlns:a16="http://schemas.microsoft.com/office/drawing/2014/main" id="{99AD3D07-35A7-4098-9A37-845649BF9757}"/>
               </a:ext>
             </a:extLst>
           </p:cNvPr>
@@ -13467,7 +13493,7 @@
           <p:cNvPr id="165" name="Rectángulo 164">
             <a:extLst>
               <a:ext uri="{FF2B5EF4-FFF2-40B4-BE49-F238E27FC236}">
-                <a16:creationId xmlns:a16="http://schemas.microsoft.com/office/drawing/2014/main" xmlns="" id="{B4D65B61-76A3-4C63-AF5F-37FEBFBEE965}"/>
+                <a16:creationId xmlns="" xmlns:a16="http://schemas.microsoft.com/office/drawing/2014/main" id="{B4D65B61-76A3-4C63-AF5F-37FEBFBEE965}"/>
               </a:ext>
             </a:extLst>
           </p:cNvPr>
@@ -13519,7 +13545,7 @@
           <p:cNvPr id="166" name="Rectángulo 165">
             <a:extLst>
               <a:ext uri="{FF2B5EF4-FFF2-40B4-BE49-F238E27FC236}">
-                <a16:creationId xmlns:a16="http://schemas.microsoft.com/office/drawing/2014/main" xmlns="" id="{191F3A7F-A805-4CAB-97CA-040F76E3683F}"/>
+                <a16:creationId xmlns="" xmlns:a16="http://schemas.microsoft.com/office/drawing/2014/main" id="{191F3A7F-A805-4CAB-97CA-040F76E3683F}"/>
               </a:ext>
             </a:extLst>
           </p:cNvPr>
@@ -13571,7 +13597,7 @@
           <p:cNvPr id="167" name="Rectángulo 166">
             <a:extLst>
               <a:ext uri="{FF2B5EF4-FFF2-40B4-BE49-F238E27FC236}">
-                <a16:creationId xmlns:a16="http://schemas.microsoft.com/office/drawing/2014/main" xmlns="" id="{33616F36-1ECC-4FF0-9532-25827C40B420}"/>
+                <a16:creationId xmlns="" xmlns:a16="http://schemas.microsoft.com/office/drawing/2014/main" id="{33616F36-1ECC-4FF0-9532-25827C40B420}"/>
               </a:ext>
             </a:extLst>
           </p:cNvPr>
@@ -13623,7 +13649,7 @@
           <p:cNvPr id="168" name="Rectángulo 167">
             <a:extLst>
               <a:ext uri="{FF2B5EF4-FFF2-40B4-BE49-F238E27FC236}">
-                <a16:creationId xmlns:a16="http://schemas.microsoft.com/office/drawing/2014/main" xmlns="" id="{539EDBDD-BF0D-4A72-91AD-AC8C2C797082}"/>
+                <a16:creationId xmlns="" xmlns:a16="http://schemas.microsoft.com/office/drawing/2014/main" id="{539EDBDD-BF0D-4A72-91AD-AC8C2C797082}"/>
               </a:ext>
             </a:extLst>
           </p:cNvPr>
@@ -13675,7 +13701,7 @@
           <p:cNvPr id="169" name="Rectángulo 168">
             <a:extLst>
               <a:ext uri="{FF2B5EF4-FFF2-40B4-BE49-F238E27FC236}">
-                <a16:creationId xmlns:a16="http://schemas.microsoft.com/office/drawing/2014/main" xmlns="" id="{898C3BB6-8EEE-435E-B0A0-E1828D742ACE}"/>
+                <a16:creationId xmlns="" xmlns:a16="http://schemas.microsoft.com/office/drawing/2014/main" id="{898C3BB6-8EEE-435E-B0A0-E1828D742ACE}"/>
               </a:ext>
             </a:extLst>
           </p:cNvPr>
@@ -13727,7 +13753,7 @@
           <p:cNvPr id="170" name="Rectángulo 169">
             <a:extLst>
               <a:ext uri="{FF2B5EF4-FFF2-40B4-BE49-F238E27FC236}">
-                <a16:creationId xmlns:a16="http://schemas.microsoft.com/office/drawing/2014/main" xmlns="" id="{8B64012E-8B4D-4713-94BD-0423A9B8D52A}"/>
+                <a16:creationId xmlns="" xmlns:a16="http://schemas.microsoft.com/office/drawing/2014/main" id="{8B64012E-8B4D-4713-94BD-0423A9B8D52A}"/>
               </a:ext>
             </a:extLst>
           </p:cNvPr>
@@ -13779,7 +13805,7 @@
           <p:cNvPr id="171" name="Rectángulo 170">
             <a:extLst>
               <a:ext uri="{FF2B5EF4-FFF2-40B4-BE49-F238E27FC236}">
-                <a16:creationId xmlns:a16="http://schemas.microsoft.com/office/drawing/2014/main" xmlns="" id="{DDADC474-895C-4662-9682-B1E575777BCC}"/>
+                <a16:creationId xmlns="" xmlns:a16="http://schemas.microsoft.com/office/drawing/2014/main" id="{DDADC474-895C-4662-9682-B1E575777BCC}"/>
               </a:ext>
             </a:extLst>
           </p:cNvPr>
@@ -13831,7 +13857,7 @@
           <p:cNvPr id="172" name="Rectángulo 171">
             <a:extLst>
               <a:ext uri="{FF2B5EF4-FFF2-40B4-BE49-F238E27FC236}">
-                <a16:creationId xmlns:a16="http://schemas.microsoft.com/office/drawing/2014/main" xmlns="" id="{F543A603-1DD0-4C77-9E6C-E18A3B963F1C}"/>
+                <a16:creationId xmlns="" xmlns:a16="http://schemas.microsoft.com/office/drawing/2014/main" id="{F543A603-1DD0-4C77-9E6C-E18A3B963F1C}"/>
               </a:ext>
             </a:extLst>
           </p:cNvPr>
@@ -13883,7 +13909,7 @@
           <p:cNvPr id="173" name="Rectángulo 172">
             <a:extLst>
               <a:ext uri="{FF2B5EF4-FFF2-40B4-BE49-F238E27FC236}">
-                <a16:creationId xmlns:a16="http://schemas.microsoft.com/office/drawing/2014/main" xmlns="" id="{0BC68162-03FA-4EDF-B7E3-669B91F81D5D}"/>
+                <a16:creationId xmlns="" xmlns:a16="http://schemas.microsoft.com/office/drawing/2014/main" id="{0BC68162-03FA-4EDF-B7E3-669B91F81D5D}"/>
               </a:ext>
             </a:extLst>
           </p:cNvPr>
@@ -13935,7 +13961,7 @@
           <p:cNvPr id="191" name="Conector recto 190">
             <a:extLst>
               <a:ext uri="{FF2B5EF4-FFF2-40B4-BE49-F238E27FC236}">
-                <a16:creationId xmlns:a16="http://schemas.microsoft.com/office/drawing/2014/main" xmlns="" id="{ACFA401B-45E3-4098-B36B-2BC3B2A5CD85}"/>
+                <a16:creationId xmlns="" xmlns:a16="http://schemas.microsoft.com/office/drawing/2014/main" id="{ACFA401B-45E3-4098-B36B-2BC3B2A5CD85}"/>
               </a:ext>
             </a:extLst>
           </p:cNvPr>
@@ -13978,7 +14004,7 @@
           <p:cNvPr id="192" name="Conector recto 191">
             <a:extLst>
               <a:ext uri="{FF2B5EF4-FFF2-40B4-BE49-F238E27FC236}">
-                <a16:creationId xmlns:a16="http://schemas.microsoft.com/office/drawing/2014/main" xmlns="" id="{BC3B3434-928A-4C21-99CF-D18880D6F7FF}"/>
+                <a16:creationId xmlns="" xmlns:a16="http://schemas.microsoft.com/office/drawing/2014/main" id="{BC3B3434-928A-4C21-99CF-D18880D6F7FF}"/>
               </a:ext>
             </a:extLst>
           </p:cNvPr>
@@ -14021,7 +14047,7 @@
           <p:cNvPr id="193" name="Conector recto 192">
             <a:extLst>
               <a:ext uri="{FF2B5EF4-FFF2-40B4-BE49-F238E27FC236}">
-                <a16:creationId xmlns:a16="http://schemas.microsoft.com/office/drawing/2014/main" xmlns="" id="{2BC1A433-6F96-430B-A30F-0C567F2C03AB}"/>
+                <a16:creationId xmlns="" xmlns:a16="http://schemas.microsoft.com/office/drawing/2014/main" id="{2BC1A433-6F96-430B-A30F-0C567F2C03AB}"/>
               </a:ext>
             </a:extLst>
           </p:cNvPr>
@@ -14064,7 +14090,7 @@
           <p:cNvPr id="194" name="Conector recto de flecha 193">
             <a:extLst>
               <a:ext uri="{FF2B5EF4-FFF2-40B4-BE49-F238E27FC236}">
-                <a16:creationId xmlns:a16="http://schemas.microsoft.com/office/drawing/2014/main" xmlns="" id="{4837886A-ED2C-4777-B747-356B3BD8B3F1}"/>
+                <a16:creationId xmlns="" xmlns:a16="http://schemas.microsoft.com/office/drawing/2014/main" id="{4837886A-ED2C-4777-B747-356B3BD8B3F1}"/>
               </a:ext>
             </a:extLst>
           </p:cNvPr>
@@ -14106,7 +14132,7 @@
           <p:cNvPr id="195" name="Conector recto de flecha 194">
             <a:extLst>
               <a:ext uri="{FF2B5EF4-FFF2-40B4-BE49-F238E27FC236}">
-                <a16:creationId xmlns:a16="http://schemas.microsoft.com/office/drawing/2014/main" xmlns="" id="{B85211E4-ECBB-467B-9129-D4E2AAF5D06E}"/>
+                <a16:creationId xmlns="" xmlns:a16="http://schemas.microsoft.com/office/drawing/2014/main" id="{B85211E4-ECBB-467B-9129-D4E2AAF5D06E}"/>
               </a:ext>
             </a:extLst>
           </p:cNvPr>
@@ -14148,7 +14174,7 @@
           <p:cNvPr id="196" name="Conector recto de flecha 195">
             <a:extLst>
               <a:ext uri="{FF2B5EF4-FFF2-40B4-BE49-F238E27FC236}">
-                <a16:creationId xmlns:a16="http://schemas.microsoft.com/office/drawing/2014/main" xmlns="" id="{203E03DA-A0C9-4B31-9E79-CF81ABD05778}"/>
+                <a16:creationId xmlns="" xmlns:a16="http://schemas.microsoft.com/office/drawing/2014/main" id="{203E03DA-A0C9-4B31-9E79-CF81ABD05778}"/>
               </a:ext>
             </a:extLst>
           </p:cNvPr>
@@ -14190,7 +14216,7 @@
           <p:cNvPr id="197" name="Conector recto 196">
             <a:extLst>
               <a:ext uri="{FF2B5EF4-FFF2-40B4-BE49-F238E27FC236}">
-                <a16:creationId xmlns:a16="http://schemas.microsoft.com/office/drawing/2014/main" xmlns="" id="{D38D2157-4FB2-4EB6-B6DA-7D9A2BAC2A62}"/>
+                <a16:creationId xmlns="" xmlns:a16="http://schemas.microsoft.com/office/drawing/2014/main" id="{D38D2157-4FB2-4EB6-B6DA-7D9A2BAC2A62}"/>
               </a:ext>
             </a:extLst>
           </p:cNvPr>
@@ -14233,7 +14259,7 @@
           <p:cNvPr id="198" name="CuadroTexto 197">
             <a:extLst>
               <a:ext uri="{FF2B5EF4-FFF2-40B4-BE49-F238E27FC236}">
-                <a16:creationId xmlns:a16="http://schemas.microsoft.com/office/drawing/2014/main" xmlns="" id="{82E5DF1D-4687-43F5-9A6D-93D04223D3ED}"/>
+                <a16:creationId xmlns="" xmlns:a16="http://schemas.microsoft.com/office/drawing/2014/main" id="{82E5DF1D-4687-43F5-9A6D-93D04223D3ED}"/>
               </a:ext>
             </a:extLst>
           </p:cNvPr>
@@ -14269,7 +14295,7 @@
           <p:cNvPr id="199" name="CuadroTexto 198">
             <a:extLst>
               <a:ext uri="{FF2B5EF4-FFF2-40B4-BE49-F238E27FC236}">
-                <a16:creationId xmlns:a16="http://schemas.microsoft.com/office/drawing/2014/main" xmlns="" id="{7DF4F336-F49B-40B3-B015-D816887DAB41}"/>
+                <a16:creationId xmlns="" xmlns:a16="http://schemas.microsoft.com/office/drawing/2014/main" id="{7DF4F336-F49B-40B3-B015-D816887DAB41}"/>
               </a:ext>
             </a:extLst>
           </p:cNvPr>
@@ -14305,7 +14331,7 @@
           <p:cNvPr id="200" name="CuadroTexto 199">
             <a:extLst>
               <a:ext uri="{FF2B5EF4-FFF2-40B4-BE49-F238E27FC236}">
-                <a16:creationId xmlns:a16="http://schemas.microsoft.com/office/drawing/2014/main" xmlns="" id="{866AB857-EE38-48E3-AC79-F8387A93F654}"/>
+                <a16:creationId xmlns="" xmlns:a16="http://schemas.microsoft.com/office/drawing/2014/main" id="{866AB857-EE38-48E3-AC79-F8387A93F654}"/>
               </a:ext>
             </a:extLst>
           </p:cNvPr>
@@ -14345,7 +14371,7 @@
           <p:cNvPr id="201" name="CuadroTexto 200">
             <a:extLst>
               <a:ext uri="{FF2B5EF4-FFF2-40B4-BE49-F238E27FC236}">
-                <a16:creationId xmlns:a16="http://schemas.microsoft.com/office/drawing/2014/main" xmlns="" id="{E6FC10D6-4156-423D-A07B-F7D6E80E5A96}"/>
+                <a16:creationId xmlns="" xmlns:a16="http://schemas.microsoft.com/office/drawing/2014/main" id="{E6FC10D6-4156-423D-A07B-F7D6E80E5A96}"/>
               </a:ext>
             </a:extLst>
           </p:cNvPr>
@@ -14400,7 +14426,7 @@
           <p:cNvPr id="202" name="CuadroTexto 201">
             <a:extLst>
               <a:ext uri="{FF2B5EF4-FFF2-40B4-BE49-F238E27FC236}">
-                <a16:creationId xmlns:a16="http://schemas.microsoft.com/office/drawing/2014/main" xmlns="" id="{77965913-4E90-48BC-A65F-8F75468D65DB}"/>
+                <a16:creationId xmlns="" xmlns:a16="http://schemas.microsoft.com/office/drawing/2014/main" id="{77965913-4E90-48BC-A65F-8F75468D65DB}"/>
               </a:ext>
             </a:extLst>
           </p:cNvPr>
@@ -14452,7 +14478,7 @@
           <p:cNvPr id="203" name="CuadroTexto 202">
             <a:extLst>
               <a:ext uri="{FF2B5EF4-FFF2-40B4-BE49-F238E27FC236}">
-                <a16:creationId xmlns:a16="http://schemas.microsoft.com/office/drawing/2014/main" xmlns="" id="{146B3D10-8664-424F-99D1-AFF1A7F4CDD0}"/>
+                <a16:creationId xmlns="" xmlns:a16="http://schemas.microsoft.com/office/drawing/2014/main" id="{146B3D10-8664-424F-99D1-AFF1A7F4CDD0}"/>
               </a:ext>
             </a:extLst>
           </p:cNvPr>
@@ -14495,7 +14521,7 @@
           <p:cNvPr id="204" name="CuadroTexto 203">
             <a:extLst>
               <a:ext uri="{FF2B5EF4-FFF2-40B4-BE49-F238E27FC236}">
-                <a16:creationId xmlns:a16="http://schemas.microsoft.com/office/drawing/2014/main" xmlns="" id="{8CDE21EF-88EB-48D0-BF5C-62D920816AB2}"/>
+                <a16:creationId xmlns="" xmlns:a16="http://schemas.microsoft.com/office/drawing/2014/main" id="{8CDE21EF-88EB-48D0-BF5C-62D920816AB2}"/>
               </a:ext>
             </a:extLst>
           </p:cNvPr>
@@ -14536,7 +14562,7 @@
           <p:cNvPr id="205" name="CuadroTexto 204">
             <a:extLst>
               <a:ext uri="{FF2B5EF4-FFF2-40B4-BE49-F238E27FC236}">
-                <a16:creationId xmlns:a16="http://schemas.microsoft.com/office/drawing/2014/main" xmlns="" id="{E57E9024-2B6B-4733-A9BE-1F1052C62140}"/>
+                <a16:creationId xmlns="" xmlns:a16="http://schemas.microsoft.com/office/drawing/2014/main" id="{E57E9024-2B6B-4733-A9BE-1F1052C62140}"/>
               </a:ext>
             </a:extLst>
           </p:cNvPr>
@@ -14572,7 +14598,7 @@
           <p:cNvPr id="235" name="Rectángulo 234">
             <a:extLst>
               <a:ext uri="{FF2B5EF4-FFF2-40B4-BE49-F238E27FC236}">
-                <a16:creationId xmlns:a16="http://schemas.microsoft.com/office/drawing/2014/main" xmlns="" id="{15F3048C-696F-4133-B486-94CE69227F84}"/>
+                <a16:creationId xmlns="" xmlns:a16="http://schemas.microsoft.com/office/drawing/2014/main" id="{15F3048C-696F-4133-B486-94CE69227F84}"/>
               </a:ext>
             </a:extLst>
           </p:cNvPr>
@@ -14624,7 +14650,7 @@
           <p:cNvPr id="236" name="Rectángulo 235">
             <a:extLst>
               <a:ext uri="{FF2B5EF4-FFF2-40B4-BE49-F238E27FC236}">
-                <a16:creationId xmlns:a16="http://schemas.microsoft.com/office/drawing/2014/main" xmlns="" id="{48131414-6E37-486A-8685-78029A3E5420}"/>
+                <a16:creationId xmlns="" xmlns:a16="http://schemas.microsoft.com/office/drawing/2014/main" id="{48131414-6E37-486A-8685-78029A3E5420}"/>
               </a:ext>
             </a:extLst>
           </p:cNvPr>
@@ -14676,7 +14702,7 @@
           <p:cNvPr id="237" name="Rectángulo 236">
             <a:extLst>
               <a:ext uri="{FF2B5EF4-FFF2-40B4-BE49-F238E27FC236}">
-                <a16:creationId xmlns:a16="http://schemas.microsoft.com/office/drawing/2014/main" xmlns="" id="{FFD46F1C-8212-4947-857F-D13E173AEBA1}"/>
+                <a16:creationId xmlns="" xmlns:a16="http://schemas.microsoft.com/office/drawing/2014/main" id="{FFD46F1C-8212-4947-857F-D13E173AEBA1}"/>
               </a:ext>
             </a:extLst>
           </p:cNvPr>
@@ -14728,7 +14754,7 @@
           <p:cNvPr id="238" name="Rectángulo 237">
             <a:extLst>
               <a:ext uri="{FF2B5EF4-FFF2-40B4-BE49-F238E27FC236}">
-                <a16:creationId xmlns:a16="http://schemas.microsoft.com/office/drawing/2014/main" xmlns="" id="{4633BE5F-8E47-472A-9ED4-458748AD1ED6}"/>
+                <a16:creationId xmlns="" xmlns:a16="http://schemas.microsoft.com/office/drawing/2014/main" id="{4633BE5F-8E47-472A-9ED4-458748AD1ED6}"/>
               </a:ext>
             </a:extLst>
           </p:cNvPr>
@@ -14780,7 +14806,7 @@
           <p:cNvPr id="239" name="Rectángulo 238">
             <a:extLst>
               <a:ext uri="{FF2B5EF4-FFF2-40B4-BE49-F238E27FC236}">
-                <a16:creationId xmlns:a16="http://schemas.microsoft.com/office/drawing/2014/main" xmlns="" id="{B99DAF21-7A3E-4F58-9E56-1A4D210FC9B4}"/>
+                <a16:creationId xmlns="" xmlns:a16="http://schemas.microsoft.com/office/drawing/2014/main" id="{B99DAF21-7A3E-4F58-9E56-1A4D210FC9B4}"/>
               </a:ext>
             </a:extLst>
           </p:cNvPr>
@@ -14832,7 +14858,7 @@
           <p:cNvPr id="240" name="Rectángulo 239">
             <a:extLst>
               <a:ext uri="{FF2B5EF4-FFF2-40B4-BE49-F238E27FC236}">
-                <a16:creationId xmlns:a16="http://schemas.microsoft.com/office/drawing/2014/main" xmlns="" id="{556A174E-DBF1-4EB7-B670-A5C0DFAD7A83}"/>
+                <a16:creationId xmlns="" xmlns:a16="http://schemas.microsoft.com/office/drawing/2014/main" id="{556A174E-DBF1-4EB7-B670-A5C0DFAD7A83}"/>
               </a:ext>
             </a:extLst>
           </p:cNvPr>
@@ -14884,7 +14910,7 @@
           <p:cNvPr id="241" name="Rectángulo 240">
             <a:extLst>
               <a:ext uri="{FF2B5EF4-FFF2-40B4-BE49-F238E27FC236}">
-                <a16:creationId xmlns:a16="http://schemas.microsoft.com/office/drawing/2014/main" xmlns="" id="{9DCBC382-B5D6-4A36-8273-A0388CDA1A19}"/>
+                <a16:creationId xmlns="" xmlns:a16="http://schemas.microsoft.com/office/drawing/2014/main" id="{9DCBC382-B5D6-4A36-8273-A0388CDA1A19}"/>
               </a:ext>
             </a:extLst>
           </p:cNvPr>
@@ -14936,7 +14962,7 @@
           <p:cNvPr id="246" name="Rectángulo 245">
             <a:extLst>
               <a:ext uri="{FF2B5EF4-FFF2-40B4-BE49-F238E27FC236}">
-                <a16:creationId xmlns:a16="http://schemas.microsoft.com/office/drawing/2014/main" xmlns="" id="{DAC039BF-0B99-434E-BA7B-AD81F5CFF56A}"/>
+                <a16:creationId xmlns="" xmlns:a16="http://schemas.microsoft.com/office/drawing/2014/main" id="{DAC039BF-0B99-434E-BA7B-AD81F5CFF56A}"/>
               </a:ext>
             </a:extLst>
           </p:cNvPr>
@@ -14988,7 +15014,7 @@
           <p:cNvPr id="247" name="Rectángulo 246">
             <a:extLst>
               <a:ext uri="{FF2B5EF4-FFF2-40B4-BE49-F238E27FC236}">
-                <a16:creationId xmlns:a16="http://schemas.microsoft.com/office/drawing/2014/main" xmlns="" id="{20138294-9F5C-4AC2-A06F-7F0C30705053}"/>
+                <a16:creationId xmlns="" xmlns:a16="http://schemas.microsoft.com/office/drawing/2014/main" id="{20138294-9F5C-4AC2-A06F-7F0C30705053}"/>
               </a:ext>
             </a:extLst>
           </p:cNvPr>
@@ -15040,7 +15066,7 @@
           <p:cNvPr id="248" name="Rectángulo 247">
             <a:extLst>
               <a:ext uri="{FF2B5EF4-FFF2-40B4-BE49-F238E27FC236}">
-                <a16:creationId xmlns:a16="http://schemas.microsoft.com/office/drawing/2014/main" xmlns="" id="{3CD9AE40-7B62-4F85-ACDF-F55A2FB8B3D0}"/>
+                <a16:creationId xmlns="" xmlns:a16="http://schemas.microsoft.com/office/drawing/2014/main" id="{3CD9AE40-7B62-4F85-ACDF-F55A2FB8B3D0}"/>
               </a:ext>
             </a:extLst>
           </p:cNvPr>
@@ -15092,7 +15118,7 @@
           <p:cNvPr id="249" name="Conector recto 248">
             <a:extLst>
               <a:ext uri="{FF2B5EF4-FFF2-40B4-BE49-F238E27FC236}">
-                <a16:creationId xmlns:a16="http://schemas.microsoft.com/office/drawing/2014/main" xmlns="" id="{72CB65F1-B25F-454A-B4C2-86F349FA771C}"/>
+                <a16:creationId xmlns="" xmlns:a16="http://schemas.microsoft.com/office/drawing/2014/main" id="{72CB65F1-B25F-454A-B4C2-86F349FA771C}"/>
               </a:ext>
             </a:extLst>
           </p:cNvPr>
@@ -15135,7 +15161,7 @@
           <p:cNvPr id="250" name="Conector recto 249">
             <a:extLst>
               <a:ext uri="{FF2B5EF4-FFF2-40B4-BE49-F238E27FC236}">
-                <a16:creationId xmlns:a16="http://schemas.microsoft.com/office/drawing/2014/main" xmlns="" id="{28ABD711-7F1E-4072-B124-75305334F5CC}"/>
+                <a16:creationId xmlns="" xmlns:a16="http://schemas.microsoft.com/office/drawing/2014/main" id="{28ABD711-7F1E-4072-B124-75305334F5CC}"/>
               </a:ext>
             </a:extLst>
           </p:cNvPr>
@@ -15178,7 +15204,7 @@
           <p:cNvPr id="251" name="Conector recto 250">
             <a:extLst>
               <a:ext uri="{FF2B5EF4-FFF2-40B4-BE49-F238E27FC236}">
-                <a16:creationId xmlns:a16="http://schemas.microsoft.com/office/drawing/2014/main" xmlns="" id="{1DC7D223-6431-4B84-8737-D4FD3690DEAD}"/>
+                <a16:creationId xmlns="" xmlns:a16="http://schemas.microsoft.com/office/drawing/2014/main" id="{1DC7D223-6431-4B84-8737-D4FD3690DEAD}"/>
               </a:ext>
             </a:extLst>
           </p:cNvPr>
@@ -15221,7 +15247,7 @@
           <p:cNvPr id="252" name="Conector recto de flecha 251">
             <a:extLst>
               <a:ext uri="{FF2B5EF4-FFF2-40B4-BE49-F238E27FC236}">
-                <a16:creationId xmlns:a16="http://schemas.microsoft.com/office/drawing/2014/main" xmlns="" id="{4DC3CA7D-5076-45DB-B2E9-AFF630AD58B8}"/>
+                <a16:creationId xmlns="" xmlns:a16="http://schemas.microsoft.com/office/drawing/2014/main" id="{4DC3CA7D-5076-45DB-B2E9-AFF630AD58B8}"/>
               </a:ext>
             </a:extLst>
           </p:cNvPr>
@@ -15263,7 +15289,7 @@
           <p:cNvPr id="253" name="Conector recto de flecha 252">
             <a:extLst>
               <a:ext uri="{FF2B5EF4-FFF2-40B4-BE49-F238E27FC236}">
-                <a16:creationId xmlns:a16="http://schemas.microsoft.com/office/drawing/2014/main" xmlns="" id="{8C817A1C-DB34-482B-B644-75C252360552}"/>
+                <a16:creationId xmlns="" xmlns:a16="http://schemas.microsoft.com/office/drawing/2014/main" id="{8C817A1C-DB34-482B-B644-75C252360552}"/>
               </a:ext>
             </a:extLst>
           </p:cNvPr>
@@ -15305,7 +15331,7 @@
           <p:cNvPr id="254" name="Conector recto de flecha 253">
             <a:extLst>
               <a:ext uri="{FF2B5EF4-FFF2-40B4-BE49-F238E27FC236}">
-                <a16:creationId xmlns:a16="http://schemas.microsoft.com/office/drawing/2014/main" xmlns="" id="{0AC453DA-C343-4048-A20B-28C907AF3CF3}"/>
+                <a16:creationId xmlns="" xmlns:a16="http://schemas.microsoft.com/office/drawing/2014/main" id="{0AC453DA-C343-4048-A20B-28C907AF3CF3}"/>
               </a:ext>
             </a:extLst>
           </p:cNvPr>
@@ -15347,7 +15373,7 @@
           <p:cNvPr id="255" name="Conector recto 254">
             <a:extLst>
               <a:ext uri="{FF2B5EF4-FFF2-40B4-BE49-F238E27FC236}">
-                <a16:creationId xmlns:a16="http://schemas.microsoft.com/office/drawing/2014/main" xmlns="" id="{5020BECE-2D84-4E79-A5B0-B33C31365551}"/>
+                <a16:creationId xmlns="" xmlns:a16="http://schemas.microsoft.com/office/drawing/2014/main" id="{5020BECE-2D84-4E79-A5B0-B33C31365551}"/>
               </a:ext>
             </a:extLst>
           </p:cNvPr>
@@ -15390,7 +15416,7 @@
           <p:cNvPr id="256" name="CuadroTexto 255">
             <a:extLst>
               <a:ext uri="{FF2B5EF4-FFF2-40B4-BE49-F238E27FC236}">
-                <a16:creationId xmlns:a16="http://schemas.microsoft.com/office/drawing/2014/main" xmlns="" id="{5446DEC8-DF96-46E0-AEFD-979BA6373480}"/>
+                <a16:creationId xmlns="" xmlns:a16="http://schemas.microsoft.com/office/drawing/2014/main" id="{5446DEC8-DF96-46E0-AEFD-979BA6373480}"/>
               </a:ext>
             </a:extLst>
           </p:cNvPr>
@@ -15426,7 +15452,7 @@
           <p:cNvPr id="257" name="CuadroTexto 256">
             <a:extLst>
               <a:ext uri="{FF2B5EF4-FFF2-40B4-BE49-F238E27FC236}">
-                <a16:creationId xmlns:a16="http://schemas.microsoft.com/office/drawing/2014/main" xmlns="" id="{9CB138FC-979D-4643-A683-DB58A958C225}"/>
+                <a16:creationId xmlns="" xmlns:a16="http://schemas.microsoft.com/office/drawing/2014/main" id="{9CB138FC-979D-4643-A683-DB58A958C225}"/>
               </a:ext>
             </a:extLst>
           </p:cNvPr>
@@ -15462,7 +15488,7 @@
           <p:cNvPr id="258" name="CuadroTexto 257">
             <a:extLst>
               <a:ext uri="{FF2B5EF4-FFF2-40B4-BE49-F238E27FC236}">
-                <a16:creationId xmlns:a16="http://schemas.microsoft.com/office/drawing/2014/main" xmlns="" id="{5CA295E2-BF44-425E-8FD4-2A1D6B30CFCD}"/>
+                <a16:creationId xmlns="" xmlns:a16="http://schemas.microsoft.com/office/drawing/2014/main" id="{5CA295E2-BF44-425E-8FD4-2A1D6B30CFCD}"/>
               </a:ext>
             </a:extLst>
           </p:cNvPr>
@@ -15502,7 +15528,7 @@
           <p:cNvPr id="259" name="CuadroTexto 258">
             <a:extLst>
               <a:ext uri="{FF2B5EF4-FFF2-40B4-BE49-F238E27FC236}">
-                <a16:creationId xmlns:a16="http://schemas.microsoft.com/office/drawing/2014/main" xmlns="" id="{C5312029-C805-4270-B34D-C75B0A04B115}"/>
+                <a16:creationId xmlns="" xmlns:a16="http://schemas.microsoft.com/office/drawing/2014/main" id="{C5312029-C805-4270-B34D-C75B0A04B115}"/>
               </a:ext>
             </a:extLst>
           </p:cNvPr>
@@ -15557,7 +15583,7 @@
           <p:cNvPr id="260" name="CuadroTexto 259">
             <a:extLst>
               <a:ext uri="{FF2B5EF4-FFF2-40B4-BE49-F238E27FC236}">
-                <a16:creationId xmlns:a16="http://schemas.microsoft.com/office/drawing/2014/main" xmlns="" id="{7C1451B1-0EE2-48E7-A5C7-E589BB8EF3A3}"/>
+                <a16:creationId xmlns="" xmlns:a16="http://schemas.microsoft.com/office/drawing/2014/main" id="{7C1451B1-0EE2-48E7-A5C7-E589BB8EF3A3}"/>
               </a:ext>
             </a:extLst>
           </p:cNvPr>
@@ -15609,7 +15635,7 @@
           <p:cNvPr id="261" name="CuadroTexto 260">
             <a:extLst>
               <a:ext uri="{FF2B5EF4-FFF2-40B4-BE49-F238E27FC236}">
-                <a16:creationId xmlns:a16="http://schemas.microsoft.com/office/drawing/2014/main" xmlns="" id="{37D45A3A-D8F3-456A-A646-0CC35498C5F7}"/>
+                <a16:creationId xmlns="" xmlns:a16="http://schemas.microsoft.com/office/drawing/2014/main" id="{37D45A3A-D8F3-456A-A646-0CC35498C5F7}"/>
               </a:ext>
             </a:extLst>
           </p:cNvPr>
@@ -15652,7 +15678,7 @@
           <p:cNvPr id="262" name="CuadroTexto 261">
             <a:extLst>
               <a:ext uri="{FF2B5EF4-FFF2-40B4-BE49-F238E27FC236}">
-                <a16:creationId xmlns:a16="http://schemas.microsoft.com/office/drawing/2014/main" xmlns="" id="{C47A571C-20DB-4A23-B79B-B599C54D91D9}"/>
+                <a16:creationId xmlns="" xmlns:a16="http://schemas.microsoft.com/office/drawing/2014/main" id="{C47A571C-20DB-4A23-B79B-B599C54D91D9}"/>
               </a:ext>
             </a:extLst>
           </p:cNvPr>
@@ -15693,7 +15719,7 @@
           <p:cNvPr id="263" name="CuadroTexto 262">
             <a:extLst>
               <a:ext uri="{FF2B5EF4-FFF2-40B4-BE49-F238E27FC236}">
-                <a16:creationId xmlns:a16="http://schemas.microsoft.com/office/drawing/2014/main" xmlns="" id="{D6DBEA7F-A29A-4F41-ADE9-7547E88CE3E9}"/>
+                <a16:creationId xmlns="" xmlns:a16="http://schemas.microsoft.com/office/drawing/2014/main" id="{D6DBEA7F-A29A-4F41-ADE9-7547E88CE3E9}"/>
               </a:ext>
             </a:extLst>
           </p:cNvPr>
@@ -15729,7 +15755,7 @@
           <p:cNvPr id="264" name="CuadroTexto 263">
             <a:extLst>
               <a:ext uri="{FF2B5EF4-FFF2-40B4-BE49-F238E27FC236}">
-                <a16:creationId xmlns:a16="http://schemas.microsoft.com/office/drawing/2014/main" xmlns="" id="{39EACC52-8C22-4FAF-9538-44645E22CE74}"/>
+                <a16:creationId xmlns="" xmlns:a16="http://schemas.microsoft.com/office/drawing/2014/main" id="{39EACC52-8C22-4FAF-9538-44645E22CE74}"/>
               </a:ext>
             </a:extLst>
           </p:cNvPr>
@@ -15763,7 +15789,7 @@
     </p:spTree>
     <p:extLst>
       <p:ext uri="{BB962C8B-B14F-4D97-AF65-F5344CB8AC3E}">
-        <p14:creationId xmlns:p14="http://schemas.microsoft.com/office/powerpoint/2010/main" xmlns="" val="1223327115"/>
+        <p14:creationId xmlns="" xmlns:p14="http://schemas.microsoft.com/office/powerpoint/2010/main" val="1223327115"/>
       </p:ext>
     </p:extLst>
   </p:cSld>
@@ -16062,7 +16088,7 @@
   <a:extraClrSchemeLst/>
   <a:extLst>
     <a:ext uri="{05A4C25C-085E-4340-85A3-A5531E510DB2}">
-      <thm15:themeFamily xmlns:thm15="http://schemas.microsoft.com/office/thememl/2012/main" xmlns="" name="Office Theme" id="{62F939B6-93AF-4DB8-9C6B-D6C7DFDC589F}" vid="{4A3C46E8-61CC-4603-A589-7422A47A8E4A}"/>
+      <thm15:themeFamily xmlns="" xmlns:thm15="http://schemas.microsoft.com/office/thememl/2012/main" name="Office Theme" id="{62F939B6-93AF-4DB8-9C6B-D6C7DFDC589F}" vid="{4A3C46E8-61CC-4603-A589-7422A47A8E4A}"/>
     </a:ext>
   </a:extLst>
 </a:theme>

</xml_diff>